<commit_message>
Problem sheet markings in presentation
</commit_message>
<xml_diff>
--- a/Writing Theses in Latex Slides.pptx
+++ b/Writing Theses in Latex Slides.pptx
@@ -468,7 +468,7 @@
           <a:p>
             <a:fld id="{88EB714B-C3CC-4216-88C1-02913905B1CF}" type="datetimeFigureOut">
               <a:rPr lang="en-GB" smtClean="0"/>
-              <a:t>20/04/2020</a:t>
+              <a:t>23/04/2020</a:t>
             </a:fld>
             <a:endParaRPr lang="en-GB"/>
           </a:p>
@@ -6159,7 +6159,7 @@
           <a:p>
             <a:fld id="{EB0080F8-EA1C-491D-963C-2C881B2F918F}" type="datetimeFigureOut">
               <a:rPr lang="en-GB" smtClean="0"/>
-              <a:t>20/04/2020</a:t>
+              <a:t>23/04/2020</a:t>
             </a:fld>
             <a:endParaRPr lang="en-GB"/>
           </a:p>
@@ -6309,7 +6309,7 @@
           <a:p>
             <a:fld id="{EB0080F8-EA1C-491D-963C-2C881B2F918F}" type="datetimeFigureOut">
               <a:rPr lang="en-GB" smtClean="0"/>
-              <a:t>20/04/2020</a:t>
+              <a:t>23/04/2020</a:t>
             </a:fld>
             <a:endParaRPr lang="en-GB"/>
           </a:p>
@@ -7842,7 +7842,7 @@
           <a:p>
             <a:fld id="{EB0080F8-EA1C-491D-963C-2C881B2F918F}" type="datetimeFigureOut">
               <a:rPr lang="en-GB" smtClean="0"/>
-              <a:t>20/04/2020</a:t>
+              <a:t>23/04/2020</a:t>
             </a:fld>
             <a:endParaRPr lang="en-GB"/>
           </a:p>
@@ -8996,6 +8996,45 @@
           </a:prstGeom>
         </p:spPr>
       </p:pic>
+      <p:sp>
+        <p:nvSpPr>
+          <p:cNvPr id="7" name="TextBox 6">
+            <a:extLst>
+              <a:ext uri="{FF2B5EF4-FFF2-40B4-BE49-F238E27FC236}">
+                <a16:creationId xmlns:a16="http://schemas.microsoft.com/office/drawing/2014/main" id="{75F34A1E-662A-4794-95B7-05097EF90B68}"/>
+              </a:ext>
+            </a:extLst>
+          </p:cNvPr>
+          <p:cNvSpPr txBox="1"/>
+          <p:nvPr/>
+        </p:nvSpPr>
+        <p:spPr>
+          <a:xfrm>
+            <a:off x="7357241" y="6498021"/>
+            <a:ext cx="1697422" cy="369332"/>
+          </a:xfrm>
+          <a:prstGeom prst="rect">
+            <a:avLst/>
+          </a:prstGeom>
+          <a:noFill/>
+        </p:spPr>
+        <p:txBody>
+          <a:bodyPr wrap="square" rtlCol="0">
+            <a:spAutoFit/>
+          </a:bodyPr>
+          <a:lstStyle/>
+          <a:p>
+            <a:r>
+              <a:rPr lang="en-GB" dirty="0">
+                <a:solidFill>
+                  <a:schemeClr val="accent2"/>
+                </a:solidFill>
+              </a:rPr>
+              <a:t>Problem Sheet</a:t>
+            </a:r>
+          </a:p>
+        </p:txBody>
+      </p:sp>
     </p:spTree>
     <p:extLst>
       <p:ext uri="{BB962C8B-B14F-4D97-AF65-F5344CB8AC3E}">
@@ -9941,6 +9980,45 @@
           </a:prstGeom>
         </p:spPr>
       </p:pic>
+      <p:sp>
+        <p:nvSpPr>
+          <p:cNvPr id="6" name="TextBox 5">
+            <a:extLst>
+              <a:ext uri="{FF2B5EF4-FFF2-40B4-BE49-F238E27FC236}">
+                <a16:creationId xmlns:a16="http://schemas.microsoft.com/office/drawing/2014/main" id="{9566C1C4-FD2E-4749-AB7F-8087B56B27EE}"/>
+              </a:ext>
+            </a:extLst>
+          </p:cNvPr>
+          <p:cNvSpPr txBox="1"/>
+          <p:nvPr/>
+        </p:nvSpPr>
+        <p:spPr>
+          <a:xfrm>
+            <a:off x="7357241" y="6498021"/>
+            <a:ext cx="1697422" cy="369332"/>
+          </a:xfrm>
+          <a:prstGeom prst="rect">
+            <a:avLst/>
+          </a:prstGeom>
+          <a:noFill/>
+        </p:spPr>
+        <p:txBody>
+          <a:bodyPr wrap="square" rtlCol="0">
+            <a:spAutoFit/>
+          </a:bodyPr>
+          <a:lstStyle/>
+          <a:p>
+            <a:r>
+              <a:rPr lang="en-GB" dirty="0">
+                <a:solidFill>
+                  <a:schemeClr val="accent2"/>
+                </a:solidFill>
+              </a:rPr>
+              <a:t>Problem Sheet</a:t>
+            </a:r>
+          </a:p>
+        </p:txBody>
+      </p:sp>
     </p:spTree>
     <p:extLst>
       <p:ext uri="{BB962C8B-B14F-4D97-AF65-F5344CB8AC3E}">
@@ -10609,6 +10687,45 @@
           </a:prstGeom>
         </p:spPr>
       </p:pic>
+      <p:sp>
+        <p:nvSpPr>
+          <p:cNvPr id="7" name="TextBox 6">
+            <a:extLst>
+              <a:ext uri="{FF2B5EF4-FFF2-40B4-BE49-F238E27FC236}">
+                <a16:creationId xmlns:a16="http://schemas.microsoft.com/office/drawing/2014/main" id="{B9D10ADD-E06C-4CC1-9F54-7F4A3325D545}"/>
+              </a:ext>
+            </a:extLst>
+          </p:cNvPr>
+          <p:cNvSpPr txBox="1"/>
+          <p:nvPr/>
+        </p:nvSpPr>
+        <p:spPr>
+          <a:xfrm>
+            <a:off x="7357241" y="6498021"/>
+            <a:ext cx="1697422" cy="369332"/>
+          </a:xfrm>
+          <a:prstGeom prst="rect">
+            <a:avLst/>
+          </a:prstGeom>
+          <a:noFill/>
+        </p:spPr>
+        <p:txBody>
+          <a:bodyPr wrap="square" rtlCol="0">
+            <a:spAutoFit/>
+          </a:bodyPr>
+          <a:lstStyle/>
+          <a:p>
+            <a:r>
+              <a:rPr lang="en-GB" dirty="0">
+                <a:solidFill>
+                  <a:schemeClr val="accent2"/>
+                </a:solidFill>
+              </a:rPr>
+              <a:t>Problem Sheet</a:t>
+            </a:r>
+          </a:p>
+        </p:txBody>
+      </p:sp>
     </p:spTree>
     <p:extLst>
       <p:ext uri="{BB962C8B-B14F-4D97-AF65-F5344CB8AC3E}">
@@ -20955,6 +21072,45 @@
           </a:prstGeom>
         </p:spPr>
       </p:pic>
+      <p:sp>
+        <p:nvSpPr>
+          <p:cNvPr id="6" name="TextBox 5">
+            <a:extLst>
+              <a:ext uri="{FF2B5EF4-FFF2-40B4-BE49-F238E27FC236}">
+                <a16:creationId xmlns:a16="http://schemas.microsoft.com/office/drawing/2014/main" id="{099674D9-4038-4AB1-BAD9-3C9EF5FD6E6A}"/>
+              </a:ext>
+            </a:extLst>
+          </p:cNvPr>
+          <p:cNvSpPr txBox="1"/>
+          <p:nvPr/>
+        </p:nvSpPr>
+        <p:spPr>
+          <a:xfrm>
+            <a:off x="7357241" y="6498021"/>
+            <a:ext cx="1697422" cy="369332"/>
+          </a:xfrm>
+          <a:prstGeom prst="rect">
+            <a:avLst/>
+          </a:prstGeom>
+          <a:noFill/>
+        </p:spPr>
+        <p:txBody>
+          <a:bodyPr wrap="square" rtlCol="0">
+            <a:spAutoFit/>
+          </a:bodyPr>
+          <a:lstStyle/>
+          <a:p>
+            <a:r>
+              <a:rPr lang="en-GB" dirty="0">
+                <a:solidFill>
+                  <a:schemeClr val="accent2"/>
+                </a:solidFill>
+              </a:rPr>
+              <a:t>Problem Sheet</a:t>
+            </a:r>
+          </a:p>
+        </p:txBody>
+      </p:sp>
     </p:spTree>
     <p:extLst>
       <p:ext uri="{BB962C8B-B14F-4D97-AF65-F5344CB8AC3E}">

</xml_diff>

<commit_message>
Update to subfigure image widths
</commit_message>
<xml_diff>
--- a/Writing Theses in Latex Slides.pptx
+++ b/Writing Theses in Latex Slides.pptx
@@ -15804,7 +15804,7 @@
             </a:r>
             <a:r>
               <a:rPr lang="en-GB" sz="1500" dirty="0"/>
-              <a:t>[width= 0.48</a:t>
+              <a:t>[width= 0.52</a:t>
             </a:r>
             <a:r>
               <a:rPr lang="en-GB" sz="1500" dirty="0">
@@ -15935,7 +15935,7 @@
             </a:r>
             <a:r>
               <a:rPr lang="en-GB" sz="1500" dirty="0"/>
-              <a:t>[width= 0.48</a:t>
+              <a:t>[width= 0.44</a:t>
             </a:r>
             <a:r>
               <a:rPr lang="en-GB" sz="1500" dirty="0">

</xml_diff>

<commit_message>
Update to subfigures notes
</commit_message>
<xml_diff>
--- a/Writing Theses in Latex Slides.pptx
+++ b/Writing Theses in Latex Slides.pptx
@@ -3405,7 +3405,7 @@
             </a:r>
             <a:r>
               <a:rPr lang="en-GB" dirty="0"/>
-              <a:t>” command). In this case, we’ve asked for each figure to be just under half of the width of the text. Within the curly brackets following the “\</a:t>
+              <a:t>” command). In this case, we’ve asked for each figure to be around half of the width of the text (there’s some variation due to the aspect ratio of each image). Within the curly brackets following the “\</a:t>
             </a:r>
             <a:r>
               <a:rPr lang="en-GB" dirty="0" err="1"/>
@@ -3413,7 +3413,11 @@
             </a:r>
             <a:r>
               <a:rPr lang="en-GB" dirty="0"/>
-              <a:t>” command we also give each individual subfigure a label so we can reference it later. </a:t>
+              <a:t>” command we also give each individual subfigure a label so we can reference it </a:t>
+            </a:r>
+            <a:r>
+              <a:rPr lang="en-GB"/>
+              <a:t>later.</a:t>
             </a:r>
             <a:br>
               <a:rPr lang="en-GB" dirty="0"/>

</xml_diff>

<commit_message>
Swapping subfig and graphicspath
</commit_message>
<xml_diff>
--- a/Writing Theses in Latex Slides.pptx
+++ b/Writing Theses in Latex Slides.pptx
@@ -38,8 +38,8 @@
     <p:sldId id="315" r:id="rId26"/>
     <p:sldId id="317" r:id="rId27"/>
     <p:sldId id="313" r:id="rId28"/>
-    <p:sldId id="318" r:id="rId29"/>
-    <p:sldId id="314" r:id="rId30"/>
+    <p:sldId id="314" r:id="rId29"/>
+    <p:sldId id="318" r:id="rId30"/>
     <p:sldId id="286" r:id="rId31"/>
     <p:sldId id="319" r:id="rId32"/>
     <p:sldId id="321" r:id="rId33"/>
@@ -182,8 +182,8 @@
             <p14:sldId id="315"/>
             <p14:sldId id="317"/>
             <p14:sldId id="313"/>
+            <p14:sldId id="314"/>
             <p14:sldId id="318"/>
-            <p14:sldId id="314"/>
             <p14:sldId id="286"/>
             <p14:sldId id="319"/>
             <p14:sldId id="321"/>
@@ -470,7 +470,7 @@
           <a:p>
             <a:fld id="{88EB714B-C3CC-4216-88C1-02913905B1CF}" type="datetimeFigureOut">
               <a:rPr lang="en-GB" smtClean="0"/>
-              <a:t>16/02/2021</a:t>
+              <a:t>19/02/2021</a:t>
             </a:fld>
             <a:endParaRPr lang="en-GB"/>
           </a:p>
@@ -3214,6 +3214,14 @@
             </a:r>
             <a:r>
               <a:rPr lang="en-GB" dirty="0"/>
+              <a:t>” option and colour of your citations using the “</a:t>
+            </a:r>
+            <a:r>
+              <a:rPr lang="en-GB" dirty="0" err="1"/>
+              <a:t>citecolor</a:t>
+            </a:r>
+            <a:r>
+              <a:rPr lang="en-GB"/>
               <a:t>” option.</a:t>
             </a:r>
             <a:br>
@@ -3235,6 +3243,15 @@
             <a:r>
               <a:rPr lang="en-GB" dirty="0"/>
               <a:t>Overleaf Example: https://www.overleaf.com/read/tzdbtmdmtfhd</a:t>
+            </a:r>
+          </a:p>
+          <a:p>
+            <a:endParaRPr lang="en-GB" dirty="0"/>
+          </a:p>
+          <a:p>
+            <a:r>
+              <a:rPr lang="en-GB" dirty="0"/>
+              <a:t>Break for Section 7 of Task sheet</a:t>
             </a:r>
           </a:p>
         </p:txBody>
@@ -3321,7 +3338,7 @@
           <a:p>
             <a:r>
               <a:rPr lang="en-GB" dirty="0"/>
-              <a:t>Overleaf Example: https://www.overleaf.com/read/nwtfndvmfnpf</a:t>
+              <a:t>In LaTeX, a subfigure, is a figure which appears as one of multiple smaller figures within a larger figure. This collection of subfigures will always be placed together as a single figure. There are a number of ways of including subfigures in your thesis.</a:t>
             </a:r>
           </a:p>
           <a:p>
@@ -3330,7 +3347,92 @@
           <a:p>
             <a:r>
               <a:rPr lang="en-GB" dirty="0"/>
-              <a:t>Break for sections 7 and 8 of Task Sheet</a:t>
+              <a:t>The example I am showing you today uses the “</a:t>
+            </a:r>
+            <a:r>
+              <a:rPr lang="en-GB" dirty="0" err="1"/>
+              <a:t>subfig</a:t>
+            </a:r>
+            <a:r>
+              <a:rPr lang="en-GB" dirty="0"/>
+              <a:t>” package. Within the figure environment we use the “\</a:t>
+            </a:r>
+            <a:r>
+              <a:rPr lang="en-GB" dirty="0" err="1"/>
+              <a:t>subfloat</a:t>
+            </a:r>
+            <a:r>
+              <a:rPr lang="en-GB" dirty="0"/>
+              <a:t>” command once for each subfigure we wish to include. The “\</a:t>
+            </a:r>
+            <a:r>
+              <a:rPr lang="en-GB" dirty="0" err="1"/>
+              <a:t>subfloat</a:t>
+            </a:r>
+            <a:r>
+              <a:rPr lang="en-GB" dirty="0"/>
+              <a:t>” command is followed by the caption of the subfigure in square brackets. Then, in curly brackets, we use the “\</a:t>
+            </a:r>
+            <a:r>
+              <a:rPr lang="en-GB" dirty="0" err="1"/>
+              <a:t>includegraphics</a:t>
+            </a:r>
+            <a:r>
+              <a:rPr lang="en-GB" dirty="0"/>
+              <a:t>” command to actually include the graphics. The square brackets following the “\</a:t>
+            </a:r>
+            <a:r>
+              <a:rPr lang="en-GB" dirty="0" err="1"/>
+              <a:t>includegraphics</a:t>
+            </a:r>
+            <a:r>
+              <a:rPr lang="en-GB" dirty="0"/>
+              <a:t> command is here to specify the width of the figure in units of the width of text on the page at this point (which is referenced using the “\</a:t>
+            </a:r>
+            <a:r>
+              <a:rPr lang="en-GB" dirty="0" err="1"/>
+              <a:t>textwidth</a:t>
+            </a:r>
+            <a:r>
+              <a:rPr lang="en-GB" dirty="0"/>
+              <a:t>” command). In this case, we’ve asked for each figure to be around half of the width of the text (there’s some variation due to the aspect ratio of each image). Within the curly brackets following the “\</a:t>
+            </a:r>
+            <a:r>
+              <a:rPr lang="en-GB" dirty="0" err="1"/>
+              <a:t>subfloat</a:t>
+            </a:r>
+            <a:r>
+              <a:rPr lang="en-GB" dirty="0"/>
+              <a:t>” command we also give each individual subfigure a label so we can reference it later.</a:t>
+            </a:r>
+            <a:br>
+              <a:rPr lang="en-GB" dirty="0"/>
+            </a:br>
+            <a:br>
+              <a:rPr lang="en-GB" dirty="0"/>
+            </a:br>
+            <a:r>
+              <a:rPr lang="en-GB" dirty="0"/>
+              <a:t>Following the specification of the first and third figure we use the “\quad” command. This is a way of telling LaTeX to insert a small horizontal space between whatever came before and whatever comes next. Following the specification of the second subfigure we use a double-backslash to start a new line of subfigures within the overall figure we’re creating. This puts the third and fourth figures below the first and second.</a:t>
+            </a:r>
+          </a:p>
+          <a:p>
+            <a:endParaRPr lang="en-GB" dirty="0"/>
+          </a:p>
+          <a:p>
+            <a:r>
+              <a:rPr lang="en-GB" dirty="0"/>
+              <a:t>Finally, we use the “\caption” command to give the figure that is comprised of the subfigures a caption and the “\label” command to give it a label. We see that we get a nicely spaced array of subfigures, each with their own caption, inside a larger figure which also has its own caption. We can reference any of the subfigures or the containing figure.</a:t>
+            </a:r>
+            <a:br>
+              <a:rPr lang="en-GB" dirty="0"/>
+            </a:br>
+            <a:br>
+              <a:rPr lang="en-GB" dirty="0"/>
+            </a:br>
+            <a:r>
+              <a:rPr lang="en-GB" dirty="0"/>
+              <a:t>Overleaf Example: https://www.overleaf.com/read/htdvrmwgcyvd</a:t>
             </a:r>
           </a:p>
         </p:txBody>
@@ -3361,7 +3463,7 @@
     </p:spTree>
     <p:extLst>
       <p:ext uri="{BB962C8B-B14F-4D97-AF65-F5344CB8AC3E}">
-        <p14:creationId xmlns:p14="http://schemas.microsoft.com/office/powerpoint/2010/main" val="53672810"/>
+        <p14:creationId xmlns:p14="http://schemas.microsoft.com/office/powerpoint/2010/main" val="1494002939"/>
       </p:ext>
     </p:extLst>
   </p:cSld>
@@ -3417,7 +3519,7 @@
           <a:p>
             <a:r>
               <a:rPr lang="en-GB" dirty="0"/>
-              <a:t>In LaTeX, a subfigure, is a figure which appears as one of multiple smaller figures within a larger figure. This collection of subfigures will always be placed together as a single figure. There are a number of ways of including subfigures in your thesis.</a:t>
+              <a:t>Overleaf Example: https://www.overleaf.com/read/nwtfndvmfnpf</a:t>
             </a:r>
           </a:p>
           <a:p>
@@ -3426,101 +3528,7 @@
           <a:p>
             <a:r>
               <a:rPr lang="en-GB" dirty="0"/>
-              <a:t>The example I am showing you today uses the “</a:t>
-            </a:r>
-            <a:r>
-              <a:rPr lang="en-GB" dirty="0" err="1"/>
-              <a:t>subfig</a:t>
-            </a:r>
-            <a:r>
-              <a:rPr lang="en-GB" dirty="0"/>
-              <a:t>” package. Within the figure environment we use the “\</a:t>
-            </a:r>
-            <a:r>
-              <a:rPr lang="en-GB" dirty="0" err="1"/>
-              <a:t>subfloat</a:t>
-            </a:r>
-            <a:r>
-              <a:rPr lang="en-GB" dirty="0"/>
-              <a:t>” command once for each subfigure we wish to include. The “\</a:t>
-            </a:r>
-            <a:r>
-              <a:rPr lang="en-GB" dirty="0" err="1"/>
-              <a:t>subfloat</a:t>
-            </a:r>
-            <a:r>
-              <a:rPr lang="en-GB" dirty="0"/>
-              <a:t>” command is followed by the caption of the subfigure in square brackets. Then, in curly brackets, we use the “\</a:t>
-            </a:r>
-            <a:r>
-              <a:rPr lang="en-GB" dirty="0" err="1"/>
-              <a:t>includegraphics</a:t>
-            </a:r>
-            <a:r>
-              <a:rPr lang="en-GB" dirty="0"/>
-              <a:t>” command to actually include the graphics. The square brackets following the “\</a:t>
-            </a:r>
-            <a:r>
-              <a:rPr lang="en-GB" dirty="0" err="1"/>
-              <a:t>includegraphics</a:t>
-            </a:r>
-            <a:r>
-              <a:rPr lang="en-GB" dirty="0"/>
-              <a:t> command is here to specify the width of the figure in units of the width of text on the page at this point (which is referenced using the “\</a:t>
-            </a:r>
-            <a:r>
-              <a:rPr lang="en-GB" dirty="0" err="1"/>
-              <a:t>textwidth</a:t>
-            </a:r>
-            <a:r>
-              <a:rPr lang="en-GB" dirty="0"/>
-              <a:t>” command). In this case, we’ve asked for each figure to be around half of the width of the text (there’s some variation due to the aspect ratio of each image). Within the curly brackets following the “\</a:t>
-            </a:r>
-            <a:r>
-              <a:rPr lang="en-GB" dirty="0" err="1"/>
-              <a:t>subfloat</a:t>
-            </a:r>
-            <a:r>
-              <a:rPr lang="en-GB" dirty="0"/>
-              <a:t>” command we also give each individual subfigure a label so we can reference it later.</a:t>
-            </a:r>
-            <a:br>
-              <a:rPr lang="en-GB" dirty="0"/>
-            </a:br>
-            <a:br>
-              <a:rPr lang="en-GB" dirty="0"/>
-            </a:br>
-            <a:r>
-              <a:rPr lang="en-GB" dirty="0"/>
-              <a:t>Following the specification of the first and third figure we use the “\quad” command. This is a way of telling LaTeX to insert a small horizontal space between whatever came before and whatever comes next. Following the specification of the second subfigure we use a double-backslash to start a new line of subfigures within the overall figure we’re creating. This puts the third and fourth figures below the first and second.</a:t>
-            </a:r>
-          </a:p>
-          <a:p>
-            <a:endParaRPr lang="en-GB" dirty="0"/>
-          </a:p>
-          <a:p>
-            <a:r>
-              <a:rPr lang="en-GB" dirty="0"/>
-              <a:t>Finally, we use the “\caption” command to give the figure that is comprised of the subfigures a caption and the “\label” command to give it a label. We see that we get a nicely spaced array of subfigures, each with their own caption, inside a larger figure which also has its own caption. We can reference any of the subfigures or the containing figure.</a:t>
-            </a:r>
-            <a:br>
-              <a:rPr lang="en-GB" dirty="0"/>
-            </a:br>
-            <a:br>
-              <a:rPr lang="en-GB" dirty="0"/>
-            </a:br>
-            <a:r>
-              <a:rPr lang="en-GB" dirty="0"/>
-              <a:t>Overleaf Example: https://www.overleaf.com/read/htdvrmwgcyvd</a:t>
-            </a:r>
-          </a:p>
-          <a:p>
-            <a:endParaRPr lang="en-GB" dirty="0"/>
-          </a:p>
-          <a:p>
-            <a:r>
-              <a:rPr lang="en-GB" dirty="0"/>
-              <a:t>Break for section 9 of Task Sheet</a:t>
+              <a:t>Break for sections 8 and 9 of Task Sheet</a:t>
             </a:r>
           </a:p>
         </p:txBody>
@@ -3551,7 +3559,7 @@
     </p:spTree>
     <p:extLst>
       <p:ext uri="{BB962C8B-B14F-4D97-AF65-F5344CB8AC3E}">
-        <p14:creationId xmlns:p14="http://schemas.microsoft.com/office/powerpoint/2010/main" val="1494002939"/>
+        <p14:creationId xmlns:p14="http://schemas.microsoft.com/office/powerpoint/2010/main" val="53672810"/>
       </p:ext>
     </p:extLst>
   </p:cSld>
@@ -6348,7 +6356,7 @@
           <a:p>
             <a:fld id="{EB0080F8-EA1C-491D-963C-2C881B2F918F}" type="datetimeFigureOut">
               <a:rPr lang="en-GB" smtClean="0"/>
-              <a:t>16/02/2021</a:t>
+              <a:t>19/02/2021</a:t>
             </a:fld>
             <a:endParaRPr lang="en-GB"/>
           </a:p>
@@ -6498,7 +6506,7 @@
           <a:p>
             <a:fld id="{EB0080F8-EA1C-491D-963C-2C881B2F918F}" type="datetimeFigureOut">
               <a:rPr lang="en-GB" smtClean="0"/>
-              <a:t>16/02/2021</a:t>
+              <a:t>19/02/2021</a:t>
             </a:fld>
             <a:endParaRPr lang="en-GB"/>
           </a:p>
@@ -8031,7 +8039,7 @@
           <a:p>
             <a:fld id="{EB0080F8-EA1C-491D-963C-2C881B2F918F}" type="datetimeFigureOut">
               <a:rPr lang="en-GB" smtClean="0"/>
-              <a:t>16/02/2021</a:t>
+              <a:t>19/02/2021</a:t>
             </a:fld>
             <a:endParaRPr lang="en-GB"/>
           </a:p>
@@ -14771,8 +14779,8 @@
         </p:nvSpPr>
         <p:spPr>
           <a:xfrm>
-            <a:off x="398722" y="2128400"/>
-            <a:ext cx="3967655" cy="4018838"/>
+            <a:off x="398722" y="1770590"/>
+            <a:ext cx="4173278" cy="4369621"/>
           </a:xfrm>
         </p:spPr>
         <p:txBody>
@@ -14848,7 +14856,27 @@
                   </a:schemeClr>
                 </a:solidFill>
               </a:rPr>
-              <a:t>=blue</a:t>
+              <a:t>=blue, </a:t>
+            </a:r>
+            <a:r>
+              <a:rPr lang="en-GB" sz="2000" dirty="0" err="1">
+                <a:solidFill>
+                  <a:schemeClr val="accent4">
+                    <a:lumMod val="75000"/>
+                  </a:schemeClr>
+                </a:solidFill>
+              </a:rPr>
+              <a:t>citecolor</a:t>
+            </a:r>
+            <a:r>
+              <a:rPr lang="en-GB" sz="2000" dirty="0">
+                <a:solidFill>
+                  <a:schemeClr val="accent4">
+                    <a:lumMod val="75000"/>
+                  </a:schemeClr>
+                </a:solidFill>
+              </a:rPr>
+              <a:t>=red</a:t>
             </a:r>
             <a:r>
               <a:rPr lang="en-GB" sz="2000" dirty="0"/>
@@ -14970,6 +14998,46 @@
                 </a:solidFill>
               </a:rPr>
               <a:t>first_first_section</a:t>
+            </a:r>
+            <a:r>
+              <a:rPr lang="en-GB" sz="2000" dirty="0"/>
+              <a:t>} and read </a:t>
+            </a:r>
+            <a:r>
+              <a:rPr lang="en-GB" sz="2000" dirty="0">
+                <a:solidFill>
+                  <a:schemeClr val="tx2">
+                    <a:lumMod val="50000"/>
+                    <a:lumOff val="50000"/>
+                  </a:schemeClr>
+                </a:solidFill>
+              </a:rPr>
+              <a:t>\</a:t>
+            </a:r>
+            <a:r>
+              <a:rPr lang="en-GB" sz="2000" dirty="0" err="1">
+                <a:solidFill>
+                  <a:schemeClr val="tx2">
+                    <a:lumMod val="50000"/>
+                    <a:lumOff val="50000"/>
+                  </a:schemeClr>
+                </a:solidFill>
+              </a:rPr>
+              <a:t>citet</a:t>
+            </a:r>
+            <a:r>
+              <a:rPr lang="en-GB" sz="2000" dirty="0"/>
+              <a:t>{</a:t>
+            </a:r>
+            <a:r>
+              <a:rPr lang="en-GB" sz="2000" dirty="0">
+                <a:solidFill>
+                  <a:schemeClr val="accent2">
+                    <a:lumMod val="75000"/>
+                  </a:schemeClr>
+                </a:solidFill>
+              </a:rPr>
+              <a:t>Thor_2011</a:t>
             </a:r>
             <a:r>
               <a:rPr lang="en-GB" sz="2000" dirty="0"/>
@@ -15068,12 +15136,51 @@
           </a:fontRef>
         </p:style>
       </p:cxnSp>
+      <p:sp>
+        <p:nvSpPr>
+          <p:cNvPr id="6" name="TextBox 5">
+            <a:extLst>
+              <a:ext uri="{FF2B5EF4-FFF2-40B4-BE49-F238E27FC236}">
+                <a16:creationId xmlns:a16="http://schemas.microsoft.com/office/drawing/2014/main" id="{6C8FAF4D-4BF7-4B37-8E6A-A5836BF73F33}"/>
+              </a:ext>
+            </a:extLst>
+          </p:cNvPr>
+          <p:cNvSpPr txBox="1"/>
+          <p:nvPr/>
+        </p:nvSpPr>
+        <p:spPr>
+          <a:xfrm>
+            <a:off x="7357241" y="6498021"/>
+            <a:ext cx="1697422" cy="369332"/>
+          </a:xfrm>
+          <a:prstGeom prst="rect">
+            <a:avLst/>
+          </a:prstGeom>
+          <a:noFill/>
+        </p:spPr>
+        <p:txBody>
+          <a:bodyPr wrap="square" rtlCol="0">
+            <a:spAutoFit/>
+          </a:bodyPr>
+          <a:lstStyle/>
+          <a:p>
+            <a:r>
+              <a:rPr lang="en-GB" dirty="0">
+                <a:solidFill>
+                  <a:schemeClr val="accent2"/>
+                </a:solidFill>
+              </a:rPr>
+              <a:t>Problem Sheet</a:t>
+            </a:r>
+          </a:p>
+        </p:txBody>
+      </p:sp>
       <p:pic>
         <p:nvPicPr>
-          <p:cNvPr id="9" name="Picture 8">
+          <p:cNvPr id="7" name="Picture 6">
             <a:extLst>
               <a:ext uri="{FF2B5EF4-FFF2-40B4-BE49-F238E27FC236}">
-                <a16:creationId xmlns:a16="http://schemas.microsoft.com/office/drawing/2014/main" id="{2E19C8C3-86AB-4B77-AF62-93E75F11DE42}"/>
+                <a16:creationId xmlns:a16="http://schemas.microsoft.com/office/drawing/2014/main" id="{22E21FE2-F7DA-4513-950B-35300CECA53F}"/>
               </a:ext>
             </a:extLst>
           </p:cNvPr>
@@ -15090,8 +15197,8 @@
         </p:blipFill>
         <p:spPr>
           <a:xfrm>
-            <a:off x="4995347" y="2785241"/>
-            <a:ext cx="3916202" cy="2708496"/>
+            <a:off x="4842642" y="2581657"/>
+            <a:ext cx="3977658" cy="2757240"/>
           </a:xfrm>
           <a:prstGeom prst="rect">
             <a:avLst/>
@@ -15153,208 +15260,6 @@
           <a:p>
             <a:r>
               <a:rPr lang="en-GB" sz="4000" dirty="0"/>
-              <a:t>Graphics Path</a:t>
-            </a:r>
-          </a:p>
-        </p:txBody>
-      </p:sp>
-      <p:sp>
-        <p:nvSpPr>
-          <p:cNvPr id="7" name="Content Placeholder 6">
-            <a:extLst>
-              <a:ext uri="{FF2B5EF4-FFF2-40B4-BE49-F238E27FC236}">
-                <a16:creationId xmlns:a16="http://schemas.microsoft.com/office/drawing/2014/main" id="{A4668B92-0976-4E36-A913-C47498FEE667}"/>
-              </a:ext>
-            </a:extLst>
-          </p:cNvPr>
-          <p:cNvSpPr>
-            <a:spLocks noGrp="1"/>
-          </p:cNvSpPr>
-          <p:nvPr>
-            <p:ph idx="1"/>
-          </p:nvPr>
-        </p:nvSpPr>
-        <p:spPr>
-          <a:xfrm>
-            <a:off x="457200" y="1417638"/>
-            <a:ext cx="8229600" cy="4525963"/>
-          </a:xfrm>
-        </p:spPr>
-        <p:txBody>
-          <a:bodyPr/>
-          <a:lstStyle/>
-          <a:p>
-            <a:r>
-              <a:rPr lang="en-GB" sz="2800" dirty="0"/>
-              <a:t>You can set where LaTeX should look for the graphics to be used in your document</a:t>
-            </a:r>
-          </a:p>
-          <a:p>
-            <a:r>
-              <a:rPr lang="en-GB" sz="2800" dirty="0"/>
-              <a:t>Useful for separating figures for different chapters and the .</a:t>
-            </a:r>
-            <a:r>
-              <a:rPr lang="en-GB" sz="2800" dirty="0" err="1"/>
-              <a:t>tex</a:t>
-            </a:r>
-            <a:r>
-              <a:rPr lang="en-GB" sz="2800" dirty="0"/>
-              <a:t> files</a:t>
-            </a:r>
-          </a:p>
-          <a:p>
-            <a:r>
-              <a:rPr lang="en-GB" sz="2800" dirty="0"/>
-              <a:t>The command </a:t>
-            </a:r>
-            <a:r>
-              <a:rPr lang="en-GB" sz="2800" dirty="0">
-                <a:solidFill>
-                  <a:schemeClr val="tx2">
-                    <a:lumMod val="50000"/>
-                    <a:lumOff val="50000"/>
-                  </a:schemeClr>
-                </a:solidFill>
-              </a:rPr>
-              <a:t>\</a:t>
-            </a:r>
-            <a:r>
-              <a:rPr lang="en-GB" sz="2800" dirty="0" err="1">
-                <a:solidFill>
-                  <a:schemeClr val="tx2">
-                    <a:lumMod val="50000"/>
-                    <a:lumOff val="50000"/>
-                  </a:schemeClr>
-                </a:solidFill>
-              </a:rPr>
-              <a:t>graphicspath</a:t>
-            </a:r>
-            <a:r>
-              <a:rPr lang="en-GB" sz="2800" dirty="0">
-                <a:solidFill>
-                  <a:schemeClr val="tx2">
-                    <a:lumMod val="50000"/>
-                    <a:lumOff val="50000"/>
-                  </a:schemeClr>
-                </a:solidFill>
-              </a:rPr>
-              <a:t> {{./FOLDER1/} {./FOLDER2/}} </a:t>
-            </a:r>
-            <a:r>
-              <a:rPr lang="en-GB" sz="2800" dirty="0"/>
-              <a:t>will tell LaTeX to look in the folders named “FOLDER1” and “FOLDER2” in the directory of the .</a:t>
-            </a:r>
-            <a:r>
-              <a:rPr lang="en-GB" sz="2800" dirty="0" err="1"/>
-              <a:t>tex</a:t>
-            </a:r>
-            <a:r>
-              <a:rPr lang="en-GB" sz="2800" dirty="0"/>
-              <a:t> file</a:t>
-            </a:r>
-            <a:endParaRPr lang="en-GB" sz="2400" dirty="0"/>
-          </a:p>
-          <a:p>
-            <a:pPr lvl="1"/>
-            <a:endParaRPr lang="en-GB" sz="1600" dirty="0"/>
-          </a:p>
-        </p:txBody>
-      </p:sp>
-      <p:sp>
-        <p:nvSpPr>
-          <p:cNvPr id="4" name="TextBox 3">
-            <a:extLst>
-              <a:ext uri="{FF2B5EF4-FFF2-40B4-BE49-F238E27FC236}">
-                <a16:creationId xmlns:a16="http://schemas.microsoft.com/office/drawing/2014/main" id="{398C5D47-C6D2-45C0-8D24-2F32A438F365}"/>
-              </a:ext>
-            </a:extLst>
-          </p:cNvPr>
-          <p:cNvSpPr txBox="1"/>
-          <p:nvPr/>
-        </p:nvSpPr>
-        <p:spPr>
-          <a:xfrm>
-            <a:off x="7357241" y="6498021"/>
-            <a:ext cx="1697422" cy="369332"/>
-          </a:xfrm>
-          <a:prstGeom prst="rect">
-            <a:avLst/>
-          </a:prstGeom>
-          <a:noFill/>
-        </p:spPr>
-        <p:txBody>
-          <a:bodyPr wrap="square" rtlCol="0">
-            <a:spAutoFit/>
-          </a:bodyPr>
-          <a:lstStyle/>
-          <a:p>
-            <a:r>
-              <a:rPr lang="en-GB" dirty="0">
-                <a:solidFill>
-                  <a:schemeClr val="accent2"/>
-                </a:solidFill>
-              </a:rPr>
-              <a:t>Problem Sheet</a:t>
-            </a:r>
-          </a:p>
-        </p:txBody>
-      </p:sp>
-    </p:spTree>
-    <p:extLst>
-      <p:ext uri="{BB962C8B-B14F-4D97-AF65-F5344CB8AC3E}">
-        <p14:creationId xmlns:p14="http://schemas.microsoft.com/office/powerpoint/2010/main" val="358316703"/>
-      </p:ext>
-    </p:extLst>
-  </p:cSld>
-  <p:clrMapOvr>
-    <a:masterClrMapping/>
-  </p:clrMapOvr>
-  <mc:AlternateContent xmlns:mc="http://schemas.openxmlformats.org/markup-compatibility/2006" xmlns:p14="http://schemas.microsoft.com/office/powerpoint/2010/main">
-    <mc:Choice Requires="p14">
-      <p:transition p14:dur="10"/>
-    </mc:Choice>
-    <mc:Fallback xmlns="">
-      <p:transition/>
-    </mc:Fallback>
-  </mc:AlternateContent>
-</p:sld>
-</file>
-
-<file path=ppt/slides/slide29.xml><?xml version="1.0" encoding="utf-8"?>
-<p:sld xmlns:a="http://schemas.openxmlformats.org/drawingml/2006/main" xmlns:r="http://schemas.openxmlformats.org/officeDocument/2006/relationships" xmlns:p="http://schemas.openxmlformats.org/presentationml/2006/main">
-  <p:cSld>
-    <p:spTree>
-      <p:nvGrpSpPr>
-        <p:cNvPr id="1" name=""/>
-        <p:cNvGrpSpPr/>
-        <p:nvPr/>
-      </p:nvGrpSpPr>
-      <p:grpSpPr>
-        <a:xfrm>
-          <a:off x="0" y="0"/>
-          <a:ext cx="0" cy="0"/>
-          <a:chOff x="0" y="0"/>
-          <a:chExt cx="0" cy="0"/>
-        </a:xfrm>
-      </p:grpSpPr>
-      <p:sp>
-        <p:nvSpPr>
-          <p:cNvPr id="2" name="Title 1"/>
-          <p:cNvSpPr>
-            <a:spLocks noGrp="1"/>
-          </p:cNvSpPr>
-          <p:nvPr>
-            <p:ph type="title"/>
-          </p:nvPr>
-        </p:nvSpPr>
-        <p:spPr/>
-        <p:txBody>
-          <a:bodyPr/>
-          <a:lstStyle/>
-          <a:p>
-            <a:r>
-              <a:rPr lang="en-GB" sz="4000" dirty="0"/>
               <a:t>Subfigures</a:t>
             </a:r>
           </a:p>
@@ -16121,7 +16026,7 @@
                   </a:schemeClr>
                 </a:solidFill>
               </a:rPr>
-              <a:t>figures</a:t>
+              <a:t>rivers</a:t>
             </a:r>
             <a:r>
               <a:rPr lang="en-GB" sz="1500" dirty="0"/>
@@ -16277,45 +16182,6 @@
           </a:fontRef>
         </p:style>
       </p:cxnSp>
-      <p:sp>
-        <p:nvSpPr>
-          <p:cNvPr id="6" name="TextBox 5">
-            <a:extLst>
-              <a:ext uri="{FF2B5EF4-FFF2-40B4-BE49-F238E27FC236}">
-                <a16:creationId xmlns:a16="http://schemas.microsoft.com/office/drawing/2014/main" id="{CF904172-DE3A-4AA5-B8AB-6E4C4800BE33}"/>
-              </a:ext>
-            </a:extLst>
-          </p:cNvPr>
-          <p:cNvSpPr txBox="1"/>
-          <p:nvPr/>
-        </p:nvSpPr>
-        <p:spPr>
-          <a:xfrm>
-            <a:off x="7357241" y="6498021"/>
-            <a:ext cx="1697422" cy="369332"/>
-          </a:xfrm>
-          <a:prstGeom prst="rect">
-            <a:avLst/>
-          </a:prstGeom>
-          <a:noFill/>
-        </p:spPr>
-        <p:txBody>
-          <a:bodyPr wrap="square" rtlCol="0">
-            <a:spAutoFit/>
-          </a:bodyPr>
-          <a:lstStyle/>
-          <a:p>
-            <a:r>
-              <a:rPr lang="en-GB" dirty="0">
-                <a:solidFill>
-                  <a:schemeClr val="accent2"/>
-                </a:solidFill>
-              </a:rPr>
-              <a:t>Problem Sheet</a:t>
-            </a:r>
-          </a:p>
-        </p:txBody>
-      </p:sp>
       <p:pic>
         <p:nvPicPr>
           <p:cNvPr id="5" name="Picture 4">
@@ -16350,6 +16216,208 @@
     <p:extLst>
       <p:ext uri="{BB962C8B-B14F-4D97-AF65-F5344CB8AC3E}">
         <p14:creationId xmlns:p14="http://schemas.microsoft.com/office/powerpoint/2010/main" val="3366996886"/>
+      </p:ext>
+    </p:extLst>
+  </p:cSld>
+  <p:clrMapOvr>
+    <a:masterClrMapping/>
+  </p:clrMapOvr>
+  <mc:AlternateContent xmlns:mc="http://schemas.openxmlformats.org/markup-compatibility/2006" xmlns:p14="http://schemas.microsoft.com/office/powerpoint/2010/main">
+    <mc:Choice Requires="p14">
+      <p:transition p14:dur="10"/>
+    </mc:Choice>
+    <mc:Fallback xmlns="">
+      <p:transition/>
+    </mc:Fallback>
+  </mc:AlternateContent>
+</p:sld>
+</file>
+
+<file path=ppt/slides/slide29.xml><?xml version="1.0" encoding="utf-8"?>
+<p:sld xmlns:a="http://schemas.openxmlformats.org/drawingml/2006/main" xmlns:r="http://schemas.openxmlformats.org/officeDocument/2006/relationships" xmlns:p="http://schemas.openxmlformats.org/presentationml/2006/main">
+  <p:cSld>
+    <p:spTree>
+      <p:nvGrpSpPr>
+        <p:cNvPr id="1" name=""/>
+        <p:cNvGrpSpPr/>
+        <p:nvPr/>
+      </p:nvGrpSpPr>
+      <p:grpSpPr>
+        <a:xfrm>
+          <a:off x="0" y="0"/>
+          <a:ext cx="0" cy="0"/>
+          <a:chOff x="0" y="0"/>
+          <a:chExt cx="0" cy="0"/>
+        </a:xfrm>
+      </p:grpSpPr>
+      <p:sp>
+        <p:nvSpPr>
+          <p:cNvPr id="2" name="Title 1"/>
+          <p:cNvSpPr>
+            <a:spLocks noGrp="1"/>
+          </p:cNvSpPr>
+          <p:nvPr>
+            <p:ph type="title"/>
+          </p:nvPr>
+        </p:nvSpPr>
+        <p:spPr/>
+        <p:txBody>
+          <a:bodyPr/>
+          <a:lstStyle/>
+          <a:p>
+            <a:r>
+              <a:rPr lang="en-GB" sz="4000" dirty="0"/>
+              <a:t>Graphics Path</a:t>
+            </a:r>
+          </a:p>
+        </p:txBody>
+      </p:sp>
+      <p:sp>
+        <p:nvSpPr>
+          <p:cNvPr id="7" name="Content Placeholder 6">
+            <a:extLst>
+              <a:ext uri="{FF2B5EF4-FFF2-40B4-BE49-F238E27FC236}">
+                <a16:creationId xmlns:a16="http://schemas.microsoft.com/office/drawing/2014/main" id="{A4668B92-0976-4E36-A913-C47498FEE667}"/>
+              </a:ext>
+            </a:extLst>
+          </p:cNvPr>
+          <p:cNvSpPr>
+            <a:spLocks noGrp="1"/>
+          </p:cNvSpPr>
+          <p:nvPr>
+            <p:ph idx="1"/>
+          </p:nvPr>
+        </p:nvSpPr>
+        <p:spPr>
+          <a:xfrm>
+            <a:off x="457200" y="1417638"/>
+            <a:ext cx="8229600" cy="4525963"/>
+          </a:xfrm>
+        </p:spPr>
+        <p:txBody>
+          <a:bodyPr/>
+          <a:lstStyle/>
+          <a:p>
+            <a:r>
+              <a:rPr lang="en-GB" sz="2800" dirty="0"/>
+              <a:t>You can set where LaTeX should look for the graphics to be used in your document</a:t>
+            </a:r>
+          </a:p>
+          <a:p>
+            <a:r>
+              <a:rPr lang="en-GB" sz="2800" dirty="0"/>
+              <a:t>Useful for separating figures for different chapters and the .</a:t>
+            </a:r>
+            <a:r>
+              <a:rPr lang="en-GB" sz="2800" dirty="0" err="1"/>
+              <a:t>tex</a:t>
+            </a:r>
+            <a:r>
+              <a:rPr lang="en-GB" sz="2800" dirty="0"/>
+              <a:t> files</a:t>
+            </a:r>
+          </a:p>
+          <a:p>
+            <a:r>
+              <a:rPr lang="en-GB" sz="2800" dirty="0"/>
+              <a:t>The command </a:t>
+            </a:r>
+            <a:r>
+              <a:rPr lang="en-GB" sz="2800" dirty="0">
+                <a:solidFill>
+                  <a:schemeClr val="tx2">
+                    <a:lumMod val="50000"/>
+                    <a:lumOff val="50000"/>
+                  </a:schemeClr>
+                </a:solidFill>
+              </a:rPr>
+              <a:t>\</a:t>
+            </a:r>
+            <a:r>
+              <a:rPr lang="en-GB" sz="2800" dirty="0" err="1">
+                <a:solidFill>
+                  <a:schemeClr val="tx2">
+                    <a:lumMod val="50000"/>
+                    <a:lumOff val="50000"/>
+                  </a:schemeClr>
+                </a:solidFill>
+              </a:rPr>
+              <a:t>graphicspath</a:t>
+            </a:r>
+            <a:r>
+              <a:rPr lang="en-GB" sz="2800" dirty="0">
+                <a:solidFill>
+                  <a:schemeClr val="tx2">
+                    <a:lumMod val="50000"/>
+                    <a:lumOff val="50000"/>
+                  </a:schemeClr>
+                </a:solidFill>
+              </a:rPr>
+              <a:t> {{./FOLDER1/} {./FOLDER2/}} </a:t>
+            </a:r>
+            <a:r>
+              <a:rPr lang="en-GB" sz="2800" dirty="0"/>
+              <a:t>will tell LaTeX to look in the folders named “FOLDER1” and “FOLDER2” in the directory of the .</a:t>
+            </a:r>
+            <a:r>
+              <a:rPr lang="en-GB" sz="2800" dirty="0" err="1"/>
+              <a:t>tex</a:t>
+            </a:r>
+            <a:r>
+              <a:rPr lang="en-GB" sz="2800" dirty="0"/>
+              <a:t> file</a:t>
+            </a:r>
+            <a:endParaRPr lang="en-GB" sz="2400" dirty="0"/>
+          </a:p>
+          <a:p>
+            <a:pPr lvl="1"/>
+            <a:endParaRPr lang="en-GB" sz="1600" dirty="0"/>
+          </a:p>
+        </p:txBody>
+      </p:sp>
+      <p:sp>
+        <p:nvSpPr>
+          <p:cNvPr id="4" name="TextBox 3">
+            <a:extLst>
+              <a:ext uri="{FF2B5EF4-FFF2-40B4-BE49-F238E27FC236}">
+                <a16:creationId xmlns:a16="http://schemas.microsoft.com/office/drawing/2014/main" id="{398C5D47-C6D2-45C0-8D24-2F32A438F365}"/>
+              </a:ext>
+            </a:extLst>
+          </p:cNvPr>
+          <p:cNvSpPr txBox="1"/>
+          <p:nvPr/>
+        </p:nvSpPr>
+        <p:spPr>
+          <a:xfrm>
+            <a:off x="7357241" y="6498021"/>
+            <a:ext cx="1697422" cy="369332"/>
+          </a:xfrm>
+          <a:prstGeom prst="rect">
+            <a:avLst/>
+          </a:prstGeom>
+          <a:noFill/>
+        </p:spPr>
+        <p:txBody>
+          <a:bodyPr wrap="square" rtlCol="0">
+            <a:spAutoFit/>
+          </a:bodyPr>
+          <a:lstStyle/>
+          <a:p>
+            <a:r>
+              <a:rPr lang="en-GB" dirty="0">
+                <a:solidFill>
+                  <a:schemeClr val="accent2"/>
+                </a:solidFill>
+              </a:rPr>
+              <a:t>Problem Sheet</a:t>
+            </a:r>
+          </a:p>
+        </p:txBody>
+      </p:sp>
+    </p:spTree>
+    <p:extLst>
+      <p:ext uri="{BB962C8B-B14F-4D97-AF65-F5344CB8AC3E}">
+        <p14:creationId xmlns:p14="http://schemas.microsoft.com/office/powerpoint/2010/main" val="358316703"/>
       </p:ext>
     </p:extLst>
   </p:cSld>
@@ -21172,7 +21240,7 @@
                   </a:schemeClr>
                 </a:solidFill>
               </a:rPr>
-              <a:t>twosided</a:t>
+              <a:t>twoside</a:t>
             </a:r>
             <a:r>
               <a:rPr lang="en-GB" sz="2400" dirty="0"/>

</xml_diff>

<commit_message>
Added graphics reminder to title page example
</commit_message>
<xml_diff>
--- a/Writing Theses in Latex Slides.pptx
+++ b/Writing Theses in Latex Slides.pptx
@@ -476,7 +476,7 @@
           <a:p>
             <a:fld id="{88EB714B-C3CC-4216-88C1-02913905B1CF}" type="datetimeFigureOut">
               <a:rPr lang="en-GB" smtClean="0"/>
-              <a:t>08/04/2022</a:t>
+              <a:t>03/05/2022</a:t>
             </a:fld>
             <a:endParaRPr lang="en-GB"/>
           </a:p>
@@ -6475,7 +6475,7 @@
           <a:p>
             <a:fld id="{EB0080F8-EA1C-491D-963C-2C881B2F918F}" type="datetimeFigureOut">
               <a:rPr lang="en-GB" smtClean="0"/>
-              <a:t>08/04/2022</a:t>
+              <a:t>03/05/2022</a:t>
             </a:fld>
             <a:endParaRPr lang="en-GB"/>
           </a:p>
@@ -6625,7 +6625,7 @@
           <a:p>
             <a:fld id="{EB0080F8-EA1C-491D-963C-2C881B2F918F}" type="datetimeFigureOut">
               <a:rPr lang="en-GB" smtClean="0"/>
-              <a:t>08/04/2022</a:t>
+              <a:t>03/05/2022</a:t>
             </a:fld>
             <a:endParaRPr lang="en-GB"/>
           </a:p>
@@ -8158,7 +8158,7 @@
           <a:p>
             <a:fld id="{EB0080F8-EA1C-491D-963C-2C881B2F918F}" type="datetimeFigureOut">
               <a:rPr lang="en-GB" smtClean="0"/>
-              <a:t>08/04/2022</a:t>
+              <a:t>03/05/2022</a:t>
             </a:fld>
             <a:endParaRPr lang="en-GB"/>
           </a:p>
@@ -10903,6 +10903,110 @@
           </a:p>
         </p:txBody>
       </p:sp>
+      <p:sp>
+        <p:nvSpPr>
+          <p:cNvPr id="5" name="TextBox 4">
+            <a:extLst>
+              <a:ext uri="{FF2B5EF4-FFF2-40B4-BE49-F238E27FC236}">
+                <a16:creationId xmlns:a16="http://schemas.microsoft.com/office/drawing/2014/main" id="{E1B7330F-D5CB-45DF-8FB3-3DCD9A0E8D21}"/>
+              </a:ext>
+            </a:extLst>
+          </p:cNvPr>
+          <p:cNvSpPr txBox="1"/>
+          <p:nvPr/>
+        </p:nvSpPr>
+        <p:spPr>
+          <a:xfrm>
+            <a:off x="3040641" y="862419"/>
+            <a:ext cx="3357009" cy="307777"/>
+          </a:xfrm>
+          <a:prstGeom prst="rect">
+            <a:avLst/>
+          </a:prstGeom>
+          <a:noFill/>
+          <a:ln>
+            <a:solidFill>
+              <a:srgbClr val="FF0000"/>
+            </a:solidFill>
+          </a:ln>
+        </p:spPr>
+        <p:txBody>
+          <a:bodyPr wrap="none" rtlCol="0">
+            <a:spAutoFit/>
+          </a:bodyPr>
+          <a:lstStyle/>
+          <a:p>
+            <a:r>
+              <a:rPr lang="en-GB" sz="1400" dirty="0">
+                <a:solidFill>
+                  <a:srgbClr val="FF0000"/>
+                </a:solidFill>
+              </a:rPr>
+              <a:t>Remember to use the </a:t>
+            </a:r>
+            <a:r>
+              <a:rPr lang="en-GB" sz="1400" dirty="0" err="1">
+                <a:solidFill>
+                  <a:srgbClr val="FF0000"/>
+                </a:solidFill>
+              </a:rPr>
+              <a:t>graphicx</a:t>
+            </a:r>
+            <a:r>
+              <a:rPr lang="en-GB" sz="1400" dirty="0">
+                <a:solidFill>
+                  <a:srgbClr val="FF0000"/>
+                </a:solidFill>
+              </a:rPr>
+              <a:t> package</a:t>
+            </a:r>
+          </a:p>
+        </p:txBody>
+      </p:sp>
+      <p:cxnSp>
+        <p:nvCxnSpPr>
+          <p:cNvPr id="8" name="Straight Arrow Connector 7">
+            <a:extLst>
+              <a:ext uri="{FF2B5EF4-FFF2-40B4-BE49-F238E27FC236}">
+                <a16:creationId xmlns:a16="http://schemas.microsoft.com/office/drawing/2014/main" id="{D0065E72-F589-49E1-8CC9-4908DA224E11}"/>
+              </a:ext>
+            </a:extLst>
+          </p:cNvPr>
+          <p:cNvCxnSpPr>
+            <a:stCxn id="5" idx="1"/>
+          </p:cNvCxnSpPr>
+          <p:nvPr/>
+        </p:nvCxnSpPr>
+        <p:spPr>
+          <a:xfrm flipH="1">
+            <a:off x="865762" y="1016308"/>
+            <a:ext cx="2174879" cy="286976"/>
+          </a:xfrm>
+          <a:prstGeom prst="straightConnector1">
+            <a:avLst/>
+          </a:prstGeom>
+          <a:ln>
+            <a:solidFill>
+              <a:srgbClr val="FF0000"/>
+            </a:solidFill>
+            <a:tailEnd type="triangle"/>
+          </a:ln>
+        </p:spPr>
+        <p:style>
+          <a:lnRef idx="2">
+            <a:schemeClr val="accent1"/>
+          </a:lnRef>
+          <a:fillRef idx="0">
+            <a:schemeClr val="accent1"/>
+          </a:fillRef>
+          <a:effectRef idx="1">
+            <a:schemeClr val="accent1"/>
+          </a:effectRef>
+          <a:fontRef idx="minor">
+            <a:schemeClr val="tx1"/>
+          </a:fontRef>
+        </p:style>
+      </p:cxnSp>
     </p:spTree>
     <p:extLst>
       <p:ext uri="{BB962C8B-B14F-4D97-AF65-F5344CB8AC3E}">

</xml_diff>

<commit_message>
Updated powerpoint to match new guidelines
</commit_message>
<xml_diff>
--- a/Writing Theses in Latex Slides.pptx
+++ b/Writing Theses in Latex Slides.pptx
@@ -5,15 +5,15 @@
     <p:sldMasterId id="2147483648" r:id="rId1"/>
   </p:sldMasterIdLst>
   <p:notesMasterIdLst>
-    <p:notesMasterId r:id="rId40"/>
+    <p:notesMasterId r:id="rId41"/>
   </p:notesMasterIdLst>
   <p:handoutMasterIdLst>
-    <p:handoutMasterId r:id="rId41"/>
+    <p:handoutMasterId r:id="rId42"/>
   </p:handoutMasterIdLst>
   <p:sldIdLst>
     <p:sldId id="264" r:id="rId2"/>
     <p:sldId id="267" r:id="rId3"/>
-    <p:sldId id="292" r:id="rId4"/>
+    <p:sldId id="505" r:id="rId4"/>
     <p:sldId id="268" r:id="rId5"/>
     <p:sldId id="295" r:id="rId6"/>
     <p:sldId id="296" r:id="rId7"/>
@@ -42,13 +42,14 @@
     <p:sldId id="319" r:id="rId30"/>
     <p:sldId id="321" r:id="rId31"/>
     <p:sldId id="322" r:id="rId32"/>
-    <p:sldId id="323" r:id="rId33"/>
-    <p:sldId id="326" r:id="rId34"/>
-    <p:sldId id="325" r:id="rId35"/>
-    <p:sldId id="327" r:id="rId36"/>
-    <p:sldId id="330" r:id="rId37"/>
-    <p:sldId id="328" r:id="rId38"/>
-    <p:sldId id="280" r:id="rId39"/>
+    <p:sldId id="506" r:id="rId33"/>
+    <p:sldId id="323" r:id="rId34"/>
+    <p:sldId id="326" r:id="rId35"/>
+    <p:sldId id="325" r:id="rId36"/>
+    <p:sldId id="327" r:id="rId37"/>
+    <p:sldId id="330" r:id="rId38"/>
+    <p:sldId id="328" r:id="rId39"/>
+    <p:sldId id="280" r:id="rId40"/>
   </p:sldIdLst>
   <p:sldSz cx="9144000" cy="6858000" type="screen4x3"/>
   <p:notesSz cx="7099300" cy="10234613"/>
@@ -154,7 +155,7 @@
           <p14:sldIdLst>
             <p14:sldId id="264"/>
             <p14:sldId id="267"/>
-            <p14:sldId id="292"/>
+            <p14:sldId id="505"/>
             <p14:sldId id="268"/>
             <p14:sldId id="295"/>
             <p14:sldId id="296"/>
@@ -183,6 +184,7 @@
             <p14:sldId id="319"/>
             <p14:sldId id="321"/>
             <p14:sldId id="322"/>
+            <p14:sldId id="506"/>
             <p14:sldId id="323"/>
             <p14:sldId id="326"/>
             <p14:sldId id="325"/>
@@ -213,6 +215,14 @@
     </p:ext>
   </p:extLst>
 </p:presentation>
+</file>
+
+<file path=ppt/revisionInfo.xml><?xml version="1.0" encoding="utf-8"?>
+<p1510:revInfo xmlns:a="http://schemas.openxmlformats.org/drawingml/2006/main" xmlns:r="http://schemas.openxmlformats.org/officeDocument/2006/relationships" xmlns:p1510="http://schemas.microsoft.com/office/powerpoint/2015/10/main">
+  <p1510:revLst>
+    <p1510:client id="{A2ABD7AA-AEE6-4F31-9DE7-35E91F1BDF03}" v="9" dt="2024-05-09T13:30:26.374"/>
+  </p1510:revLst>
+</p1510:revInfo>
 </file>
 
 <file path=ppt/changesInfos/changesInfo1.xml><?xml version="1.0" encoding="utf-8"?>
@@ -366,6 +376,368 @@
       </pc:sldChg>
     </pc:docChg>
   </pc:docChgLst>
+  <pc:docChgLst>
+    <pc:chgData name="Cooling, Chris" userId="6dcf99c9-2ba5-410a-8445-0893a3d1421f" providerId="ADAL" clId="{A2ABD7AA-AEE6-4F31-9DE7-35E91F1BDF03}"/>
+    <pc:docChg chg="undo custSel addSld delSld modSld modSection">
+      <pc:chgData name="Cooling, Chris" userId="6dcf99c9-2ba5-410a-8445-0893a3d1421f" providerId="ADAL" clId="{A2ABD7AA-AEE6-4F31-9DE7-35E91F1BDF03}" dt="2024-05-09T13:35:48.905" v="5741" actId="313"/>
+      <pc:docMkLst>
+        <pc:docMk/>
+      </pc:docMkLst>
+      <pc:sldChg chg="del">
+        <pc:chgData name="Cooling, Chris" userId="6dcf99c9-2ba5-410a-8445-0893a3d1421f" providerId="ADAL" clId="{A2ABD7AA-AEE6-4F31-9DE7-35E91F1BDF03}" dt="2024-05-09T09:13:51.763" v="4533" actId="47"/>
+        <pc:sldMkLst>
+          <pc:docMk/>
+          <pc:sldMk cId="3718216746" sldId="292"/>
+        </pc:sldMkLst>
+      </pc:sldChg>
+      <pc:sldChg chg="modSp mod modNotesTx">
+        <pc:chgData name="Cooling, Chris" userId="6dcf99c9-2ba5-410a-8445-0893a3d1421f" providerId="ADAL" clId="{A2ABD7AA-AEE6-4F31-9DE7-35E91F1BDF03}" dt="2024-05-09T08:41:35.252" v="3178" actId="20577"/>
+        <pc:sldMkLst>
+          <pc:docMk/>
+          <pc:sldMk cId="3485628822" sldId="295"/>
+        </pc:sldMkLst>
+        <pc:spChg chg="mod">
+          <ac:chgData name="Cooling, Chris" userId="6dcf99c9-2ba5-410a-8445-0893a3d1421f" providerId="ADAL" clId="{A2ABD7AA-AEE6-4F31-9DE7-35E91F1BDF03}" dt="2024-05-09T08:27:27.587" v="2512" actId="20577"/>
+          <ac:spMkLst>
+            <pc:docMk/>
+            <pc:sldMk cId="3485628822" sldId="295"/>
+            <ac:spMk id="3" creationId="{00000000-0000-0000-0000-000000000000}"/>
+          </ac:spMkLst>
+        </pc:spChg>
+      </pc:sldChg>
+      <pc:sldChg chg="modSp mod modNotesTx">
+        <pc:chgData name="Cooling, Chris" userId="6dcf99c9-2ba5-410a-8445-0893a3d1421f" providerId="ADAL" clId="{A2ABD7AA-AEE6-4F31-9DE7-35E91F1BDF03}" dt="2024-05-09T09:13:19.618" v="4531" actId="20577"/>
+        <pc:sldMkLst>
+          <pc:docMk/>
+          <pc:sldMk cId="2191292543" sldId="296"/>
+        </pc:sldMkLst>
+        <pc:spChg chg="mod">
+          <ac:chgData name="Cooling, Chris" userId="6dcf99c9-2ba5-410a-8445-0893a3d1421f" providerId="ADAL" clId="{A2ABD7AA-AEE6-4F31-9DE7-35E91F1BDF03}" dt="2024-05-09T09:13:19.618" v="4531" actId="20577"/>
+          <ac:spMkLst>
+            <pc:docMk/>
+            <pc:sldMk cId="2191292543" sldId="296"/>
+            <ac:spMk id="3" creationId="{00000000-0000-0000-0000-000000000000}"/>
+          </ac:spMkLst>
+        </pc:spChg>
+      </pc:sldChg>
+      <pc:sldChg chg="modSp mod">
+        <pc:chgData name="Cooling, Chris" userId="6dcf99c9-2ba5-410a-8445-0893a3d1421f" providerId="ADAL" clId="{A2ABD7AA-AEE6-4F31-9DE7-35E91F1BDF03}" dt="2024-05-09T08:51:03.197" v="3474" actId="20577"/>
+        <pc:sldMkLst>
+          <pc:docMk/>
+          <pc:sldMk cId="2812092125" sldId="297"/>
+        </pc:sldMkLst>
+        <pc:spChg chg="mod">
+          <ac:chgData name="Cooling, Chris" userId="6dcf99c9-2ba5-410a-8445-0893a3d1421f" providerId="ADAL" clId="{A2ABD7AA-AEE6-4F31-9DE7-35E91F1BDF03}" dt="2024-05-09T08:51:03.197" v="3474" actId="20577"/>
+          <ac:spMkLst>
+            <pc:docMk/>
+            <pc:sldMk cId="2812092125" sldId="297"/>
+            <ac:spMk id="3" creationId="{00000000-0000-0000-0000-000000000000}"/>
+          </ac:spMkLst>
+        </pc:spChg>
+      </pc:sldChg>
+      <pc:sldChg chg="addSp delSp modSp mod modNotesTx">
+        <pc:chgData name="Cooling, Chris" userId="6dcf99c9-2ba5-410a-8445-0893a3d1421f" providerId="ADAL" clId="{A2ABD7AA-AEE6-4F31-9DE7-35E91F1BDF03}" dt="2024-05-09T09:12:42.212" v="4455" actId="1076"/>
+        <pc:sldMkLst>
+          <pc:docMk/>
+          <pc:sldMk cId="220242497" sldId="298"/>
+        </pc:sldMkLst>
+        <pc:spChg chg="mod">
+          <ac:chgData name="Cooling, Chris" userId="6dcf99c9-2ba5-410a-8445-0893a3d1421f" providerId="ADAL" clId="{A2ABD7AA-AEE6-4F31-9DE7-35E91F1BDF03}" dt="2024-05-09T09:12:07.190" v="4450" actId="20577"/>
+          <ac:spMkLst>
+            <pc:docMk/>
+            <pc:sldMk cId="220242497" sldId="298"/>
+            <ac:spMk id="3" creationId="{00000000-0000-0000-0000-000000000000}"/>
+          </ac:spMkLst>
+        </pc:spChg>
+        <pc:spChg chg="add mod">
+          <ac:chgData name="Cooling, Chris" userId="6dcf99c9-2ba5-410a-8445-0893a3d1421f" providerId="ADAL" clId="{A2ABD7AA-AEE6-4F31-9DE7-35E91F1BDF03}" dt="2024-05-09T09:12:32.118" v="4453" actId="208"/>
+          <ac:spMkLst>
+            <pc:docMk/>
+            <pc:sldMk cId="220242497" sldId="298"/>
+            <ac:spMk id="8" creationId="{3724276E-B819-4868-EC9E-2A45BB89A012}"/>
+          </ac:spMkLst>
+        </pc:spChg>
+        <pc:spChg chg="add mod">
+          <ac:chgData name="Cooling, Chris" userId="6dcf99c9-2ba5-410a-8445-0893a3d1421f" providerId="ADAL" clId="{A2ABD7AA-AEE6-4F31-9DE7-35E91F1BDF03}" dt="2024-05-09T09:12:42.212" v="4455" actId="1076"/>
+          <ac:spMkLst>
+            <pc:docMk/>
+            <pc:sldMk cId="220242497" sldId="298"/>
+            <ac:spMk id="9" creationId="{943F2867-2643-29F9-471E-0E3D1AA4A23F}"/>
+          </ac:spMkLst>
+        </pc:spChg>
+        <pc:picChg chg="add mod">
+          <ac:chgData name="Cooling, Chris" userId="6dcf99c9-2ba5-410a-8445-0893a3d1421f" providerId="ADAL" clId="{A2ABD7AA-AEE6-4F31-9DE7-35E91F1BDF03}" dt="2024-05-09T08:59:01.531" v="4078" actId="14100"/>
+          <ac:picMkLst>
+            <pc:docMk/>
+            <pc:sldMk cId="220242497" sldId="298"/>
+            <ac:picMk id="7" creationId="{D0824804-30E4-6C48-5EFC-18FC7C385441}"/>
+          </ac:picMkLst>
+        </pc:picChg>
+        <pc:picChg chg="del">
+          <ac:chgData name="Cooling, Chris" userId="6dcf99c9-2ba5-410a-8445-0893a3d1421f" providerId="ADAL" clId="{A2ABD7AA-AEE6-4F31-9DE7-35E91F1BDF03}" dt="2024-05-09T08:53:22.862" v="3476" actId="478"/>
+          <ac:picMkLst>
+            <pc:docMk/>
+            <pc:sldMk cId="220242497" sldId="298"/>
+            <ac:picMk id="10" creationId="{7EA1B5FB-280E-44CE-A03E-74EB3C8ABE9D}"/>
+          </ac:picMkLst>
+        </pc:picChg>
+      </pc:sldChg>
+      <pc:sldChg chg="modSp mod modNotesTx">
+        <pc:chgData name="Cooling, Chris" userId="6dcf99c9-2ba5-410a-8445-0893a3d1421f" providerId="ADAL" clId="{A2ABD7AA-AEE6-4F31-9DE7-35E91F1BDF03}" dt="2024-05-09T09:08:03.986" v="4394" actId="20577"/>
+        <pc:sldMkLst>
+          <pc:docMk/>
+          <pc:sldMk cId="2866101635" sldId="301"/>
+        </pc:sldMkLst>
+        <pc:spChg chg="mod">
+          <ac:chgData name="Cooling, Chris" userId="6dcf99c9-2ba5-410a-8445-0893a3d1421f" providerId="ADAL" clId="{A2ABD7AA-AEE6-4F31-9DE7-35E91F1BDF03}" dt="2024-05-09T09:07:48.513" v="4377" actId="20577"/>
+          <ac:spMkLst>
+            <pc:docMk/>
+            <pc:sldMk cId="2866101635" sldId="301"/>
+            <ac:spMk id="3" creationId="{00000000-0000-0000-0000-000000000000}"/>
+          </ac:spMkLst>
+        </pc:spChg>
+      </pc:sldChg>
+      <pc:sldChg chg="modSp mod">
+        <pc:chgData name="Cooling, Chris" userId="6dcf99c9-2ba5-410a-8445-0893a3d1421f" providerId="ADAL" clId="{A2ABD7AA-AEE6-4F31-9DE7-35E91F1BDF03}" dt="2024-05-09T09:09:35.130" v="4432" actId="20577"/>
+        <pc:sldMkLst>
+          <pc:docMk/>
+          <pc:sldMk cId="2836296210" sldId="303"/>
+        </pc:sldMkLst>
+        <pc:spChg chg="mod">
+          <ac:chgData name="Cooling, Chris" userId="6dcf99c9-2ba5-410a-8445-0893a3d1421f" providerId="ADAL" clId="{A2ABD7AA-AEE6-4F31-9DE7-35E91F1BDF03}" dt="2024-05-09T09:09:35.130" v="4432" actId="20577"/>
+          <ac:spMkLst>
+            <pc:docMk/>
+            <pc:sldMk cId="2836296210" sldId="303"/>
+            <ac:spMk id="7" creationId="{A4668B92-0976-4E36-A913-C47498FEE667}"/>
+          </ac:spMkLst>
+        </pc:spChg>
+      </pc:sldChg>
+      <pc:sldChg chg="addSp modSp mod">
+        <pc:chgData name="Cooling, Chris" userId="6dcf99c9-2ba5-410a-8445-0893a3d1421f" providerId="ADAL" clId="{A2ABD7AA-AEE6-4F31-9DE7-35E91F1BDF03}" dt="2024-05-09T12:34:13.383" v="4553" actId="20577"/>
+        <pc:sldMkLst>
+          <pc:docMk/>
+          <pc:sldMk cId="1382739116" sldId="304"/>
+        </pc:sldMkLst>
+        <pc:spChg chg="mod">
+          <ac:chgData name="Cooling, Chris" userId="6dcf99c9-2ba5-410a-8445-0893a3d1421f" providerId="ADAL" clId="{A2ABD7AA-AEE6-4F31-9DE7-35E91F1BDF03}" dt="2024-05-09T12:34:13.383" v="4553" actId="20577"/>
+          <ac:spMkLst>
+            <pc:docMk/>
+            <pc:sldMk cId="1382739116" sldId="304"/>
+            <ac:spMk id="3" creationId="{00000000-0000-0000-0000-000000000000}"/>
+          </ac:spMkLst>
+        </pc:spChg>
+        <pc:spChg chg="add mod">
+          <ac:chgData name="Cooling, Chris" userId="6dcf99c9-2ba5-410a-8445-0893a3d1421f" providerId="ADAL" clId="{A2ABD7AA-AEE6-4F31-9DE7-35E91F1BDF03}" dt="2024-05-09T12:33:53.480" v="4551"/>
+          <ac:spMkLst>
+            <pc:docMk/>
+            <pc:sldMk cId="1382739116" sldId="304"/>
+            <ac:spMk id="5" creationId="{42AE8C1A-2619-533E-BB7D-8F150900E246}"/>
+          </ac:spMkLst>
+        </pc:spChg>
+        <pc:cxnChg chg="add mod">
+          <ac:chgData name="Cooling, Chris" userId="6dcf99c9-2ba5-410a-8445-0893a3d1421f" providerId="ADAL" clId="{A2ABD7AA-AEE6-4F31-9DE7-35E91F1BDF03}" dt="2024-05-09T12:33:53.480" v="4551"/>
+          <ac:cxnSpMkLst>
+            <pc:docMk/>
+            <pc:sldMk cId="1382739116" sldId="304"/>
+            <ac:cxnSpMk id="8" creationId="{C6DF1F29-5CE5-6689-BB9D-DD214FE5D226}"/>
+          </ac:cxnSpMkLst>
+        </pc:cxnChg>
+      </pc:sldChg>
+      <pc:sldChg chg="modSp mod modNotesTx">
+        <pc:chgData name="Cooling, Chris" userId="6dcf99c9-2ba5-410a-8445-0893a3d1421f" providerId="ADAL" clId="{A2ABD7AA-AEE6-4F31-9DE7-35E91F1BDF03}" dt="2024-05-09T09:14:39.697" v="4550" actId="20577"/>
+        <pc:sldMkLst>
+          <pc:docMk/>
+          <pc:sldMk cId="3095168859" sldId="307"/>
+        </pc:sldMkLst>
+        <pc:spChg chg="mod">
+          <ac:chgData name="Cooling, Chris" userId="6dcf99c9-2ba5-410a-8445-0893a3d1421f" providerId="ADAL" clId="{A2ABD7AA-AEE6-4F31-9DE7-35E91F1BDF03}" dt="2024-05-08T14:26:46.868" v="11" actId="20577"/>
+          <ac:spMkLst>
+            <pc:docMk/>
+            <pc:sldMk cId="3095168859" sldId="307"/>
+            <ac:spMk id="2" creationId="{00000000-0000-0000-0000-000000000000}"/>
+          </ac:spMkLst>
+        </pc:spChg>
+        <pc:spChg chg="mod">
+          <ac:chgData name="Cooling, Chris" userId="6dcf99c9-2ba5-410a-8445-0893a3d1421f" providerId="ADAL" clId="{A2ABD7AA-AEE6-4F31-9DE7-35E91F1BDF03}" dt="2024-05-09T09:14:39.697" v="4550" actId="20577"/>
+          <ac:spMkLst>
+            <pc:docMk/>
+            <pc:sldMk cId="3095168859" sldId="307"/>
+            <ac:spMk id="7" creationId="{A4668B92-0976-4E36-A913-C47498FEE667}"/>
+          </ac:spMkLst>
+        </pc:spChg>
+      </pc:sldChg>
+      <pc:sldChg chg="addSp delSp modSp mod modNotesTx">
+        <pc:chgData name="Cooling, Chris" userId="6dcf99c9-2ba5-410a-8445-0893a3d1421f" providerId="ADAL" clId="{A2ABD7AA-AEE6-4F31-9DE7-35E91F1BDF03}" dt="2024-05-08T15:02:51.830" v="2421" actId="20577"/>
+        <pc:sldMkLst>
+          <pc:docMk/>
+          <pc:sldMk cId="1292264961" sldId="308"/>
+        </pc:sldMkLst>
+        <pc:spChg chg="mod">
+          <ac:chgData name="Cooling, Chris" userId="6dcf99c9-2ba5-410a-8445-0893a3d1421f" providerId="ADAL" clId="{A2ABD7AA-AEE6-4F31-9DE7-35E91F1BDF03}" dt="2024-05-08T14:55:20.533" v="1650" actId="20577"/>
+          <ac:spMkLst>
+            <pc:docMk/>
+            <pc:sldMk cId="1292264961" sldId="308"/>
+            <ac:spMk id="2" creationId="{00000000-0000-0000-0000-000000000000}"/>
+          </ac:spMkLst>
+        </pc:spChg>
+        <pc:spChg chg="mod">
+          <ac:chgData name="Cooling, Chris" userId="6dcf99c9-2ba5-410a-8445-0893a3d1421f" providerId="ADAL" clId="{A2ABD7AA-AEE6-4F31-9DE7-35E91F1BDF03}" dt="2024-05-08T14:56:49.727" v="1661" actId="20577"/>
+          <ac:spMkLst>
+            <pc:docMk/>
+            <pc:sldMk cId="1292264961" sldId="308"/>
+            <ac:spMk id="3" creationId="{00000000-0000-0000-0000-000000000000}"/>
+          </ac:spMkLst>
+        </pc:spChg>
+        <pc:picChg chg="del">
+          <ac:chgData name="Cooling, Chris" userId="6dcf99c9-2ba5-410a-8445-0893a3d1421f" providerId="ADAL" clId="{A2ABD7AA-AEE6-4F31-9DE7-35E91F1BDF03}" dt="2024-05-08T14:56:10.592" v="1658" actId="478"/>
+          <ac:picMkLst>
+            <pc:docMk/>
+            <pc:sldMk cId="1292264961" sldId="308"/>
+            <ac:picMk id="6" creationId="{AC6D7D42-E3E3-477D-9DD7-F2123D77031D}"/>
+          </ac:picMkLst>
+        </pc:picChg>
+        <pc:picChg chg="add mod">
+          <ac:chgData name="Cooling, Chris" userId="6dcf99c9-2ba5-410a-8445-0893a3d1421f" providerId="ADAL" clId="{A2ABD7AA-AEE6-4F31-9DE7-35E91F1BDF03}" dt="2024-05-08T14:57:27.822" v="1666" actId="1076"/>
+          <ac:picMkLst>
+            <pc:docMk/>
+            <pc:sldMk cId="1292264961" sldId="308"/>
+            <ac:picMk id="8" creationId="{C037CB9D-6AEB-6676-B9BE-0F8FADAF4071}"/>
+          </ac:picMkLst>
+        </pc:picChg>
+      </pc:sldChg>
+      <pc:sldChg chg="modSp mod modNotesTx">
+        <pc:chgData name="Cooling, Chris" userId="6dcf99c9-2ba5-410a-8445-0893a3d1421f" providerId="ADAL" clId="{A2ABD7AA-AEE6-4F31-9DE7-35E91F1BDF03}" dt="2024-05-09T12:37:45.444" v="4889" actId="20577"/>
+        <pc:sldMkLst>
+          <pc:docMk/>
+          <pc:sldMk cId="594696012" sldId="319"/>
+        </pc:sldMkLst>
+        <pc:spChg chg="mod">
+          <ac:chgData name="Cooling, Chris" userId="6dcf99c9-2ba5-410a-8445-0893a3d1421f" providerId="ADAL" clId="{A2ABD7AA-AEE6-4F31-9DE7-35E91F1BDF03}" dt="2024-05-09T12:37:17.252" v="4798" actId="20577"/>
+          <ac:spMkLst>
+            <pc:docMk/>
+            <pc:sldMk cId="594696012" sldId="319"/>
+            <ac:spMk id="7" creationId="{A4668B92-0976-4E36-A913-C47498FEE667}"/>
+          </ac:spMkLst>
+        </pc:spChg>
+      </pc:sldChg>
+      <pc:sldChg chg="addSp delSp modSp mod">
+        <pc:chgData name="Cooling, Chris" userId="6dcf99c9-2ba5-410a-8445-0893a3d1421f" providerId="ADAL" clId="{A2ABD7AA-AEE6-4F31-9DE7-35E91F1BDF03}" dt="2024-05-09T13:27:58.642" v="5010" actId="478"/>
+        <pc:sldMkLst>
+          <pc:docMk/>
+          <pc:sldMk cId="687175056" sldId="322"/>
+        </pc:sldMkLst>
+        <pc:spChg chg="add del mod">
+          <ac:chgData name="Cooling, Chris" userId="6dcf99c9-2ba5-410a-8445-0893a3d1421f" providerId="ADAL" clId="{A2ABD7AA-AEE6-4F31-9DE7-35E91F1BDF03}" dt="2024-05-09T13:27:53.931" v="5009" actId="21"/>
+          <ac:spMkLst>
+            <pc:docMk/>
+            <pc:sldMk cId="687175056" sldId="322"/>
+            <ac:spMk id="6" creationId="{BD51EB6C-9A9A-4D69-226A-685D23842974}"/>
+          </ac:spMkLst>
+        </pc:spChg>
+        <pc:spChg chg="add del mod">
+          <ac:chgData name="Cooling, Chris" userId="6dcf99c9-2ba5-410a-8445-0893a3d1421f" providerId="ADAL" clId="{A2ABD7AA-AEE6-4F31-9DE7-35E91F1BDF03}" dt="2024-05-09T13:27:58.642" v="5010" actId="478"/>
+          <ac:spMkLst>
+            <pc:docMk/>
+            <pc:sldMk cId="687175056" sldId="322"/>
+            <ac:spMk id="9" creationId="{0179C047-C192-9CE5-D925-49A1E1EE7926}"/>
+          </ac:spMkLst>
+        </pc:spChg>
+      </pc:sldChg>
+      <pc:sldChg chg="add del">
+        <pc:chgData name="Cooling, Chris" userId="6dcf99c9-2ba5-410a-8445-0893a3d1421f" providerId="ADAL" clId="{A2ABD7AA-AEE6-4F31-9DE7-35E91F1BDF03}" dt="2024-05-08T14:53:32.800" v="1623" actId="47"/>
+        <pc:sldMkLst>
+          <pc:docMk/>
+          <pc:sldMk cId="2361988076" sldId="333"/>
+        </pc:sldMkLst>
+      </pc:sldChg>
+      <pc:sldChg chg="add">
+        <pc:chgData name="Cooling, Chris" userId="6dcf99c9-2ba5-410a-8445-0893a3d1421f" providerId="ADAL" clId="{A2ABD7AA-AEE6-4F31-9DE7-35E91F1BDF03}" dt="2024-05-09T09:13:49.110" v="4532"/>
+        <pc:sldMkLst>
+          <pc:docMk/>
+          <pc:sldMk cId="634929309" sldId="505"/>
+        </pc:sldMkLst>
+      </pc:sldChg>
+      <pc:sldChg chg="addSp delSp modSp add mod modNotesTx">
+        <pc:chgData name="Cooling, Chris" userId="6dcf99c9-2ba5-410a-8445-0893a3d1421f" providerId="ADAL" clId="{A2ABD7AA-AEE6-4F31-9DE7-35E91F1BDF03}" dt="2024-05-09T13:35:48.905" v="5741" actId="313"/>
+        <pc:sldMkLst>
+          <pc:docMk/>
+          <pc:sldMk cId="1363280479" sldId="506"/>
+        </pc:sldMkLst>
+        <pc:spChg chg="mod">
+          <ac:chgData name="Cooling, Chris" userId="6dcf99c9-2ba5-410a-8445-0893a3d1421f" providerId="ADAL" clId="{A2ABD7AA-AEE6-4F31-9DE7-35E91F1BDF03}" dt="2024-05-09T13:25:29.229" v="4941" actId="20577"/>
+          <ac:spMkLst>
+            <pc:docMk/>
+            <pc:sldMk cId="1363280479" sldId="506"/>
+            <ac:spMk id="2" creationId="{00000000-0000-0000-0000-000000000000}"/>
+          </ac:spMkLst>
+        </pc:spChg>
+        <pc:spChg chg="mod">
+          <ac:chgData name="Cooling, Chris" userId="6dcf99c9-2ba5-410a-8445-0893a3d1421f" providerId="ADAL" clId="{A2ABD7AA-AEE6-4F31-9DE7-35E91F1BDF03}" dt="2024-05-09T13:30:10.529" v="5111" actId="207"/>
+          <ac:spMkLst>
+            <pc:docMk/>
+            <pc:sldMk cId="1363280479" sldId="506"/>
+            <ac:spMk id="3" creationId="{603AC519-287E-431C-AC14-B4D6EEF203DB}"/>
+          </ac:spMkLst>
+        </pc:spChg>
+        <pc:spChg chg="add mod">
+          <ac:chgData name="Cooling, Chris" userId="6dcf99c9-2ba5-410a-8445-0893a3d1421f" providerId="ADAL" clId="{A2ABD7AA-AEE6-4F31-9DE7-35E91F1BDF03}" dt="2024-05-09T13:28:49.904" v="5097" actId="255"/>
+          <ac:spMkLst>
+            <pc:docMk/>
+            <pc:sldMk cId="1363280479" sldId="506"/>
+            <ac:spMk id="6" creationId="{BD51EB6C-9A9A-4D69-226A-685D23842974}"/>
+          </ac:spMkLst>
+        </pc:spChg>
+        <pc:spChg chg="mod">
+          <ac:chgData name="Cooling, Chris" userId="6dcf99c9-2ba5-410a-8445-0893a3d1421f" providerId="ADAL" clId="{A2ABD7AA-AEE6-4F31-9DE7-35E91F1BDF03}" dt="2024-05-09T13:32:22.596" v="5151" actId="208"/>
+          <ac:spMkLst>
+            <pc:docMk/>
+            <pc:sldMk cId="1363280479" sldId="506"/>
+            <ac:spMk id="9" creationId="{EA243498-31B9-A912-0F4D-1CCDBC3D9A07}"/>
+          </ac:spMkLst>
+        </pc:spChg>
+        <pc:spChg chg="mod">
+          <ac:chgData name="Cooling, Chris" userId="6dcf99c9-2ba5-410a-8445-0893a3d1421f" providerId="ADAL" clId="{A2ABD7AA-AEE6-4F31-9DE7-35E91F1BDF03}" dt="2024-05-09T13:32:30.406" v="5152" actId="207"/>
+          <ac:spMkLst>
+            <pc:docMk/>
+            <pc:sldMk cId="1363280479" sldId="506"/>
+            <ac:spMk id="10" creationId="{36DD14B0-4FF1-60E2-AA50-1CA33783667B}"/>
+          </ac:spMkLst>
+        </pc:spChg>
+        <pc:grpChg chg="mod">
+          <ac:chgData name="Cooling, Chris" userId="6dcf99c9-2ba5-410a-8445-0893a3d1421f" providerId="ADAL" clId="{A2ABD7AA-AEE6-4F31-9DE7-35E91F1BDF03}" dt="2024-05-09T13:29:39.908" v="5107" actId="1076"/>
+          <ac:grpSpMkLst>
+            <pc:docMk/>
+            <pc:sldMk cId="1363280479" sldId="506"/>
+            <ac:grpSpMk id="5" creationId="{F5455341-BD23-481A-BFA7-330F1E8E3283}"/>
+          </ac:grpSpMkLst>
+        </pc:grpChg>
+        <pc:grpChg chg="add mod">
+          <ac:chgData name="Cooling, Chris" userId="6dcf99c9-2ba5-410a-8445-0893a3d1421f" providerId="ADAL" clId="{A2ABD7AA-AEE6-4F31-9DE7-35E91F1BDF03}" dt="2024-05-09T13:31:18.831" v="5140" actId="14100"/>
+          <ac:grpSpMkLst>
+            <pc:docMk/>
+            <pc:sldMk cId="1363280479" sldId="506"/>
+            <ac:grpSpMk id="8" creationId="{FB68D34C-A625-BE8F-F428-C0A9BDE333D6}"/>
+          </ac:grpSpMkLst>
+        </pc:grpChg>
+        <pc:picChg chg="del">
+          <ac:chgData name="Cooling, Chris" userId="6dcf99c9-2ba5-410a-8445-0893a3d1421f" providerId="ADAL" clId="{A2ABD7AA-AEE6-4F31-9DE7-35E91F1BDF03}" dt="2024-05-09T13:28:19.464" v="5055" actId="478"/>
+          <ac:picMkLst>
+            <pc:docMk/>
+            <pc:sldMk cId="1363280479" sldId="506"/>
+            <ac:picMk id="7" creationId="{4059D58D-CD17-7022-9AFB-6DCFE1A5FDF2}"/>
+          </ac:picMkLst>
+        </pc:picChg>
+        <pc:cxnChg chg="del">
+          <ac:chgData name="Cooling, Chris" userId="6dcf99c9-2ba5-410a-8445-0893a3d1421f" providerId="ADAL" clId="{A2ABD7AA-AEE6-4F31-9DE7-35E91F1BDF03}" dt="2024-05-09T13:26:33.076" v="4952" actId="478"/>
+          <ac:cxnSpMkLst>
+            <pc:docMk/>
+            <pc:sldMk cId="1363280479" sldId="506"/>
+            <ac:cxnSpMk id="11" creationId="{00000000-0000-0000-0000-000000000000}"/>
+          </ac:cxnSpMkLst>
+        </pc:cxnChg>
+      </pc:sldChg>
+    </pc:docChg>
+  </pc:docChgLst>
 </pc:chgInfo>
 </file>
 
@@ -618,7 +990,7 @@
           <a:p>
             <a:fld id="{88EB714B-C3CC-4216-88C1-02913905B1CF}" type="datetimeFigureOut">
               <a:rPr lang="en-GB" smtClean="0"/>
-              <a:t>27/03/2024</a:t>
+              <a:t>07/05/2024</a:t>
             </a:fld>
             <a:endParaRPr lang="en-GB"/>
           </a:p>
@@ -1207,16 +1579,7 @@
           <a:p>
             <a:r>
               <a:rPr lang="en-GB" dirty="0"/>
-              <a:t>You may want to use a larger line spacing for your thesis. This makes it easier for an examiner to annotate a printed copy of your thesis – and making life easier for them is not a bad thing.</a:t>
-            </a:r>
-          </a:p>
-          <a:p>
-            <a:endParaRPr lang="en-GB" dirty="0"/>
-          </a:p>
-          <a:p>
-            <a:r>
-              <a:rPr lang="en-GB" dirty="0"/>
-              <a:t>This can be achieved using the </a:t>
+              <a:t>You are required to use 1.5 times or 2 times line spacing. This can be achieved using the </a:t>
             </a:r>
             <a:r>
               <a:rPr lang="en-GB" dirty="0" err="1"/>
@@ -1258,7 +1621,7 @@
             </a:r>
             <a:r>
               <a:rPr lang="en-GB" dirty="0"/>
-              <a:t> environment which allows text in a selected part of the main document to be forced to be single-line spaced. This can be used for extended quotations that the examiner shouldn’t need to annotate.</a:t>
+              <a:t> environment which allows text in a selected part of the main document to be forced to be single-line spaced. This can be used for block quotations.</a:t>
             </a:r>
           </a:p>
         </p:txBody>
@@ -1783,7 +2146,7 @@
           <a:p>
             <a:r>
               <a:rPr lang="en-GB" dirty="0"/>
-              <a:t>There are several short sections you might want to include at the start of your thesis.</a:t>
+              <a:t>The ICR requires you to include statements in your thesis before your abstract in certain conditions. </a:t>
             </a:r>
           </a:p>
           <a:p>
@@ -1792,7 +2155,7 @@
           <a:p>
             <a:r>
               <a:rPr lang="en-GB" dirty="0"/>
-              <a:t>An abstract tells the story of your thesis in a few hundred words.</a:t>
+              <a:t>If you have submitted work that was produced as part of a collaboration you should include a statement stating what work you personally completed and what was completed by collaborators.</a:t>
             </a:r>
           </a:p>
           <a:p>
@@ -1801,17 +2164,40 @@
           <a:p>
             <a:r>
               <a:rPr lang="en-GB" dirty="0"/>
-              <a:t>A statement of originality may be required to assert the work is your own (or otherwise properly referenced).</a:t>
-            </a:r>
-          </a:p>
-          <a:p>
+              <a:t>If your thesis contains </a:t>
+            </a:r>
+            <a:r>
+              <a:rPr lang="en-GB" sz="1200" dirty="0"/>
+              <a:t>work previously submitted for another award, then this should be described in another statement. You should still be aware of rules regarding self-plagiarism that ICR may have (this is not my area of expertise so you should check this.</a:t>
+            </a:r>
+          </a:p>
+          <a:p>
+            <a:endParaRPr lang="en-GB" sz="1200" dirty="0"/>
+          </a:p>
+          <a:p>
+            <a:r>
+              <a:rPr lang="en-GB" sz="1200" dirty="0"/>
+              <a:t>If your experimental work has been restricted by Covid, you should include a statement describing this impact.</a:t>
+            </a:r>
+          </a:p>
+          <a:p>
+            <a:endParaRPr lang="en-GB" sz="1200" dirty="0"/>
+          </a:p>
+          <a:p>
+            <a:r>
+              <a:rPr lang="en-GB" sz="1200" dirty="0"/>
+              <a:t>If you think one of these conditions applies to you, I advise talking to your supervisor.</a:t>
+            </a:r>
+          </a:p>
+          <a:p>
+            <a:endParaRPr lang="en-GB" sz="1200" dirty="0"/>
+          </a:p>
+          <a:p>
+            <a:r>
+              <a:rPr lang="en-GB" sz="1200" dirty="0"/>
+              <a:t>Each of these sections should be two pages or less, and signed by you and your supervisor. These sections should be followed by your abstract.</a:t>
+            </a:r>
             <a:endParaRPr lang="en-GB" dirty="0"/>
-          </a:p>
-          <a:p>
-            <a:r>
-              <a:rPr lang="en-GB" dirty="0"/>
-              <a:t>A copyright declaration might be useful if others will see your thesis. It tells them what they might do with it. Perhaps select a Creative Commons licence: https://creativecommons.org/share-your-work/</a:t>
-            </a:r>
           </a:p>
         </p:txBody>
       </p:sp>
@@ -1897,7 +2283,7 @@
           <a:p>
             <a:r>
               <a:rPr lang="en-GB" dirty="0"/>
-              <a:t>Here we insert the Abstract, Statement of Originality, Copyright Statement and Abstract. The easiest way to do this is using the chapter command, which gives each a nice heading and puts it on its own page. The “*” after the chapter command tells LaTeX not to number this chapter or include it in tables of contents.</a:t>
+              <a:t>It might look good to create these statements on their own page with a big title. We can do this using the \chapter* command, which will start a new page and create a large title with a lot of whitespace. The chapter will not be numbered and will not appear in the contents. The first \chapter command without the asterisk will be numbered “Chapter 1”. \chapter* is also a good choice for introducing your Abstract.</a:t>
             </a:r>
           </a:p>
           <a:p>
@@ -1906,7 +2292,24 @@
           <a:p>
             <a:r>
               <a:rPr lang="en-GB" dirty="0"/>
-              <a:t>Overleaf Example: https://www.overleaf.com/read/whzwtbfffwjz</a:t>
+              <a:t>We can again use \</a:t>
+            </a:r>
+            <a:r>
+              <a:rPr lang="en-GB" dirty="0" err="1"/>
+              <a:t>includegraphics</a:t>
+            </a:r>
+            <a:r>
+              <a:rPr lang="en-GB" dirty="0"/>
+              <a:t> to insert signatures – you will need to include these in your project (e.g. upload them to Overleaf).</a:t>
+            </a:r>
+          </a:p>
+          <a:p>
+            <a:endParaRPr lang="en-GB" dirty="0"/>
+          </a:p>
+          <a:p>
+            <a:r>
+              <a:rPr lang="en-GB" dirty="0"/>
+              <a:t>Overleaf Example: https://www.overleaf.com/read/hjxsrdwtdbmx#2f0a66</a:t>
             </a:r>
           </a:p>
           <a:p>
@@ -3708,6 +4111,15 @@
           <a:p>
             <a:r>
               <a:rPr lang="en-GB" dirty="0"/>
+              <a:t>The University of London does not specify a format for bibliographies and citations. They do, however, say it is normal for the bibliography to go at the end of PhD theses.</a:t>
+            </a:r>
+          </a:p>
+          <a:p>
+            <a:endParaRPr lang="en-GB" dirty="0"/>
+          </a:p>
+          <a:p>
+            <a:r>
+              <a:rPr lang="en-GB" dirty="0"/>
               <a:t>Your thesis is likely to have dozens or hundreds of references and so a more advanced way to deal with your references is preferable. There are many ways to deal with your references and many ways to personalise your citations. We’re going to run through one way to achieve a streamlined approach to referencing and introduce a few options you might want to consider for personalising your references.</a:t>
             </a:r>
             <a:br>
@@ -3811,38 +4223,7 @@
           <a:bodyPr/>
           <a:lstStyle/>
           <a:p>
-            <a:r>
-              <a:rPr lang="en-GB" dirty="0"/>
-              <a:t>Overleaf is the online environment which we’ll be using to create and compile your LaTeX documents. College has a subscription to it so, if you sign up with your college email address, you can get the pro-version. You should have already made an account as indicated in the pre-course instructions.</a:t>
-            </a:r>
-            <a:br>
-              <a:rPr lang="en-GB" dirty="0"/>
-            </a:br>
-            <a:br>
-              <a:rPr lang="en-GB" dirty="0"/>
-            </a:br>
-            <a:r>
-              <a:rPr lang="en-GB" dirty="0"/>
-              <a:t>Overleaf is cross-platform (in the sense it will work on Windows, Mac, Linux, etc). It’s already complete in the sense that all the packages you might need are already installed. It’s easy to use, including auto-complete and a visual indication of where errors have occurred in compilation. It has the ability for collaborative working and allows synchronisation with Dropbox and </a:t>
-            </a:r>
-            <a:r>
-              <a:rPr lang="en-GB" dirty="0" err="1"/>
-              <a:t>github</a:t>
-            </a:r>
-            <a:r>
-              <a:rPr lang="en-GB" dirty="0"/>
-              <a:t> which can allow you carry on working on your documents offline using an offline editor. Overleaf also has an integrated “review system” which might allow your supervisor to review your thesis in the same place that you’re writing it, saving a lot of flipping between documents.</a:t>
-            </a:r>
-            <a:br>
-              <a:rPr lang="en-GB" dirty="0"/>
-            </a:br>
-            <a:br>
-              <a:rPr lang="en-GB" dirty="0"/>
-            </a:br>
-            <a:r>
-              <a:rPr lang="en-GB" dirty="0"/>
-              <a:t>However, the editor itself is only available with an internet connection. Your files are also stored online. If you’re dealing with commercially sensitive data or sensitive data such as patient records, you may not be able to use Overleaf if there are restrictions on where you can store data.</a:t>
-            </a:r>
+            <a:endParaRPr lang="en-GB" dirty="0"/>
           </a:p>
         </p:txBody>
       </p:sp>
@@ -3872,7 +4253,7 @@
     </p:spTree>
     <p:extLst>
       <p:ext uri="{BB962C8B-B14F-4D97-AF65-F5344CB8AC3E}">
-        <p14:creationId xmlns:p14="http://schemas.microsoft.com/office/powerpoint/2010/main" val="1864279570"/>
+        <p14:creationId xmlns:p14="http://schemas.microsoft.com/office/powerpoint/2010/main" val="251121805"/>
       </p:ext>
     </p:extLst>
   </p:cSld>
@@ -4232,50 +4613,50 @@
           <a:p>
             <a:r>
               <a:rPr lang="en-GB" dirty="0"/>
-              <a:t>There are a number of different ways you can personalise your references. Here we’ll look at different options you can use with the </a:t>
+              <a:t>If you’re writing an MD(Res) thesis, the guidance notes say you may want to have a bibliography at the end of each chapter. We can achieve this using the </a:t>
             </a:r>
             <a:r>
               <a:rPr lang="en-GB" dirty="0" err="1"/>
-              <a:t>natbib</a:t>
-            </a:r>
-            <a:r>
-              <a:rPr lang="en-GB" dirty="0"/>
-              <a:t> package which will alter how your reference appear.</a:t>
-            </a:r>
-            <a:br>
-              <a:rPr lang="en-GB" dirty="0"/>
-            </a:br>
-            <a:br>
-              <a:rPr lang="en-GB" dirty="0"/>
-            </a:br>
-            <a:r>
-              <a:rPr lang="en-GB" dirty="0"/>
-              <a:t>Using the “numbers” option will cause you to use numerical references instead of textual references. “round” will cause your references to use round brackets instead of square brackets. “super” causes your citations to appear in super-script, similar to a footnote.</a:t>
+              <a:t>chapterbib</a:t>
+            </a:r>
+            <a:r>
+              <a:rPr lang="en-GB" dirty="0"/>
+              <a:t> package. If we use this package and pass the argument “</a:t>
+            </a:r>
+            <a:r>
+              <a:rPr lang="en-GB" dirty="0" err="1"/>
+              <a:t>sectionbib</a:t>
+            </a:r>
+            <a:r>
+              <a:rPr lang="en-GB" dirty="0"/>
+              <a:t>” when we use the natbib package, we can include a bibliography in each included file. The bibliographies must be in separate files which are included in the main file</a:t>
             </a:r>
           </a:p>
           <a:p>
             <a:endParaRPr lang="en-GB" dirty="0"/>
           </a:p>
           <a:p>
-            <a:r>
-              <a:rPr lang="en-GB" dirty="0"/>
-              <a:t>Overleaf Example (numbers): https://www.overleaf.com/read/nyhjxjvhvqpk</a:t>
-            </a:r>
-          </a:p>
-          <a:p>
-            <a:r>
-              <a:rPr lang="en-GB" dirty="0"/>
-              <a:t>Overleaf Example (round): https://www.overleaf.com/read/dfvnydjfjpfb</a:t>
-            </a:r>
-          </a:p>
-          <a:p>
-            <a:r>
-              <a:rPr lang="en-GB" dirty="0"/>
-              <a:t>Overleaf Example (super): https://www.overleaf.com/read/zgtgtvqhcvfc</a:t>
-            </a:r>
-          </a:p>
-          <a:p>
-            <a:endParaRPr lang="en-GB" dirty="0"/>
+            <a:pPr marL="0" marR="0" lvl="0" indent="0" algn="l" defTabSz="914400" rtl="0" eaLnBrk="1" fontAlgn="auto" latinLnBrk="0" hangingPunct="1">
+              <a:lnSpc>
+                <a:spcPct val="100000"/>
+              </a:lnSpc>
+              <a:spcBef>
+                <a:spcPts val="0"/>
+              </a:spcBef>
+              <a:spcAft>
+                <a:spcPts val="0"/>
+              </a:spcAft>
+              <a:buClrTx/>
+              <a:buSzTx/>
+              <a:buFontTx/>
+              <a:buNone/>
+              <a:tabLst/>
+              <a:defRPr/>
+            </a:pPr>
+            <a:r>
+              <a:rPr lang="en-GB" dirty="0"/>
+              <a:t>Overleaf example: https://www.overleaf.com/read/trrfmdjsyvvv#164a2f (Note that this project has some errors and warnings I haven't be able to track down, but the pdf appears to render properly)</a:t>
+            </a:r>
           </a:p>
         </p:txBody>
       </p:sp>
@@ -4305,7 +4686,7 @@
     </p:spTree>
     <p:extLst>
       <p:ext uri="{BB962C8B-B14F-4D97-AF65-F5344CB8AC3E}">
-        <p14:creationId xmlns:p14="http://schemas.microsoft.com/office/powerpoint/2010/main" val="3708384690"/>
+        <p14:creationId xmlns:p14="http://schemas.microsoft.com/office/powerpoint/2010/main" val="137695858"/>
       </p:ext>
     </p:extLst>
   </p:cSld>
@@ -4361,23 +4742,25 @@
           <a:p>
             <a:r>
               <a:rPr lang="en-GB" dirty="0"/>
-              <a:t>There are more ways you can make a citation. You can include multiple citations within a single “</a:t>
+              <a:t>There are a number of different ways you can personalise your references. Here we’ll look at different options you can use with the </a:t>
             </a:r>
             <a:r>
               <a:rPr lang="en-GB" dirty="0" err="1"/>
-              <a:t>citet</a:t>
-            </a:r>
-            <a:r>
-              <a:rPr lang="en-GB" dirty="0"/>
-              <a:t>” or “</a:t>
-            </a:r>
-            <a:r>
-              <a:rPr lang="en-GB" dirty="0" err="1"/>
-              <a:t>citep</a:t>
-            </a:r>
-            <a:r>
-              <a:rPr lang="en-GB" dirty="0"/>
-              <a:t>” command, separating them with commas. You can also provide additional details, such a referencing a chapter number by including them in square brackets between the “cite” command and the curly brackets.</a:t>
+              <a:t>natbib</a:t>
+            </a:r>
+            <a:r>
+              <a:rPr lang="en-GB" dirty="0"/>
+              <a:t> package which will alter how your reference appear.</a:t>
+            </a:r>
+            <a:br>
+              <a:rPr lang="en-GB" dirty="0"/>
+            </a:br>
+            <a:br>
+              <a:rPr lang="en-GB" dirty="0"/>
+            </a:br>
+            <a:r>
+              <a:rPr lang="en-GB" dirty="0"/>
+              <a:t>Using the “numbers” option will cause you to use numerical references instead of textual references. “round” will cause your references to use round brackets instead of square brackets. “super” causes your citations to appear in super-script, similar to a footnote.</a:t>
             </a:r>
           </a:p>
           <a:p>
@@ -4386,8 +4769,23 @@
           <a:p>
             <a:r>
               <a:rPr lang="en-GB" dirty="0"/>
-              <a:t>Overleaf Example: https://www.overleaf.com/read/cqbhnvfsfzpp</a:t>
-            </a:r>
+              <a:t>Overleaf Example (numbers): https://www.overleaf.com/read/nyhjxjvhvqpk</a:t>
+            </a:r>
+          </a:p>
+          <a:p>
+            <a:r>
+              <a:rPr lang="en-GB" dirty="0"/>
+              <a:t>Overleaf Example (round): https://www.overleaf.com/read/dfvnydjfjpfb</a:t>
+            </a:r>
+          </a:p>
+          <a:p>
+            <a:r>
+              <a:rPr lang="en-GB" dirty="0"/>
+              <a:t>Overleaf Example (super): https://www.overleaf.com/read/zgtgtvqhcvfc</a:t>
+            </a:r>
+          </a:p>
+          <a:p>
+            <a:endParaRPr lang="en-GB" dirty="0"/>
           </a:p>
         </p:txBody>
       </p:sp>
@@ -4417,7 +4815,7 @@
     </p:spTree>
     <p:extLst>
       <p:ext uri="{BB962C8B-B14F-4D97-AF65-F5344CB8AC3E}">
-        <p14:creationId xmlns:p14="http://schemas.microsoft.com/office/powerpoint/2010/main" val="1451178539"/>
+        <p14:creationId xmlns:p14="http://schemas.microsoft.com/office/powerpoint/2010/main" val="3708384690"/>
       </p:ext>
     </p:extLst>
   </p:cSld>
@@ -4473,7 +4871,23 @@
           <a:p>
             <a:r>
               <a:rPr lang="en-GB" dirty="0"/>
-              <a:t>There are a few “gotchas” regarding references and bibliographies. These are things that you might expect to work one way, but they actually work a different way.</a:t>
+              <a:t>There are more ways you can make a citation. You can include multiple citations within a single “</a:t>
+            </a:r>
+            <a:r>
+              <a:rPr lang="en-GB" dirty="0" err="1"/>
+              <a:t>citet</a:t>
+            </a:r>
+            <a:r>
+              <a:rPr lang="en-GB" dirty="0"/>
+              <a:t>” or “</a:t>
+            </a:r>
+            <a:r>
+              <a:rPr lang="en-GB" dirty="0" err="1"/>
+              <a:t>citep</a:t>
+            </a:r>
+            <a:r>
+              <a:rPr lang="en-GB" dirty="0"/>
+              <a:t>” command, separating them with commas. You can also provide additional details, such a referencing a chapter number by including them in square brackets between the “cite” command and the curly brackets.</a:t>
             </a:r>
           </a:p>
           <a:p>
@@ -4482,35 +4896,7 @@
           <a:p>
             <a:r>
               <a:rPr lang="en-GB" dirty="0"/>
-              <a:t>The first is capitalisation. In titles and names, LaTeX will use it’s own rules for capitalisation. In titles, the default is to make everything lower-case. This can provide a big problem, particularly for acronyms. However, you can force LaTeX to preserve your original capitalisation by placing the phrase in curly brackets.</a:t>
-            </a:r>
-            <a:br>
-              <a:rPr lang="en-GB" dirty="0"/>
-            </a:br>
-            <a:br>
-              <a:rPr lang="en-GB" dirty="0"/>
-            </a:br>
-            <a:r>
-              <a:rPr lang="en-GB" dirty="0"/>
-              <a:t>If you include accented letters in your bibliography, this will not result in an accent appearing in your bibliography as LaTeX doesn’t know how to parse the character. Instead, you need to include the LaTeX code for accented character in your “.bib” file.</a:t>
-            </a:r>
-          </a:p>
-          <a:p>
-            <a:endParaRPr lang="en-GB" dirty="0"/>
-          </a:p>
-          <a:p>
-            <a:r>
-              <a:rPr lang="en-GB" dirty="0"/>
-              <a:t>There a couple of ways of entering multiple author names. You might think that separating author names by commas will work, but this will not produce the desired effect. This is partially because commas are often used between a surname and first names in author specifications. Instead, you can separate names with “and” or with semi-colons.</a:t>
-            </a:r>
-          </a:p>
-          <a:p>
-            <a:endParaRPr lang="en-GB" dirty="0"/>
-          </a:p>
-          <a:p>
-            <a:r>
-              <a:rPr lang="en-GB" dirty="0"/>
-              <a:t>Break for section 11 of Task Sheet</a:t>
+              <a:t>Overleaf Example: https://www.overleaf.com/read/cqbhnvfsfzpp</a:t>
             </a:r>
           </a:p>
         </p:txBody>
@@ -4541,7 +4927,7 @@
     </p:spTree>
     <p:extLst>
       <p:ext uri="{BB962C8B-B14F-4D97-AF65-F5344CB8AC3E}">
-        <p14:creationId xmlns:p14="http://schemas.microsoft.com/office/powerpoint/2010/main" val="3041713323"/>
+        <p14:creationId xmlns:p14="http://schemas.microsoft.com/office/powerpoint/2010/main" val="1451178539"/>
       </p:ext>
     </p:extLst>
   </p:cSld>
@@ -4597,23 +4983,16 @@
           <a:p>
             <a:r>
               <a:rPr lang="en-GB" dirty="0"/>
-              <a:t>The acronym package provides a useful way to deal with acronyms in your document. Inside the “acronym” environment, you can use the “\</a:t>
-            </a:r>
-            <a:r>
-              <a:rPr lang="en-GB" dirty="0" err="1"/>
-              <a:t>acro</a:t>
-            </a:r>
-            <a:r>
-              <a:rPr lang="en-GB" dirty="0"/>
-              <a:t>” command to define an acronym. This command is followed by two sets of curly brackets. The first contains the abbreviated version of the acronym. The second contains the expanded version of the acronym. Defining acronyms in this way creates a list of acronyms at the location of the “acronym” environment in your pdf. It’s also possible to define acronyms using the “\</a:t>
-            </a:r>
-            <a:r>
-              <a:rPr lang="en-GB" dirty="0" err="1"/>
-              <a:t>acrodef</a:t>
-            </a:r>
-            <a:r>
-              <a:rPr lang="en-GB" dirty="0"/>
-              <a:t>” command in the preamble to avoid a list of acronyms if desired.</a:t>
+              <a:t>There are a few “gotchas” regarding references and bibliographies. These are things that you might expect to work one way, but they actually work a different way.</a:t>
+            </a:r>
+          </a:p>
+          <a:p>
+            <a:endParaRPr lang="en-GB" dirty="0"/>
+          </a:p>
+          <a:p>
+            <a:r>
+              <a:rPr lang="en-GB" dirty="0"/>
+              <a:t>The first is capitalisation. In titles and names, LaTeX will use it’s own rules for capitalisation. In titles, the default is to make everything lower-case. This can provide a big problem, particularly for acronyms. However, you can force LaTeX to preserve your original capitalisation by placing the phrase in curly brackets.</a:t>
             </a:r>
             <a:br>
               <a:rPr lang="en-GB" dirty="0"/>
@@ -4623,25 +5002,25 @@
             </a:br>
             <a:r>
               <a:rPr lang="en-GB" dirty="0"/>
-              <a:t>In the main text you may use the commands “\ac” and “\</a:t>
-            </a:r>
-            <a:r>
-              <a:rPr lang="en-GB" dirty="0" err="1"/>
-              <a:t>acp</a:t>
-            </a:r>
-            <a:r>
-              <a:rPr lang="en-GB" dirty="0"/>
-              <a:t>” to insert the acronym or the plural of the acronym respectively. The first time an acronym is used this way both the expanded and contracted version of the acronym will be inserted. In subsequent cases only the contracted version is used.</a:t>
-            </a:r>
-            <a:br>
-              <a:rPr lang="en-GB" dirty="0"/>
-            </a:br>
-            <a:br>
-              <a:rPr lang="en-GB" dirty="0"/>
-            </a:br>
-            <a:r>
-              <a:rPr lang="en-GB" dirty="0"/>
-              <a:t>Overleaf Example: https://www.overleaf.com/read/jqsvjjpgjzjp</a:t>
+              <a:t>If you include accented letters in your bibliography, this will not result in an accent appearing in your bibliography as LaTeX doesn’t know how to parse the character. Instead, you need to include the LaTeX code for accented character in your “.bib” file.</a:t>
+            </a:r>
+          </a:p>
+          <a:p>
+            <a:endParaRPr lang="en-GB" dirty="0"/>
+          </a:p>
+          <a:p>
+            <a:r>
+              <a:rPr lang="en-GB" dirty="0"/>
+              <a:t>There a couple of ways of entering multiple author names. You might think that separating author names by commas will work, but this will not produce the desired effect. This is partially because commas are often used between a surname and first names in author specifications. Instead, you can separate names with “and” or with semi-colons.</a:t>
+            </a:r>
+          </a:p>
+          <a:p>
+            <a:endParaRPr lang="en-GB" dirty="0"/>
+          </a:p>
+          <a:p>
+            <a:r>
+              <a:rPr lang="en-GB" dirty="0"/>
+              <a:t>Break for section 11 of Task Sheet</a:t>
             </a:r>
           </a:p>
         </p:txBody>
@@ -4672,7 +5051,7 @@
     </p:spTree>
     <p:extLst>
       <p:ext uri="{BB962C8B-B14F-4D97-AF65-F5344CB8AC3E}">
-        <p14:creationId xmlns:p14="http://schemas.microsoft.com/office/powerpoint/2010/main" val="374641908"/>
+        <p14:creationId xmlns:p14="http://schemas.microsoft.com/office/powerpoint/2010/main" val="3041713323"/>
       </p:ext>
     </p:extLst>
   </p:cSld>
@@ -4728,39 +5107,23 @@
           <a:p>
             <a:r>
               <a:rPr lang="en-GB" dirty="0"/>
-              <a:t>The “</a:t>
+              <a:t>The acronym package provides a useful way to deal with acronyms in your document. Inside the “acronym” environment, you can use the “\</a:t>
             </a:r>
             <a:r>
               <a:rPr lang="en-GB" dirty="0" err="1"/>
-              <a:t>amsmath</a:t>
-            </a:r>
-            <a:r>
-              <a:rPr lang="en-GB" dirty="0"/>
-              <a:t>” package (which is a fairly standard package to use when dealing with maths) introduces the “</a:t>
+              <a:t>acro</a:t>
+            </a:r>
+            <a:r>
+              <a:rPr lang="en-GB" dirty="0"/>
+              <a:t>” command to define an acronym. This command is followed by two sets of curly brackets. The first contains the abbreviated version of the acronym. The second contains the expanded version of the acronym. Defining acronyms in this way creates a list of acronyms at the location of the “acronym” environment in your pdf. It’s also possible to define acronyms using the “\</a:t>
             </a:r>
             <a:r>
               <a:rPr lang="en-GB" dirty="0" err="1"/>
-              <a:t>alignat</a:t>
-            </a:r>
-            <a:r>
-              <a:rPr lang="en-GB" dirty="0"/>
-              <a:t>” environment. This environment allows </a:t>
-            </a:r>
-            <a:r>
-              <a:rPr lang="en-GB" dirty="0" err="1"/>
-              <a:t>mulriple</a:t>
-            </a:r>
-            <a:r>
-              <a:rPr lang="en-GB" dirty="0"/>
-              <a:t> equations to be specified in the same construct. Its contents are processed in “</a:t>
-            </a:r>
-            <a:r>
-              <a:rPr lang="en-GB" dirty="0" err="1"/>
-              <a:t>mathmode</a:t>
-            </a:r>
-            <a:r>
-              <a:rPr lang="en-GB" dirty="0"/>
-              <a:t>” and individual lines in it are treated as different equations for numbering purposes.</a:t>
+              <a:t>acrodef</a:t>
+            </a:r>
+            <a:r>
+              <a:rPr lang="en-GB" dirty="0"/>
+              <a:t>” command in the preamble to avoid a list of acronyms if desired.</a:t>
             </a:r>
             <a:br>
               <a:rPr lang="en-GB" dirty="0"/>
@@ -4770,33 +5133,25 @@
             </a:br>
             <a:r>
               <a:rPr lang="en-GB" dirty="0"/>
-              <a:t>What it also allows you to do is to align your equations. The number in curly brackets following the “\begin{</a:t>
+              <a:t>In the main text you may use the commands “\ac” and “\</a:t>
             </a:r>
             <a:r>
               <a:rPr lang="en-GB" dirty="0" err="1"/>
-              <a:t>alignat</a:t>
-            </a:r>
-            <a:r>
-              <a:rPr lang="en-GB" dirty="0"/>
-              <a:t>}” command defines how many alignment points may be used for each equation. Equations are separated with a double backslash and the alignment points are specified using the ampersand character “&amp;”. For each equation you may use up to the maximum number of alignment points specified (here, it is 2). LaTeX will then ensure the first alignment point in each equation is vertically aligned. This can be very useful for ensuring even large blocks of equations are easy to read.</a:t>
-            </a:r>
-          </a:p>
-          <a:p>
-            <a:endParaRPr lang="en-GB" dirty="0"/>
-          </a:p>
-          <a:p>
-            <a:r>
-              <a:rPr lang="en-GB" dirty="0"/>
-              <a:t>Overleaf Example: https://www.overleaf.com/read/trrzvqnfwshx</a:t>
-            </a:r>
-          </a:p>
-          <a:p>
-            <a:endParaRPr lang="en-GB" dirty="0"/>
-          </a:p>
-          <a:p>
-            <a:r>
-              <a:rPr lang="en-GB" dirty="0"/>
-              <a:t>Break for sections 12 and 13 of task sheet</a:t>
+              <a:t>acp</a:t>
+            </a:r>
+            <a:r>
+              <a:rPr lang="en-GB" dirty="0"/>
+              <a:t>” to insert the acronym or the plural of the acronym respectively. The first time an acronym is used this way both the expanded and contracted version of the acronym will be inserted. In subsequent cases only the contracted version is used.</a:t>
+            </a:r>
+            <a:br>
+              <a:rPr lang="en-GB" dirty="0"/>
+            </a:br>
+            <a:br>
+              <a:rPr lang="en-GB" dirty="0"/>
+            </a:br>
+            <a:r>
+              <a:rPr lang="en-GB" dirty="0"/>
+              <a:t>Overleaf Example: https://www.overleaf.com/read/jqsvjjpgjzjp</a:t>
             </a:r>
           </a:p>
         </p:txBody>
@@ -4827,7 +5182,7 @@
     </p:spTree>
     <p:extLst>
       <p:ext uri="{BB962C8B-B14F-4D97-AF65-F5344CB8AC3E}">
-        <p14:creationId xmlns:p14="http://schemas.microsoft.com/office/powerpoint/2010/main" val="554150285"/>
+        <p14:creationId xmlns:p14="http://schemas.microsoft.com/office/powerpoint/2010/main" val="374641908"/>
       </p:ext>
     </p:extLst>
   </p:cSld>
@@ -4883,23 +5238,75 @@
           <a:p>
             <a:r>
               <a:rPr lang="en-GB" dirty="0"/>
-              <a:t>If you want to do something in LaTeX but don’t know how, the first thing to do is to Google it. Somebody has almost certainly had your problem/desire before and you can copy their solution most of the time. On many occasions, you’ll find the answer of </a:t>
+              <a:t>The “</a:t>
             </a:r>
             <a:r>
               <a:rPr lang="en-GB" dirty="0" err="1"/>
-              <a:t>stackexchange</a:t>
-            </a:r>
-            <a:r>
-              <a:rPr lang="en-GB" dirty="0"/>
-              <a:t>. As well as being a useful environment to develop and run LaTeX, Overleaf has an extensive library of documentation on LaTeX’s functions. There’s also a very good </a:t>
+              <a:t>amsmath</a:t>
+            </a:r>
+            <a:r>
+              <a:rPr lang="en-GB" dirty="0"/>
+              <a:t>” package (which is a fairly standard package to use when dealing with maths) introduces the “</a:t>
             </a:r>
             <a:r>
               <a:rPr lang="en-GB" dirty="0" err="1"/>
-              <a:t>wikibook</a:t>
-            </a:r>
-            <a:r>
-              <a:rPr lang="en-GB" dirty="0"/>
-              <a:t> that contains a good description of the functionality of LaTeX. There’s also a good table maker which allows you to define tables in a more natural and graphical way and have it return the equivalent LaTeX code. Finally, there’s an equation editor which allows you to define equations in a more graphical fashion and have it return the equivalent LaTeX code.</a:t>
+              <a:t>alignat</a:t>
+            </a:r>
+            <a:r>
+              <a:rPr lang="en-GB" dirty="0"/>
+              <a:t>” environment. This environment allows </a:t>
+            </a:r>
+            <a:r>
+              <a:rPr lang="en-GB" dirty="0" err="1"/>
+              <a:t>mulriple</a:t>
+            </a:r>
+            <a:r>
+              <a:rPr lang="en-GB" dirty="0"/>
+              <a:t> equations to be specified in the same construct. Its contents are processed in “</a:t>
+            </a:r>
+            <a:r>
+              <a:rPr lang="en-GB" dirty="0" err="1"/>
+              <a:t>mathmode</a:t>
+            </a:r>
+            <a:r>
+              <a:rPr lang="en-GB" dirty="0"/>
+              <a:t>” and individual lines in it are treated as different equations for numbering purposes.</a:t>
+            </a:r>
+            <a:br>
+              <a:rPr lang="en-GB" dirty="0"/>
+            </a:br>
+            <a:br>
+              <a:rPr lang="en-GB" dirty="0"/>
+            </a:br>
+            <a:r>
+              <a:rPr lang="en-GB" dirty="0"/>
+              <a:t>What it also allows you to do is to align your equations. The number in curly brackets following the “\begin{</a:t>
+            </a:r>
+            <a:r>
+              <a:rPr lang="en-GB" dirty="0" err="1"/>
+              <a:t>alignat</a:t>
+            </a:r>
+            <a:r>
+              <a:rPr lang="en-GB" dirty="0"/>
+              <a:t>}” command defines how many alignment points may be used for each equation. Equations are separated with a double backslash and the alignment points are specified using the ampersand character “&amp;”. For each equation you may use up to the maximum number of alignment points specified (here, it is 2). LaTeX will then ensure the first alignment point in each equation is vertically aligned. This can be very useful for ensuring even large blocks of equations are easy to read.</a:t>
+            </a:r>
+          </a:p>
+          <a:p>
+            <a:endParaRPr lang="en-GB" dirty="0"/>
+          </a:p>
+          <a:p>
+            <a:r>
+              <a:rPr lang="en-GB" dirty="0"/>
+              <a:t>Overleaf Example: https://www.overleaf.com/read/trrzvqnfwshx</a:t>
+            </a:r>
+          </a:p>
+          <a:p>
+            <a:endParaRPr lang="en-GB" dirty="0"/>
+          </a:p>
+          <a:p>
+            <a:r>
+              <a:rPr lang="en-GB" dirty="0"/>
+              <a:t>Break for sections 12 and 13 of task sheet</a:t>
             </a:r>
           </a:p>
         </p:txBody>
@@ -4930,7 +5337,7 @@
     </p:spTree>
     <p:extLst>
       <p:ext uri="{BB962C8B-B14F-4D97-AF65-F5344CB8AC3E}">
-        <p14:creationId xmlns:p14="http://schemas.microsoft.com/office/powerpoint/2010/main" val="1445805806"/>
+        <p14:creationId xmlns:p14="http://schemas.microsoft.com/office/powerpoint/2010/main" val="554150285"/>
       </p:ext>
     </p:extLst>
   </p:cSld>
@@ -4959,6 +5366,109 @@
       </p:grpSpPr>
       <p:sp>
         <p:nvSpPr>
+          <p:cNvPr id="2" name="Slide Image Placeholder 1"/>
+          <p:cNvSpPr>
+            <a:spLocks noGrp="1" noRot="1" noChangeAspect="1"/>
+          </p:cNvSpPr>
+          <p:nvPr>
+            <p:ph type="sldImg"/>
+          </p:nvPr>
+        </p:nvSpPr>
+        <p:spPr/>
+      </p:sp>
+      <p:sp>
+        <p:nvSpPr>
+          <p:cNvPr id="3" name="Notes Placeholder 2"/>
+          <p:cNvSpPr>
+            <a:spLocks noGrp="1"/>
+          </p:cNvSpPr>
+          <p:nvPr>
+            <p:ph type="body" idx="1"/>
+          </p:nvPr>
+        </p:nvSpPr>
+        <p:spPr/>
+        <p:txBody>
+          <a:bodyPr/>
+          <a:lstStyle/>
+          <a:p>
+            <a:r>
+              <a:rPr lang="en-GB" dirty="0"/>
+              <a:t>If you want to do something in LaTeX but don’t know how, the first thing to do is to Google it. Somebody has almost certainly had your problem/desire before and you can copy their solution most of the time. On many occasions, you’ll find the answer of </a:t>
+            </a:r>
+            <a:r>
+              <a:rPr lang="en-GB" dirty="0" err="1"/>
+              <a:t>stackexchange</a:t>
+            </a:r>
+            <a:r>
+              <a:rPr lang="en-GB" dirty="0"/>
+              <a:t>. As well as being a useful environment to develop and run LaTeX, Overleaf has an extensive library of documentation on LaTeX’s functions. There’s also a very good </a:t>
+            </a:r>
+            <a:r>
+              <a:rPr lang="en-GB" dirty="0" err="1"/>
+              <a:t>wikibook</a:t>
+            </a:r>
+            <a:r>
+              <a:rPr lang="en-GB" dirty="0"/>
+              <a:t> that contains a good description of the functionality of LaTeX. There’s also a good table maker which allows you to define tables in a more natural and graphical way and have it return the equivalent LaTeX code. Finally, there’s an equation editor which allows you to define equations in a more graphical fashion and have it return the equivalent LaTeX code.</a:t>
+            </a:r>
+          </a:p>
+        </p:txBody>
+      </p:sp>
+      <p:sp>
+        <p:nvSpPr>
+          <p:cNvPr id="4" name="Slide Number Placeholder 3"/>
+          <p:cNvSpPr>
+            <a:spLocks noGrp="1"/>
+          </p:cNvSpPr>
+          <p:nvPr>
+            <p:ph type="sldNum" sz="quarter" idx="10"/>
+          </p:nvPr>
+        </p:nvSpPr>
+        <p:spPr/>
+        <p:txBody>
+          <a:bodyPr/>
+          <a:lstStyle/>
+          <a:p>
+            <a:fld id="{6A641EC8-C9F8-4A58-A1A7-F7D817526EEC}" type="slidenum">
+              <a:rPr lang="en-GB" smtClean="0"/>
+              <a:t>38</a:t>
+            </a:fld>
+            <a:endParaRPr lang="en-GB"/>
+          </a:p>
+        </p:txBody>
+      </p:sp>
+    </p:spTree>
+    <p:extLst>
+      <p:ext uri="{BB962C8B-B14F-4D97-AF65-F5344CB8AC3E}">
+        <p14:creationId xmlns:p14="http://schemas.microsoft.com/office/powerpoint/2010/main" val="1445805806"/>
+      </p:ext>
+    </p:extLst>
+  </p:cSld>
+  <p:clrMapOvr>
+    <a:masterClrMapping/>
+  </p:clrMapOvr>
+</p:notes>
+</file>
+
+<file path=ppt/notesSlides/notesSlide39.xml><?xml version="1.0" encoding="utf-8"?>
+<p:notes xmlns:a="http://schemas.openxmlformats.org/drawingml/2006/main" xmlns:r="http://schemas.openxmlformats.org/officeDocument/2006/relationships" xmlns:p="http://schemas.openxmlformats.org/presentationml/2006/main">
+  <p:cSld>
+    <p:spTree>
+      <p:nvGrpSpPr>
+        <p:cNvPr id="1" name=""/>
+        <p:cNvGrpSpPr/>
+        <p:nvPr/>
+      </p:nvGrpSpPr>
+      <p:grpSpPr>
+        <a:xfrm>
+          <a:off x="0" y="0"/>
+          <a:ext cx="0" cy="0"/>
+          <a:chOff x="0" y="0"/>
+          <a:chExt cx="0" cy="0"/>
+        </a:xfrm>
+      </p:grpSpPr>
+      <p:sp>
+        <p:nvSpPr>
           <p:cNvPr id="108546" name="Rectangle 7"/>
           <p:cNvSpPr>
             <a:spLocks noGrp="1" noChangeArrowheads="1"/>
@@ -5117,7 +5627,7 @@
                   <a:spcPct val="0"/>
                 </a:spcBef>
               </a:pPr>
-              <a:t>38</a:t>
+              <a:t>39</a:t>
             </a:fld>
             <a:endParaRPr lang="en-US" altLang="en-US"/>
           </a:p>
@@ -5358,7 +5868,15 @@
           <a:p>
             <a:r>
               <a:rPr lang="en-GB" dirty="0"/>
-              <a:t>This course focuses mostly on how to use LaTeX to produce a thesis and will not provide an in-depth discussion of the regulations surrounding your thesis. You should make sure you know what exact requirements are relevant to your programme and double-check everything presented here. One set of requirements is the guidance from Library Theses Office, which is included in this repository. This contains a couple of requirements and a little guidance, but few strict requirements. </a:t>
+              <a:t>This course is split into two parts. The first looks at the formatting requirements set out by the ICR and </a:t>
+            </a:r>
+            <a:r>
+              <a:rPr lang="en-GB" dirty="0" err="1"/>
+              <a:t>UoL</a:t>
+            </a:r>
+            <a:r>
+              <a:rPr lang="en-GB" dirty="0"/>
+              <a:t> and how we can meet these in LaTeX. This information has been taken from the Library Theses Office guidance – there is a copy of this in the repository. You should bear in mind that I am not an expert in ICR thesis requirements and, whilst I’ve done my best to make the information in this course complete and correct, you should double-check anything that you’re not sure of.</a:t>
             </a:r>
           </a:p>
           <a:p>
@@ -5367,7 +5885,7 @@
           <a:p>
             <a:r>
               <a:rPr lang="en-GB" dirty="0"/>
-              <a:t>The only hard and fast rule is that it must be under 100,000 words, excluding your bibliography and appendices. Taking a word count in a LaTeX document isn’t always straightforward. Luckily, Overleaf provides this functionality in the “menu” tab.</a:t>
+              <a:t>If you want some extra information on ICR’s view on what a “good thesis” looks like, try following the link to the “Good Viva” video.</a:t>
             </a:r>
           </a:p>
           <a:p>
@@ -5376,16 +5894,7 @@
           <a:p>
             <a:r>
               <a:rPr lang="en-GB" dirty="0"/>
-              <a:t>If you want some extra information on ICR’s view on what a “good thesis” looks like, try following the link to the “Good Viva” video.</a:t>
-            </a:r>
-          </a:p>
-          <a:p>
-            <a:endParaRPr lang="en-GB" dirty="0"/>
-          </a:p>
-          <a:p>
-            <a:r>
-              <a:rPr lang="en-GB" dirty="0"/>
-              <a:t>Instead of focusing on the requirements of your course, I’m going to give you guidance based on what I consider to be good practice. This is loosely based on Imperial’s thesis guidance. The remainder of the guide focuses on things that I think are useful for developing a thesis which looks good and how to set up an effective and efficient workflow.</a:t>
+              <a:t>The second half of the course is based around what I consider to be good practice. It focuses on things that I think are useful for developing a thesis which looks good and how to set up an effective and efficient workflow.</a:t>
             </a:r>
           </a:p>
         </p:txBody>
@@ -5472,7 +5981,15 @@
           <a:p>
             <a:r>
               <a:rPr lang="en-GB" dirty="0"/>
-              <a:t>You’re will probably want to use A4 paper in your thesis and I would recommend you use double-sided. The differences between single-sided and double sided documents mainly affects certain types of headers and footers, such as whether page numbers are always on the top right or appear on the “outside” corner of a page, etc.</a:t>
+              <a:t>You’re </a:t>
+            </a:r>
+            <a:r>
+              <a:rPr lang="en-GB" dirty="0" err="1"/>
+              <a:t>requiredto</a:t>
+            </a:r>
+            <a:r>
+              <a:rPr lang="en-GB" dirty="0"/>
+              <a:t> use A4 paper in your thesis and I would recommend you use double-sided. The differences between single-sided and double-sided documents mainly affects certain types of headers and footers, such as whether page numbers are always on the top right or appear on the “outside” corner (furthest from the spine of the book) of a page, etc.</a:t>
             </a:r>
           </a:p>
           <a:p>
@@ -5481,15 +5998,7 @@
           <a:p>
             <a:r>
               <a:rPr lang="en-GB" dirty="0"/>
-              <a:t>The LTO document suggests using the Arial font. However, this isn’t actually supported in LaTeX as it’s a </a:t>
-            </a:r>
-            <a:r>
-              <a:rPr lang="en-GB" dirty="0" err="1"/>
-              <a:t>propietary</a:t>
-            </a:r>
-            <a:r>
-              <a:rPr lang="en-GB" dirty="0"/>
-              <a:t> font. One option is to change the default font of your document using the </a:t>
+              <a:t>The LTO document suggests using the Arial font. However, this isn’t supported in LaTeX as it’s a proprietary font. One option is to change the default font of your document using the </a:t>
             </a:r>
             <a:r>
               <a:rPr lang="en-GB" dirty="0" err="1"/>
@@ -5713,7 +6222,15 @@
           <a:p>
             <a:r>
               <a:rPr lang="en-GB" dirty="0"/>
-              <a:t>By using the geometry package we’re able to use the geometry command later in the preamble. We may provide a number of arguments to set up the page in different ways. Here, we simply say we want the margin to be 2cm on left, right and top, and 3cm on the bottom.</a:t>
+              <a:t>By using the geometry package we’re able to use the geometry command later in the preamble. We may provide some arguments to set up the page in different ways. Here, we say we want the top margin to be 2cm and the bottom margin to be 3cm. The left and right margins relate to odd numbered page, but are reversed on even numbered pages. This is the result of using the “</a:t>
+            </a:r>
+            <a:r>
+              <a:rPr lang="en-GB" dirty="0" err="1"/>
+              <a:t>twoside</a:t>
+            </a:r>
+            <a:r>
+              <a:rPr lang="en-GB" dirty="0"/>
+              <a:t>” option when choosing the document class and allows us to have different margins on the “inner” and “outer” sides of the physical book if its pages are double-sided.</a:t>
             </a:r>
           </a:p>
           <a:p>
@@ -6228,7 +6745,7 @@
           <a:p>
             <a:fld id="{EB0080F8-EA1C-491D-963C-2C881B2F918F}" type="datetimeFigureOut">
               <a:rPr lang="en-GB" smtClean="0"/>
-              <a:t>27/03/2024</a:t>
+              <a:t>07/05/2024</a:t>
             </a:fld>
             <a:endParaRPr lang="en-GB"/>
           </a:p>
@@ -6378,7 +6895,7 @@
           <a:p>
             <a:fld id="{EB0080F8-EA1C-491D-963C-2C881B2F918F}" type="datetimeFigureOut">
               <a:rPr lang="en-GB" smtClean="0"/>
-              <a:t>27/03/2024</a:t>
+              <a:t>07/05/2024</a:t>
             </a:fld>
             <a:endParaRPr lang="en-GB"/>
           </a:p>
@@ -7911,7 +8428,7 @@
           <a:p>
             <a:fld id="{EB0080F8-EA1C-491D-963C-2C881B2F918F}" type="datetimeFigureOut">
               <a:rPr lang="en-GB" smtClean="0"/>
-              <a:t>27/03/2024</a:t>
+              <a:t>07/05/2024</a:t>
             </a:fld>
             <a:endParaRPr lang="en-GB"/>
           </a:p>
@@ -8482,7 +8999,14 @@
           <a:p>
             <a:r>
               <a:rPr lang="en-GB" sz="2400" dirty="0"/>
-              <a:t>Using a larger line spacing (1.5 times or double-spaced) can make your thesis easier for examiners to annotate</a:t>
+              <a:t>Your lines are required to be 1.5 times or double-spaced</a:t>
+            </a:r>
+          </a:p>
+          <a:p>
+            <a:pPr lvl="1"/>
+            <a:r>
+              <a:rPr lang="en-GB" sz="2000" dirty="0"/>
+              <a:t>Excludes footnotes and block notations</a:t>
             </a:r>
           </a:p>
           <a:p>
@@ -8529,14 +9053,14 @@
             </a:r>
             <a:r>
               <a:rPr lang="en-GB" sz="2400" dirty="0"/>
-              <a:t>{1.5} command</a:t>
+              <a:t>{1.5} command in the preamble</a:t>
             </a:r>
           </a:p>
           <a:p>
             <a:pPr lvl="1"/>
             <a:r>
               <a:rPr lang="en-GB" sz="2000" dirty="0"/>
-              <a:t>Footnotes are excepted from this</a:t>
+              <a:t>Footnotes are automatically excepted from this</a:t>
             </a:r>
           </a:p>
           <a:p>
@@ -8579,7 +9103,7 @@
             <a:pPr lvl="1"/>
             <a:r>
               <a:rPr lang="en-GB" sz="2000" dirty="0"/>
-              <a:t>Could be useful for indented block quotations</a:t>
+              <a:t>Can be used for block quotations</a:t>
             </a:r>
           </a:p>
         </p:txBody>
@@ -9189,7 +9713,7 @@
           <a:p>
             <a:r>
               <a:rPr lang="en-GB" sz="2400" dirty="0"/>
-              <a:t>Thins you might want to include:</a:t>
+              <a:t>Must include:</a:t>
             </a:r>
           </a:p>
           <a:p>
@@ -9218,6 +9742,19 @@
             <a:r>
               <a:rPr lang="en-GB" sz="2000" dirty="0"/>
               <a:t>The name of the degree for which your thesis is submitted</a:t>
+            </a:r>
+          </a:p>
+          <a:p>
+            <a:pPr lvl="1"/>
+            <a:r>
+              <a:rPr lang="en-GB" sz="2000" dirty="0"/>
+              <a:t>Page number</a:t>
+            </a:r>
+          </a:p>
+          <a:p>
+            <a:r>
+              <a:rPr lang="en-GB" sz="2400" dirty="0"/>
+              <a:t>May want to include</a:t>
             </a:r>
           </a:p>
           <a:p>
@@ -9418,6 +9955,19 @@
             <a:pPr marL="0" indent="0">
               <a:buNone/>
             </a:pPr>
+            <a:endParaRPr lang="en-GB" sz="1100" dirty="0">
+              <a:solidFill>
+                <a:schemeClr val="tx2">
+                  <a:lumMod val="50000"/>
+                  <a:lumOff val="50000"/>
+                </a:schemeClr>
+              </a:solidFill>
+            </a:endParaRPr>
+          </a:p>
+          <a:p>
+            <a:pPr marL="0" indent="0">
+              <a:buNone/>
+            </a:pPr>
             <a:r>
               <a:rPr lang="en-GB" sz="1100" dirty="0">
                 <a:solidFill>
@@ -9664,11 +10214,6 @@
               <a:rPr lang="en-GB" sz="1100" dirty="0"/>
               <a:t>{2cm}</a:t>
             </a:r>
-          </a:p>
-          <a:p>
-            <a:pPr marL="0" indent="0">
-              <a:buNone/>
-            </a:pPr>
             <a:br>
               <a:rPr lang="en-GB" sz="1100" dirty="0"/>
             </a:br>
@@ -9904,6 +10449,110 @@
           </a:p>
         </p:txBody>
       </p:sp>
+      <p:sp>
+        <p:nvSpPr>
+          <p:cNvPr id="5" name="TextBox 4">
+            <a:extLst>
+              <a:ext uri="{FF2B5EF4-FFF2-40B4-BE49-F238E27FC236}">
+                <a16:creationId xmlns:a16="http://schemas.microsoft.com/office/drawing/2014/main" id="{42AE8C1A-2619-533E-BB7D-8F150900E246}"/>
+              </a:ext>
+            </a:extLst>
+          </p:cNvPr>
+          <p:cNvSpPr txBox="1"/>
+          <p:nvPr/>
+        </p:nvSpPr>
+        <p:spPr>
+          <a:xfrm>
+            <a:off x="3040641" y="862419"/>
+            <a:ext cx="3357009" cy="307777"/>
+          </a:xfrm>
+          <a:prstGeom prst="rect">
+            <a:avLst/>
+          </a:prstGeom>
+          <a:noFill/>
+          <a:ln>
+            <a:solidFill>
+              <a:srgbClr val="FF0000"/>
+            </a:solidFill>
+          </a:ln>
+        </p:spPr>
+        <p:txBody>
+          <a:bodyPr wrap="none" rtlCol="0">
+            <a:spAutoFit/>
+          </a:bodyPr>
+          <a:lstStyle/>
+          <a:p>
+            <a:r>
+              <a:rPr lang="en-GB" sz="1400" dirty="0">
+                <a:solidFill>
+                  <a:srgbClr val="FF0000"/>
+                </a:solidFill>
+              </a:rPr>
+              <a:t>Remember to use the </a:t>
+            </a:r>
+            <a:r>
+              <a:rPr lang="en-GB" sz="1400" dirty="0" err="1">
+                <a:solidFill>
+                  <a:srgbClr val="FF0000"/>
+                </a:solidFill>
+              </a:rPr>
+              <a:t>graphicx</a:t>
+            </a:r>
+            <a:r>
+              <a:rPr lang="en-GB" sz="1400" dirty="0">
+                <a:solidFill>
+                  <a:srgbClr val="FF0000"/>
+                </a:solidFill>
+              </a:rPr>
+              <a:t> package</a:t>
+            </a:r>
+          </a:p>
+        </p:txBody>
+      </p:sp>
+      <p:cxnSp>
+        <p:nvCxnSpPr>
+          <p:cNvPr id="8" name="Straight Arrow Connector 7">
+            <a:extLst>
+              <a:ext uri="{FF2B5EF4-FFF2-40B4-BE49-F238E27FC236}">
+                <a16:creationId xmlns:a16="http://schemas.microsoft.com/office/drawing/2014/main" id="{C6DF1F29-5CE5-6689-BB9D-DD214FE5D226}"/>
+              </a:ext>
+            </a:extLst>
+          </p:cNvPr>
+          <p:cNvCxnSpPr>
+            <a:stCxn id="5" idx="1"/>
+          </p:cNvCxnSpPr>
+          <p:nvPr/>
+        </p:nvCxnSpPr>
+        <p:spPr>
+          <a:xfrm flipH="1">
+            <a:off x="865762" y="1016308"/>
+            <a:ext cx="2174879" cy="286976"/>
+          </a:xfrm>
+          <a:prstGeom prst="straightConnector1">
+            <a:avLst/>
+          </a:prstGeom>
+          <a:ln>
+            <a:solidFill>
+              <a:srgbClr val="FF0000"/>
+            </a:solidFill>
+            <a:tailEnd type="triangle"/>
+          </a:ln>
+        </p:spPr>
+        <p:style>
+          <a:lnRef idx="2">
+            <a:schemeClr val="accent1"/>
+          </a:lnRef>
+          <a:fillRef idx="0">
+            <a:schemeClr val="accent1"/>
+          </a:fillRef>
+          <a:effectRef idx="1">
+            <a:schemeClr val="accent1"/>
+          </a:effectRef>
+          <a:fontRef idx="minor">
+            <a:schemeClr val="tx1"/>
+          </a:fontRef>
+        </p:style>
+      </p:cxnSp>
     </p:spTree>
     <p:extLst>
       <p:ext uri="{BB962C8B-B14F-4D97-AF65-F5344CB8AC3E}">
@@ -9959,7 +10608,7 @@
           <a:p>
             <a:r>
               <a:rPr lang="en-GB" sz="4000" dirty="0"/>
-              <a:t>Thesis Preamble</a:t>
+              <a:t>Statements</a:t>
             </a:r>
           </a:p>
         </p:txBody>
@@ -9992,27 +10641,54 @@
           <a:p>
             <a:r>
               <a:rPr lang="en-GB" sz="2400" dirty="0"/>
-              <a:t>There are several things you might want to include at the start of your thesis</a:t>
-            </a:r>
-          </a:p>
-          <a:p>
-            <a:r>
-              <a:rPr lang="en-GB" sz="2400" dirty="0"/>
-              <a:t>Abstract</a:t>
-            </a:r>
-          </a:p>
-          <a:p>
-            <a:r>
-              <a:rPr lang="en-GB" sz="2400" dirty="0"/>
-              <a:t>Statement of Originality</a:t>
-            </a:r>
-          </a:p>
-          <a:p>
-            <a:r>
-              <a:rPr lang="en-GB" sz="2400" dirty="0"/>
-              <a:t>Copyright Declaration</a:t>
-            </a:r>
-            <a:endParaRPr lang="en-GB" sz="2000" dirty="0"/>
+              <a:t>Under certain conditions you should include statements before your abstract:</a:t>
+            </a:r>
+          </a:p>
+          <a:p>
+            <a:pPr lvl="1"/>
+            <a:r>
+              <a:rPr lang="en-GB" sz="2000" dirty="0"/>
+              <a:t>Statement concerning joint work: if you have collaborated on your work, this should state what you have personally done, and what by collaborators</a:t>
+            </a:r>
+          </a:p>
+          <a:p>
+            <a:pPr lvl="1"/>
+            <a:r>
+              <a:rPr lang="en-GB" sz="2000" dirty="0"/>
+              <a:t>Statement concerning work previously submitted for another award: if this incorporates work submitted for a degree or similar award at ICR or elsewhere</a:t>
+            </a:r>
+          </a:p>
+          <a:p>
+            <a:pPr lvl="1"/>
+            <a:r>
+              <a:rPr lang="en-GB" sz="2000" dirty="0"/>
+              <a:t>Statement of impact: if your experimental work was disrupted by Covid</a:t>
+            </a:r>
+          </a:p>
+          <a:p>
+            <a:r>
+              <a:rPr lang="en-GB" sz="2000" dirty="0"/>
+              <a:t>Under two pages</a:t>
+            </a:r>
+          </a:p>
+          <a:p>
+            <a:r>
+              <a:rPr lang="en-GB" sz="2000" dirty="0"/>
+              <a:t>Signed by you and supervisor </a:t>
+            </a:r>
+          </a:p>
+          <a:p>
+            <a:r>
+              <a:rPr lang="en-GB" sz="2000" dirty="0"/>
+              <a:t>Followed by abstract</a:t>
+            </a:r>
+          </a:p>
+          <a:p>
+            <a:pPr lvl="1"/>
+            <a:r>
+              <a:rPr lang="en-GB" sz="1600" dirty="0"/>
+              <a:t>Up to 300 words</a:t>
+            </a:r>
           </a:p>
           <a:p>
             <a:pPr lvl="1"/>
@@ -10075,7 +10751,7 @@
           <a:p>
             <a:r>
               <a:rPr lang="en-GB" sz="4000" dirty="0"/>
-              <a:t>Thesis Preamble</a:t>
+              <a:t>Statements</a:t>
             </a:r>
           </a:p>
         </p:txBody>
@@ -10106,7 +10782,7 @@
               <a:buNone/>
             </a:pPr>
             <a:r>
-              <a:rPr lang="en-GB" sz="2400" dirty="0">
+              <a:rPr lang="en-GB" sz="2200" dirty="0">
                 <a:solidFill>
                   <a:schemeClr val="tx2">
                     <a:lumMod val="50000"/>
@@ -10117,8 +10793,8 @@
               <a:t>\chapter</a:t>
             </a:r>
             <a:r>
-              <a:rPr lang="en-GB" sz="2400" dirty="0"/>
-              <a:t>*{Abstract}</a:t>
+              <a:rPr lang="en-GB" sz="2200" dirty="0"/>
+              <a:t>*{Statement Concerning Joint Work}</a:t>
             </a:r>
           </a:p>
           <a:p>
@@ -10126,7 +10802,7 @@
               <a:buNone/>
             </a:pPr>
             <a:r>
-              <a:rPr lang="en-GB" sz="2400" dirty="0">
+              <a:rPr lang="en-GB" sz="2200" dirty="0">
                 <a:solidFill>
                   <a:schemeClr val="tx2">
                     <a:lumMod val="50000"/>
@@ -10137,7 +10813,7 @@
               <a:t>\</a:t>
             </a:r>
             <a:r>
-              <a:rPr lang="en-GB" sz="2400" dirty="0" err="1">
+              <a:rPr lang="en-GB" sz="2200" dirty="0" err="1">
                 <a:solidFill>
                   <a:schemeClr val="tx2">
                     <a:lumMod val="50000"/>
@@ -10147,7 +10823,7 @@
               </a:rPr>
               <a:t>blindtext</a:t>
             </a:r>
-            <a:endParaRPr lang="en-GB" sz="2400" dirty="0">
+            <a:endParaRPr lang="en-GB" sz="2200" dirty="0">
               <a:solidFill>
                 <a:schemeClr val="tx2">
                   <a:lumMod val="50000"/>
@@ -10160,7 +10836,99 @@
             <a:pPr marL="0" indent="0">
               <a:buNone/>
             </a:pPr>
-            <a:endParaRPr lang="en-GB" sz="2400" dirty="0">
+            <a:r>
+              <a:rPr lang="en-GB" sz="2200" dirty="0">
+                <a:solidFill>
+                  <a:schemeClr val="tx2">
+                    <a:lumMod val="50000"/>
+                    <a:lumOff val="50000"/>
+                  </a:schemeClr>
+                </a:solidFill>
+              </a:rPr>
+              <a:t>\</a:t>
+            </a:r>
+            <a:r>
+              <a:rPr lang="en-GB" sz="2200" dirty="0" err="1">
+                <a:solidFill>
+                  <a:schemeClr val="tx2">
+                    <a:lumMod val="50000"/>
+                    <a:lumOff val="50000"/>
+                  </a:schemeClr>
+                </a:solidFill>
+              </a:rPr>
+              <a:t>includegraphics</a:t>
+            </a:r>
+            <a:r>
+              <a:rPr lang="en-GB" sz="2200" dirty="0"/>
+              <a:t>[height=2cm] {</a:t>
+            </a:r>
+            <a:r>
+              <a:rPr lang="en-GB" sz="2200" dirty="0" err="1">
+                <a:solidFill>
+                  <a:schemeClr val="accent4">
+                    <a:lumMod val="75000"/>
+                  </a:schemeClr>
+                </a:solidFill>
+              </a:rPr>
+              <a:t>einstein_signature</a:t>
+            </a:r>
+            <a:r>
+              <a:rPr lang="en-GB" sz="2200" dirty="0"/>
+              <a:t>}</a:t>
+            </a:r>
+          </a:p>
+          <a:p>
+            <a:pPr marL="0" indent="0">
+              <a:buNone/>
+            </a:pPr>
+            <a:endParaRPr lang="en-GB" sz="2200" dirty="0"/>
+          </a:p>
+          <a:p>
+            <a:pPr marL="0" indent="0">
+              <a:buNone/>
+            </a:pPr>
+            <a:r>
+              <a:rPr lang="en-GB" sz="2200" dirty="0" err="1"/>
+              <a:t>A.Einstein</a:t>
+            </a:r>
+            <a:endParaRPr lang="en-GB" sz="2200" dirty="0"/>
+          </a:p>
+          <a:p>
+            <a:pPr marL="0" indent="0">
+              <a:buNone/>
+            </a:pPr>
+            <a:r>
+              <a:rPr lang="en-GB" sz="2200" dirty="0">
+                <a:solidFill>
+                  <a:schemeClr val="tx2">
+                    <a:lumMod val="50000"/>
+                    <a:lumOff val="50000"/>
+                  </a:schemeClr>
+                </a:solidFill>
+              </a:rPr>
+              <a:t>\</a:t>
+            </a:r>
+            <a:r>
+              <a:rPr lang="en-GB" sz="2200" dirty="0" err="1">
+                <a:solidFill>
+                  <a:schemeClr val="tx2">
+                    <a:lumMod val="50000"/>
+                    <a:lumOff val="50000"/>
+                  </a:schemeClr>
+                </a:solidFill>
+              </a:rPr>
+              <a:t>vspace</a:t>
+            </a:r>
+            <a:r>
+              <a:rPr lang="en-GB" sz="2200" dirty="0"/>
+              <a:t>{1cm}</a:t>
+            </a:r>
+          </a:p>
+          <a:p>
+            <a:pPr marL="0" indent="0">
+              <a:buNone/>
+            </a:pPr>
+            <a:endParaRPr lang="en-GB" sz="2200" dirty="0">
               <a:solidFill>
                 <a:schemeClr val="tx2">
                   <a:lumMod val="50000"/>
@@ -10174,48 +10942,51 @@
               <a:buNone/>
             </a:pPr>
             <a:r>
-              <a:rPr lang="en-GB" sz="2400" dirty="0">
-                <a:solidFill>
-                  <a:schemeClr val="tx2">
-                    <a:lumMod val="50000"/>
-                    <a:lumOff val="50000"/>
-                  </a:schemeClr>
-                </a:solidFill>
-              </a:rPr>
-              <a:t>\chapter</a:t>
-            </a:r>
-            <a:r>
-              <a:rPr lang="en-GB" sz="2400" dirty="0"/>
-              <a:t>*{Statement of Originality}</a:t>
+              <a:rPr lang="en-GB" sz="2200" dirty="0">
+                <a:solidFill>
+                  <a:schemeClr val="tx2">
+                    <a:lumMod val="50000"/>
+                    <a:lumOff val="50000"/>
+                  </a:schemeClr>
+                </a:solidFill>
+              </a:rPr>
+              <a:t>\</a:t>
+            </a:r>
+            <a:r>
+              <a:rPr lang="en-GB" sz="2200" dirty="0" err="1">
+                <a:solidFill>
+                  <a:schemeClr val="tx2">
+                    <a:lumMod val="50000"/>
+                    <a:lumOff val="50000"/>
+                  </a:schemeClr>
+                </a:solidFill>
+              </a:rPr>
+              <a:t>includegraphics</a:t>
+            </a:r>
+            <a:r>
+              <a:rPr lang="en-GB" sz="2200" dirty="0"/>
+              <a:t>[height=3cm] {</a:t>
+            </a:r>
+            <a:r>
+              <a:rPr lang="en-GB" sz="2200" dirty="0" err="1">
+                <a:solidFill>
+                  <a:schemeClr val="accent4">
+                    <a:lumMod val="75000"/>
+                  </a:schemeClr>
+                </a:solidFill>
+              </a:rPr>
+              <a:t>leonardo_signature</a:t>
+            </a:r>
+            <a:r>
+              <a:rPr lang="en-GB" sz="2200" dirty="0"/>
+              <a:t>}</a:t>
             </a:r>
           </a:p>
           <a:p>
             <a:pPr marL="0" indent="0">
               <a:buNone/>
             </a:pPr>
-            <a:r>
-              <a:rPr lang="en-GB" sz="2400" dirty="0">
-                <a:solidFill>
-                  <a:schemeClr val="tx2">
-                    <a:lumMod val="50000"/>
-                    <a:lumOff val="50000"/>
-                  </a:schemeClr>
-                </a:solidFill>
-              </a:rPr>
-              <a:t>\</a:t>
-            </a:r>
-            <a:r>
-              <a:rPr lang="en-GB" sz="2400" dirty="0" err="1">
-                <a:solidFill>
-                  <a:schemeClr val="tx2">
-                    <a:lumMod val="50000"/>
-                    <a:lumOff val="50000"/>
-                  </a:schemeClr>
-                </a:solidFill>
-              </a:rPr>
-              <a:t>blindtext</a:t>
-            </a:r>
-            <a:endParaRPr lang="en-GB" sz="2400" dirty="0">
+            <a:endParaRPr lang="en-GB" sz="2200" dirty="0">
               <a:solidFill>
                 <a:schemeClr val="tx2">
                   <a:lumMod val="50000"/>
@@ -10228,68 +10999,10 @@
             <a:pPr marL="0" indent="0">
               <a:buNone/>
             </a:pPr>
-            <a:endParaRPr lang="en-GB" sz="2400" dirty="0"/>
-          </a:p>
-          <a:p>
-            <a:pPr marL="0" indent="0">
-              <a:buNone/>
-            </a:pPr>
-            <a:r>
-              <a:rPr lang="en-GB" sz="2400" dirty="0">
-                <a:solidFill>
-                  <a:schemeClr val="tx2">
-                    <a:lumMod val="50000"/>
-                    <a:lumOff val="50000"/>
-                  </a:schemeClr>
-                </a:solidFill>
-              </a:rPr>
-              <a:t>\chapter</a:t>
-            </a:r>
-            <a:r>
-              <a:rPr lang="en-GB" sz="2400" dirty="0"/>
-              <a:t>*{Copyright Statement}</a:t>
-            </a:r>
-          </a:p>
-          <a:p>
-            <a:pPr marL="0" indent="0">
-              <a:buNone/>
-            </a:pPr>
-            <a:r>
-              <a:rPr lang="en-GB" sz="2400" dirty="0">
-                <a:solidFill>
-                  <a:schemeClr val="tx2">
-                    <a:lumMod val="50000"/>
-                    <a:lumOff val="50000"/>
-                  </a:schemeClr>
-                </a:solidFill>
-              </a:rPr>
-              <a:t>\</a:t>
-            </a:r>
-            <a:r>
-              <a:rPr lang="en-GB" sz="2400" dirty="0" err="1">
-                <a:solidFill>
-                  <a:schemeClr val="tx2">
-                    <a:lumMod val="50000"/>
-                    <a:lumOff val="50000"/>
-                  </a:schemeClr>
-                </a:solidFill>
-              </a:rPr>
-              <a:t>blindtext</a:t>
-            </a:r>
-            <a:endParaRPr lang="en-GB" sz="2400" dirty="0">
-              <a:solidFill>
-                <a:schemeClr val="tx2">
-                  <a:lumMod val="50000"/>
-                  <a:lumOff val="50000"/>
-                </a:schemeClr>
-              </a:solidFill>
-            </a:endParaRPr>
-          </a:p>
-          <a:p>
-            <a:pPr marL="0" indent="0">
-              <a:buNone/>
-            </a:pPr>
-            <a:endParaRPr lang="en-GB" sz="2400" dirty="0"/>
+            <a:r>
+              <a:rPr lang="en-GB" sz="2200" dirty="0"/>
+              <a:t>L. DiCaprio</a:t>
+            </a:r>
           </a:p>
         </p:txBody>
       </p:sp>
@@ -10329,12 +11042,51 @@
           </a:fontRef>
         </p:style>
       </p:cxnSp>
+      <p:sp>
+        <p:nvSpPr>
+          <p:cNvPr id="7" name="TextBox 6">
+            <a:extLst>
+              <a:ext uri="{FF2B5EF4-FFF2-40B4-BE49-F238E27FC236}">
+                <a16:creationId xmlns:a16="http://schemas.microsoft.com/office/drawing/2014/main" id="{B9D10ADD-E06C-4CC1-9F54-7F4A3325D545}"/>
+              </a:ext>
+            </a:extLst>
+          </p:cNvPr>
+          <p:cNvSpPr txBox="1"/>
+          <p:nvPr/>
+        </p:nvSpPr>
+        <p:spPr>
+          <a:xfrm>
+            <a:off x="7357241" y="6498021"/>
+            <a:ext cx="1697422" cy="369332"/>
+          </a:xfrm>
+          <a:prstGeom prst="rect">
+            <a:avLst/>
+          </a:prstGeom>
+          <a:noFill/>
+        </p:spPr>
+        <p:txBody>
+          <a:bodyPr wrap="square" rtlCol="0">
+            <a:spAutoFit/>
+          </a:bodyPr>
+          <a:lstStyle/>
+          <a:p>
+            <a:r>
+              <a:rPr lang="en-GB" dirty="0">
+                <a:solidFill>
+                  <a:schemeClr val="accent2"/>
+                </a:solidFill>
+              </a:rPr>
+              <a:t>Problem Sheet</a:t>
+            </a:r>
+          </a:p>
+        </p:txBody>
+      </p:sp>
       <p:pic>
         <p:nvPicPr>
-          <p:cNvPr id="6" name="Picture 5">
+          <p:cNvPr id="8" name="Picture 7">
             <a:extLst>
               <a:ext uri="{FF2B5EF4-FFF2-40B4-BE49-F238E27FC236}">
-                <a16:creationId xmlns:a16="http://schemas.microsoft.com/office/drawing/2014/main" id="{AC6D7D42-E3E3-477D-9DD7-F2123D77031D}"/>
+                <a16:creationId xmlns:a16="http://schemas.microsoft.com/office/drawing/2014/main" id="{C037CB9D-6AEB-6676-B9BE-0F8FADAF4071}"/>
               </a:ext>
             </a:extLst>
           </p:cNvPr>
@@ -10351,53 +11103,14 @@
         </p:blipFill>
         <p:spPr>
           <a:xfrm>
-            <a:off x="4719147" y="2388599"/>
-            <a:ext cx="3924762" cy="2080801"/>
+            <a:off x="4818532" y="1783995"/>
+            <a:ext cx="3784671" cy="4171510"/>
           </a:xfrm>
           <a:prstGeom prst="rect">
             <a:avLst/>
           </a:prstGeom>
         </p:spPr>
       </p:pic>
-      <p:sp>
-        <p:nvSpPr>
-          <p:cNvPr id="7" name="TextBox 6">
-            <a:extLst>
-              <a:ext uri="{FF2B5EF4-FFF2-40B4-BE49-F238E27FC236}">
-                <a16:creationId xmlns:a16="http://schemas.microsoft.com/office/drawing/2014/main" id="{B9D10ADD-E06C-4CC1-9F54-7F4A3325D545}"/>
-              </a:ext>
-            </a:extLst>
-          </p:cNvPr>
-          <p:cNvSpPr txBox="1"/>
-          <p:nvPr/>
-        </p:nvSpPr>
-        <p:spPr>
-          <a:xfrm>
-            <a:off x="7357241" y="6498021"/>
-            <a:ext cx="1697422" cy="369332"/>
-          </a:xfrm>
-          <a:prstGeom prst="rect">
-            <a:avLst/>
-          </a:prstGeom>
-          <a:noFill/>
-        </p:spPr>
-        <p:txBody>
-          <a:bodyPr wrap="square" rtlCol="0">
-            <a:spAutoFit/>
-          </a:bodyPr>
-          <a:lstStyle/>
-          <a:p>
-            <a:r>
-              <a:rPr lang="en-GB" dirty="0">
-                <a:solidFill>
-                  <a:schemeClr val="accent2"/>
-                </a:solidFill>
-              </a:rPr>
-              <a:t>Problem Sheet</a:t>
-            </a:r>
-          </a:p>
-        </p:txBody>
-      </p:sp>
     </p:spTree>
     <p:extLst>
       <p:ext uri="{BB962C8B-B14F-4D97-AF65-F5344CB8AC3E}">
@@ -16340,6 +17053,26 @@
           <a:p>
             <a:r>
               <a:rPr lang="en-GB" sz="2800" dirty="0"/>
+              <a:t>The </a:t>
+            </a:r>
+            <a:r>
+              <a:rPr lang="en-GB" sz="2800" dirty="0" err="1"/>
+              <a:t>UoL</a:t>
+            </a:r>
+            <a:r>
+              <a:rPr lang="en-GB" sz="2800" dirty="0"/>
+              <a:t> does not specify a format for bibliographies/citations</a:t>
+            </a:r>
+          </a:p>
+          <a:p>
+            <a:r>
+              <a:rPr lang="en-GB" sz="2800" dirty="0"/>
+              <a:t>For PhD theses, bibliographies are usually included at the end of the whole document</a:t>
+            </a:r>
+          </a:p>
+          <a:p>
+            <a:r>
+              <a:rPr lang="en-GB" sz="2800" dirty="0"/>
               <a:t>You will likely have a large number of references in your thesis</a:t>
             </a:r>
           </a:p>
@@ -16425,159 +17158,97 @@
           <a:p>
             <a:r>
               <a:rPr lang="en-GB" sz="4000" dirty="0"/>
-              <a:t>Overleaf</a:t>
+              <a:t>Using this PowerPoint</a:t>
             </a:r>
           </a:p>
         </p:txBody>
       </p:sp>
       <p:sp>
         <p:nvSpPr>
-          <p:cNvPr id="3" name="TextBox 2"/>
-          <p:cNvSpPr txBox="1"/>
-          <p:nvPr/>
+          <p:cNvPr id="3" name="Content Placeholder 2"/>
+          <p:cNvSpPr>
+            <a:spLocks noGrp="1"/>
+          </p:cNvSpPr>
+          <p:nvPr>
+            <p:ph idx="1"/>
+          </p:nvPr>
         </p:nvSpPr>
         <p:spPr>
           <a:xfrm>
-            <a:off x="457200" y="1625833"/>
-            <a:ext cx="7840980" cy="5447645"/>
+            <a:off x="457200" y="1600200"/>
+            <a:ext cx="8435280" cy="4876800"/>
           </a:xfrm>
-          <a:prstGeom prst="rect">
-            <a:avLst/>
-          </a:prstGeom>
-          <a:noFill/>
         </p:spPr>
         <p:txBody>
-          <a:bodyPr wrap="square" rtlCol="0">
-            <a:spAutoFit/>
+          <a:bodyPr>
+            <a:normAutofit/>
           </a:bodyPr>
           <a:lstStyle/>
           <a:p>
-            <a:pPr marL="457200" indent="-457200">
-              <a:buFont typeface="Arial" panose="020B0604020202020204" pitchFamily="34" charset="0"/>
-              <a:buChar char="•"/>
+            <a:pPr marL="0" lvl="0" indent="0" fontAlgn="base">
+              <a:spcBef>
+                <a:spcPts val="600"/>
+              </a:spcBef>
+              <a:spcAft>
+                <a:spcPts val="600"/>
+              </a:spcAft>
+              <a:buNone/>
             </a:pPr>
             <a:r>
+              <a:rPr lang="en-GB" sz="100" dirty="0"/>
+              <a:t> </a:t>
+            </a:r>
+          </a:p>
+          <a:p>
+            <a:r>
               <a:rPr lang="en-GB" sz="2400" dirty="0"/>
-              <a:t>Online environment for creating and compiling LaTeX documents</a:t>
-            </a:r>
-          </a:p>
-          <a:p>
-            <a:pPr marL="457200" indent="-457200">
-              <a:buFont typeface="Arial" panose="020B0604020202020204" pitchFamily="34" charset="0"/>
-              <a:buChar char="•"/>
+              <a:t>You can use whatever LaTeX editor/compiler you like</a:t>
+            </a:r>
+          </a:p>
+          <a:p>
+            <a:r>
+              <a:rPr lang="en-GB" sz="2400" dirty="0"/>
+              <a:t>Further notes and comments in the notes section of most slides</a:t>
+            </a:r>
+          </a:p>
+          <a:p>
+            <a:pPr lvl="1"/>
+            <a:r>
+              <a:rPr lang="en-GB" sz="2000" dirty="0"/>
+              <a:t>Annotates and explains the examples</a:t>
+            </a:r>
+          </a:p>
+          <a:p>
+            <a:r>
+              <a:rPr lang="en-GB" sz="2400" dirty="0"/>
+              <a:t>Notes also often contain links to Overleaf projects used to generate examples</a:t>
+            </a:r>
+          </a:p>
+          <a:p>
+            <a:pPr lvl="1"/>
+            <a:r>
+              <a:rPr lang="en-GB" sz="2000" dirty="0"/>
+              <a:t>Allows you to see the example in the context of a compete project</a:t>
+            </a:r>
+          </a:p>
+          <a:p>
+            <a:pPr marL="0" lvl="0" indent="0" fontAlgn="base">
+              <a:spcBef>
+                <a:spcPts val="600"/>
+              </a:spcBef>
+              <a:spcAft>
+                <a:spcPts val="600"/>
+              </a:spcAft>
+              <a:buNone/>
             </a:pPr>
-            <a:r>
-              <a:rPr lang="en-GB" sz="2400" dirty="0"/>
-              <a:t>Pros</a:t>
-            </a:r>
-          </a:p>
-          <a:p>
-            <a:pPr marL="914400" lvl="1" indent="-457200">
-              <a:buFont typeface="Arial" panose="020B0604020202020204" pitchFamily="34" charset="0"/>
-              <a:buChar char="•"/>
-            </a:pPr>
-            <a:r>
-              <a:rPr lang="en-GB" sz="2400" dirty="0"/>
-              <a:t>Cross-platform</a:t>
-            </a:r>
-          </a:p>
-          <a:p>
-            <a:pPr marL="914400" lvl="1" indent="-457200">
-              <a:buFont typeface="Arial" panose="020B0604020202020204" pitchFamily="34" charset="0"/>
-              <a:buChar char="•"/>
-            </a:pPr>
-            <a:r>
-              <a:rPr lang="en-GB" sz="2400" dirty="0"/>
-              <a:t>Complete</a:t>
-            </a:r>
-          </a:p>
-          <a:p>
-            <a:pPr marL="914400" lvl="1" indent="-457200">
-              <a:buFont typeface="Arial" panose="020B0604020202020204" pitchFamily="34" charset="0"/>
-              <a:buChar char="•"/>
-            </a:pPr>
-            <a:r>
-              <a:rPr lang="en-GB" sz="2400" dirty="0"/>
-              <a:t>Easy to use</a:t>
-            </a:r>
-          </a:p>
-          <a:p>
-            <a:pPr marL="914400" lvl="1" indent="-457200">
-              <a:buFont typeface="Arial" panose="020B0604020202020204" pitchFamily="34" charset="0"/>
-              <a:buChar char="•"/>
-            </a:pPr>
-            <a:r>
-              <a:rPr lang="en-GB" sz="2400" dirty="0"/>
-              <a:t>Allows collaboration</a:t>
-            </a:r>
-          </a:p>
-          <a:p>
-            <a:pPr marL="914400" lvl="1" indent="-457200">
-              <a:buFont typeface="Arial" panose="020B0604020202020204" pitchFamily="34" charset="0"/>
-              <a:buChar char="•"/>
-            </a:pPr>
-            <a:r>
-              <a:rPr lang="en-GB" sz="2400" dirty="0"/>
-              <a:t>Cloud syncing with Dropbox and </a:t>
-            </a:r>
-            <a:r>
-              <a:rPr lang="en-GB" sz="2400" dirty="0" err="1"/>
-              <a:t>Github</a:t>
-            </a:r>
             <a:endParaRPr lang="en-GB" sz="2400" dirty="0"/>
-          </a:p>
-          <a:p>
-            <a:pPr marL="914400" lvl="1" indent="-457200">
-              <a:buFont typeface="Arial" panose="020B0604020202020204" pitchFamily="34" charset="0"/>
-              <a:buChar char="•"/>
-            </a:pPr>
-            <a:r>
-              <a:rPr lang="en-GB" sz="2400" dirty="0"/>
-              <a:t>Integrated “review” system for feedback</a:t>
-            </a:r>
-          </a:p>
-          <a:p>
-            <a:pPr marL="457200" indent="-457200">
-              <a:buFont typeface="Arial" panose="020B0604020202020204" pitchFamily="34" charset="0"/>
-              <a:buChar char="•"/>
-            </a:pPr>
-            <a:r>
-              <a:rPr lang="en-GB" sz="2400" dirty="0"/>
-              <a:t>Cons</a:t>
-            </a:r>
-          </a:p>
-          <a:p>
-            <a:pPr marL="914400" lvl="1" indent="-457200">
-              <a:buFont typeface="Arial" panose="020B0604020202020204" pitchFamily="34" charset="0"/>
-              <a:buChar char="•"/>
-            </a:pPr>
-            <a:r>
-              <a:rPr lang="en-GB" sz="2400" dirty="0"/>
-              <a:t>Editor online only</a:t>
-            </a:r>
-          </a:p>
-          <a:p>
-            <a:pPr marL="914400" lvl="1" indent="-457200">
-              <a:buFont typeface="Arial" panose="020B0604020202020204" pitchFamily="34" charset="0"/>
-              <a:buChar char="•"/>
-            </a:pPr>
-            <a:r>
-              <a:rPr lang="en-GB" sz="2400" dirty="0"/>
-              <a:t>Data stored online – patient records</a:t>
-            </a:r>
-          </a:p>
-          <a:p>
-            <a:endParaRPr lang="en-GB" sz="3000" dirty="0"/>
-          </a:p>
-          <a:p>
-            <a:endParaRPr lang="en-GB" sz="3000" dirty="0"/>
           </a:p>
         </p:txBody>
       </p:sp>
     </p:spTree>
     <p:extLst>
       <p:ext uri="{BB962C8B-B14F-4D97-AF65-F5344CB8AC3E}">
-        <p14:creationId xmlns:p14="http://schemas.microsoft.com/office/powerpoint/2010/main" val="3718216746"/>
+        <p14:creationId xmlns:p14="http://schemas.microsoft.com/office/powerpoint/2010/main" val="634929309"/>
       </p:ext>
     </p:extLst>
   </p:cSld>
@@ -17551,6 +18222,662 @@
           <a:p>
             <a:r>
               <a:rPr lang="en-GB" sz="4000" dirty="0"/>
+              <a:t>Bibliography at the </a:t>
+            </a:r>
+            <a:br>
+              <a:rPr lang="en-GB" sz="4000" dirty="0"/>
+            </a:br>
+            <a:r>
+              <a:rPr lang="en-GB" sz="4000" dirty="0"/>
+              <a:t>End of Each Chapter</a:t>
+            </a:r>
+          </a:p>
+        </p:txBody>
+      </p:sp>
+      <p:grpSp>
+        <p:nvGrpSpPr>
+          <p:cNvPr id="5" name="Group 4">
+            <a:extLst>
+              <a:ext uri="{FF2B5EF4-FFF2-40B4-BE49-F238E27FC236}">
+                <a16:creationId xmlns:a16="http://schemas.microsoft.com/office/drawing/2014/main" id="{F5455341-BD23-481A-BFA7-330F1E8E3283}"/>
+              </a:ext>
+            </a:extLst>
+          </p:cNvPr>
+          <p:cNvGrpSpPr/>
+          <p:nvPr/>
+        </p:nvGrpSpPr>
+        <p:grpSpPr>
+          <a:xfrm>
+            <a:off x="237685" y="2873640"/>
+            <a:ext cx="4536872" cy="3428954"/>
+            <a:chOff x="191387" y="1449022"/>
+            <a:chExt cx="4221840" cy="3428954"/>
+          </a:xfrm>
+        </p:grpSpPr>
+        <p:sp>
+          <p:nvSpPr>
+            <p:cNvPr id="3" name="Rectangle 2">
+              <a:extLst>
+                <a:ext uri="{FF2B5EF4-FFF2-40B4-BE49-F238E27FC236}">
+                  <a16:creationId xmlns:a16="http://schemas.microsoft.com/office/drawing/2014/main" id="{603AC519-287E-431C-AC14-B4D6EEF203DB}"/>
+                </a:ext>
+              </a:extLst>
+            </p:cNvPr>
+            <p:cNvSpPr/>
+            <p:nvPr/>
+          </p:nvSpPr>
+          <p:spPr>
+            <a:xfrm>
+              <a:off x="191387" y="1830988"/>
+              <a:ext cx="4221840" cy="3046988"/>
+            </a:xfrm>
+            <a:prstGeom prst="rect">
+              <a:avLst/>
+            </a:prstGeom>
+            <a:ln w="28575">
+              <a:solidFill>
+                <a:schemeClr val="accent2"/>
+              </a:solidFill>
+            </a:ln>
+          </p:spPr>
+          <p:txBody>
+            <a:bodyPr wrap="square">
+              <a:spAutoFit/>
+            </a:bodyPr>
+            <a:lstStyle/>
+            <a:p>
+              <a:r>
+                <a:rPr lang="en-GB" sz="2400" dirty="0">
+                  <a:solidFill>
+                    <a:schemeClr val="tx2">
+                      <a:lumMod val="50000"/>
+                      <a:lumOff val="50000"/>
+                    </a:schemeClr>
+                  </a:solidFill>
+                </a:rPr>
+                <a:t>\</a:t>
+              </a:r>
+              <a:r>
+                <a:rPr lang="en-GB" sz="2400" dirty="0" err="1">
+                  <a:solidFill>
+                    <a:schemeClr val="tx2">
+                      <a:lumMod val="50000"/>
+                      <a:lumOff val="50000"/>
+                    </a:schemeClr>
+                  </a:solidFill>
+                </a:rPr>
+                <a:t>usepackage</a:t>
+              </a:r>
+              <a:r>
+                <a:rPr lang="en-GB" sz="2400" dirty="0"/>
+                <a:t>[</a:t>
+              </a:r>
+              <a:r>
+                <a:rPr lang="en-GB" sz="2400" dirty="0" err="1">
+                  <a:solidFill>
+                    <a:schemeClr val="accent4">
+                      <a:lumMod val="75000"/>
+                    </a:schemeClr>
+                  </a:solidFill>
+                </a:rPr>
+                <a:t>sectionbib</a:t>
+              </a:r>
+              <a:r>
+                <a:rPr lang="en-GB" sz="2400" dirty="0"/>
+                <a:t>]{natbib}</a:t>
+              </a:r>
+            </a:p>
+            <a:p>
+              <a:r>
+                <a:rPr lang="en-GB" sz="2400" dirty="0">
+                  <a:solidFill>
+                    <a:schemeClr val="tx2">
+                      <a:lumMod val="50000"/>
+                      <a:lumOff val="50000"/>
+                    </a:schemeClr>
+                  </a:solidFill>
+                </a:rPr>
+                <a:t>\</a:t>
+              </a:r>
+              <a:r>
+                <a:rPr lang="en-GB" sz="2400" dirty="0" err="1">
+                  <a:solidFill>
+                    <a:schemeClr val="tx2">
+                      <a:lumMod val="50000"/>
+                      <a:lumOff val="50000"/>
+                    </a:schemeClr>
+                  </a:solidFill>
+                </a:rPr>
+                <a:t>usepackage</a:t>
+              </a:r>
+              <a:r>
+                <a:rPr lang="en-GB" sz="2400" dirty="0"/>
+                <a:t>{</a:t>
+              </a:r>
+              <a:r>
+                <a:rPr lang="en-GB" sz="2400" dirty="0" err="1"/>
+                <a:t>chapterbib</a:t>
+              </a:r>
+              <a:r>
+                <a:rPr lang="en-GB" sz="2400" dirty="0"/>
+                <a:t>}  </a:t>
+              </a:r>
+            </a:p>
+            <a:p>
+              <a:endParaRPr lang="en-GB" sz="2400" dirty="0">
+                <a:solidFill>
+                  <a:schemeClr val="tx2">
+                    <a:lumMod val="50000"/>
+                    <a:lumOff val="50000"/>
+                  </a:schemeClr>
+                </a:solidFill>
+              </a:endParaRPr>
+            </a:p>
+            <a:p>
+              <a:r>
+                <a:rPr lang="en-GB" sz="2400" dirty="0">
+                  <a:solidFill>
+                    <a:schemeClr val="tx2">
+                      <a:lumMod val="50000"/>
+                      <a:lumOff val="50000"/>
+                    </a:schemeClr>
+                  </a:solidFill>
+                </a:rPr>
+                <a:t>\begin</a:t>
+              </a:r>
+              <a:r>
+                <a:rPr lang="en-GB" sz="2400" dirty="0"/>
+                <a:t>{</a:t>
+              </a:r>
+              <a:r>
+                <a:rPr lang="en-GB" sz="2400" dirty="0">
+                  <a:solidFill>
+                    <a:schemeClr val="accent4">
+                      <a:lumMod val="75000"/>
+                    </a:schemeClr>
+                  </a:solidFill>
+                </a:rPr>
+                <a:t>document</a:t>
+              </a:r>
+              <a:r>
+                <a:rPr lang="en-GB" sz="2400" dirty="0"/>
+                <a:t>}</a:t>
+              </a:r>
+            </a:p>
+            <a:p>
+              <a:endParaRPr lang="en-GB" sz="2400" dirty="0">
+                <a:solidFill>
+                  <a:schemeClr val="tx2">
+                    <a:lumMod val="50000"/>
+                    <a:lumOff val="50000"/>
+                  </a:schemeClr>
+                </a:solidFill>
+              </a:endParaRPr>
+            </a:p>
+            <a:p>
+              <a:r>
+                <a:rPr lang="en-GB" sz="2400" dirty="0">
+                  <a:solidFill>
+                    <a:schemeClr val="tx2">
+                      <a:lumMod val="50000"/>
+                      <a:lumOff val="50000"/>
+                    </a:schemeClr>
+                  </a:solidFill>
+                </a:rPr>
+                <a:t>\include</a:t>
+              </a:r>
+              <a:r>
+                <a:rPr lang="en-GB" sz="2400" dirty="0"/>
+                <a:t>{</a:t>
+              </a:r>
+              <a:r>
+                <a:rPr lang="en-GB" sz="2400" dirty="0">
+                  <a:solidFill>
+                    <a:schemeClr val="accent4">
+                      <a:lumMod val="75000"/>
+                    </a:schemeClr>
+                  </a:solidFill>
+                </a:rPr>
+                <a:t>introduction</a:t>
+              </a:r>
+              <a:r>
+                <a:rPr lang="en-GB" sz="2400" dirty="0"/>
+                <a:t>}</a:t>
+              </a:r>
+            </a:p>
+            <a:p>
+              <a:endParaRPr lang="en-GB" sz="2400" dirty="0">
+                <a:solidFill>
+                  <a:schemeClr val="tx2">
+                    <a:lumMod val="50000"/>
+                    <a:lumOff val="50000"/>
+                  </a:schemeClr>
+                </a:solidFill>
+              </a:endParaRPr>
+            </a:p>
+            <a:p>
+              <a:r>
+                <a:rPr lang="en-GB" sz="2400" dirty="0">
+                  <a:solidFill>
+                    <a:schemeClr val="tx2">
+                      <a:lumMod val="50000"/>
+                      <a:lumOff val="50000"/>
+                    </a:schemeClr>
+                  </a:solidFill>
+                </a:rPr>
+                <a:t>\include</a:t>
+              </a:r>
+              <a:r>
+                <a:rPr lang="en-GB" sz="2400" dirty="0"/>
+                <a:t>{</a:t>
+              </a:r>
+              <a:r>
+                <a:rPr lang="en-GB" sz="2400" dirty="0" err="1">
+                  <a:solidFill>
+                    <a:schemeClr val="accent4">
+                      <a:lumMod val="75000"/>
+                    </a:schemeClr>
+                  </a:solidFill>
+                </a:rPr>
+                <a:t>literature_review</a:t>
+              </a:r>
+              <a:r>
+                <a:rPr lang="en-GB" sz="2400" dirty="0"/>
+                <a:t>}</a:t>
+              </a:r>
+            </a:p>
+          </p:txBody>
+        </p:sp>
+        <p:sp>
+          <p:nvSpPr>
+            <p:cNvPr id="4" name="TextBox 3">
+              <a:extLst>
+                <a:ext uri="{FF2B5EF4-FFF2-40B4-BE49-F238E27FC236}">
+                  <a16:creationId xmlns:a16="http://schemas.microsoft.com/office/drawing/2014/main" id="{C5CC6226-7951-424D-BA3D-A8C35C092F26}"/>
+                </a:ext>
+              </a:extLst>
+            </p:cNvPr>
+            <p:cNvSpPr txBox="1"/>
+            <p:nvPr/>
+          </p:nvSpPr>
+          <p:spPr>
+            <a:xfrm>
+              <a:off x="191387" y="1449022"/>
+              <a:ext cx="2032523" cy="369332"/>
+            </a:xfrm>
+            <a:prstGeom prst="rect">
+              <a:avLst/>
+            </a:prstGeom>
+            <a:noFill/>
+          </p:spPr>
+          <p:txBody>
+            <a:bodyPr wrap="square" rtlCol="0">
+              <a:spAutoFit/>
+            </a:bodyPr>
+            <a:lstStyle/>
+            <a:p>
+              <a:r>
+                <a:rPr lang="en-GB" dirty="0" err="1">
+                  <a:solidFill>
+                    <a:schemeClr val="accent2"/>
+                  </a:solidFill>
+                </a:rPr>
+                <a:t>main.tex</a:t>
+              </a:r>
+              <a:endParaRPr lang="en-GB" dirty="0">
+                <a:solidFill>
+                  <a:schemeClr val="accent2"/>
+                </a:solidFill>
+              </a:endParaRPr>
+            </a:p>
+          </p:txBody>
+        </p:sp>
+      </p:grpSp>
+      <p:sp>
+        <p:nvSpPr>
+          <p:cNvPr id="6" name="Content Placeholder 6">
+            <a:extLst>
+              <a:ext uri="{FF2B5EF4-FFF2-40B4-BE49-F238E27FC236}">
+                <a16:creationId xmlns:a16="http://schemas.microsoft.com/office/drawing/2014/main" id="{BD51EB6C-9A9A-4D69-226A-685D23842974}"/>
+              </a:ext>
+            </a:extLst>
+          </p:cNvPr>
+          <p:cNvSpPr>
+            <a:spLocks noGrp="1"/>
+          </p:cNvSpPr>
+          <p:nvPr>
+            <p:ph idx="1"/>
+          </p:nvPr>
+        </p:nvSpPr>
+        <p:spPr>
+          <a:xfrm>
+            <a:off x="457200" y="1645544"/>
+            <a:ext cx="8189089" cy="914661"/>
+          </a:xfrm>
+        </p:spPr>
+        <p:txBody>
+          <a:bodyPr/>
+          <a:lstStyle/>
+          <a:p>
+            <a:r>
+              <a:rPr lang="en-GB" sz="2000" dirty="0"/>
+              <a:t>MD(Res) thesis commonly have bibliography at the end of each chapter</a:t>
+            </a:r>
+          </a:p>
+          <a:p>
+            <a:r>
+              <a:rPr lang="en-GB" sz="2000" dirty="0"/>
+              <a:t>Can achieve this with </a:t>
+            </a:r>
+            <a:r>
+              <a:rPr lang="en-GB" sz="2000" dirty="0" err="1"/>
+              <a:t>chapterbib</a:t>
+            </a:r>
+            <a:r>
+              <a:rPr lang="en-GB" sz="2000" dirty="0"/>
+              <a:t> package </a:t>
+            </a:r>
+          </a:p>
+          <a:p>
+            <a:pPr lvl="1"/>
+            <a:endParaRPr lang="en-GB" sz="1600" dirty="0"/>
+          </a:p>
+        </p:txBody>
+      </p:sp>
+      <p:grpSp>
+        <p:nvGrpSpPr>
+          <p:cNvPr id="8" name="Group 7">
+            <a:extLst>
+              <a:ext uri="{FF2B5EF4-FFF2-40B4-BE49-F238E27FC236}">
+                <a16:creationId xmlns:a16="http://schemas.microsoft.com/office/drawing/2014/main" id="{FB68D34C-A625-BE8F-F428-C0A9BDE333D6}"/>
+              </a:ext>
+            </a:extLst>
+          </p:cNvPr>
+          <p:cNvGrpSpPr/>
+          <p:nvPr/>
+        </p:nvGrpSpPr>
+        <p:grpSpPr>
+          <a:xfrm>
+            <a:off x="5040774" y="2873639"/>
+            <a:ext cx="3865541" cy="2680763"/>
+            <a:chOff x="191387" y="1449022"/>
+            <a:chExt cx="4221840" cy="2749340"/>
+          </a:xfrm>
+        </p:grpSpPr>
+        <p:sp>
+          <p:nvSpPr>
+            <p:cNvPr id="9" name="Rectangle 8">
+              <a:extLst>
+                <a:ext uri="{FF2B5EF4-FFF2-40B4-BE49-F238E27FC236}">
+                  <a16:creationId xmlns:a16="http://schemas.microsoft.com/office/drawing/2014/main" id="{EA243498-31B9-A912-0F4D-1CCDBC3D9A07}"/>
+                </a:ext>
+              </a:extLst>
+            </p:cNvPr>
+            <p:cNvSpPr/>
+            <p:nvPr/>
+          </p:nvSpPr>
+          <p:spPr>
+            <a:xfrm>
+              <a:off x="191387" y="1830988"/>
+              <a:ext cx="4221840" cy="2367374"/>
+            </a:xfrm>
+            <a:prstGeom prst="rect">
+              <a:avLst/>
+            </a:prstGeom>
+            <a:ln w="28575">
+              <a:solidFill>
+                <a:schemeClr val="accent1">
+                  <a:lumMod val="75000"/>
+                </a:schemeClr>
+              </a:solidFill>
+            </a:ln>
+          </p:spPr>
+          <p:txBody>
+            <a:bodyPr wrap="square">
+              <a:spAutoFit/>
+            </a:bodyPr>
+            <a:lstStyle/>
+            <a:p>
+              <a:r>
+                <a:rPr lang="en-GB" sz="2400" dirty="0">
+                  <a:solidFill>
+                    <a:schemeClr val="tx2">
+                      <a:lumMod val="50000"/>
+                      <a:lumOff val="50000"/>
+                    </a:schemeClr>
+                  </a:solidFill>
+                </a:rPr>
+                <a:t>\chapter</a:t>
+              </a:r>
+              <a:r>
+                <a:rPr lang="en-GB" sz="2400" dirty="0"/>
+                <a:t>{</a:t>
+              </a:r>
+              <a:r>
+                <a:rPr lang="en-GB" sz="2400" dirty="0">
+                  <a:solidFill>
+                    <a:schemeClr val="accent4">
+                      <a:lumMod val="75000"/>
+                    </a:schemeClr>
+                  </a:solidFill>
+                </a:rPr>
+                <a:t>Introduction</a:t>
+              </a:r>
+              <a:r>
+                <a:rPr lang="en-GB" sz="2400" dirty="0"/>
+                <a:t>}</a:t>
+              </a:r>
+            </a:p>
+            <a:p>
+              <a:endParaRPr lang="en-GB" sz="2400" dirty="0">
+                <a:solidFill>
+                  <a:schemeClr val="tx2">
+                    <a:lumMod val="50000"/>
+                    <a:lumOff val="50000"/>
+                  </a:schemeClr>
+                </a:solidFill>
+              </a:endParaRPr>
+            </a:p>
+            <a:p>
+              <a:r>
+                <a:rPr lang="en-GB" sz="2400" dirty="0">
+                  <a:solidFill>
+                    <a:schemeClr val="tx2">
+                      <a:lumMod val="50000"/>
+                      <a:lumOff val="50000"/>
+                    </a:schemeClr>
+                  </a:solidFill>
+                </a:rPr>
+                <a:t>\cite</a:t>
+              </a:r>
+              <a:r>
+                <a:rPr lang="en-GB" sz="2400" dirty="0"/>
+                <a:t>{</a:t>
+              </a:r>
+              <a:r>
+                <a:rPr lang="en-GB" sz="2400" dirty="0">
+                  <a:solidFill>
+                    <a:schemeClr val="accent4">
+                      <a:lumMod val="75000"/>
+                    </a:schemeClr>
+                  </a:solidFill>
+                </a:rPr>
+                <a:t>Thor_2011</a:t>
+              </a:r>
+              <a:r>
+                <a:rPr lang="en-GB" sz="2400" dirty="0"/>
+                <a:t>}</a:t>
+              </a:r>
+            </a:p>
+            <a:p>
+              <a:endParaRPr lang="en-GB" sz="2400" dirty="0">
+                <a:solidFill>
+                  <a:schemeClr val="tx2">
+                    <a:lumMod val="50000"/>
+                    <a:lumOff val="50000"/>
+                  </a:schemeClr>
+                </a:solidFill>
+              </a:endParaRPr>
+            </a:p>
+            <a:p>
+              <a:r>
+                <a:rPr lang="en-GB" sz="2400" dirty="0">
+                  <a:solidFill>
+                    <a:schemeClr val="tx2">
+                      <a:lumMod val="50000"/>
+                      <a:lumOff val="50000"/>
+                    </a:schemeClr>
+                  </a:solidFill>
+                </a:rPr>
+                <a:t>\</a:t>
+              </a:r>
+              <a:r>
+                <a:rPr lang="en-GB" sz="2400" dirty="0" err="1">
+                  <a:solidFill>
+                    <a:schemeClr val="tx2">
+                      <a:lumMod val="50000"/>
+                      <a:lumOff val="50000"/>
+                    </a:schemeClr>
+                  </a:solidFill>
+                </a:rPr>
+                <a:t>bibliographystyle</a:t>
+              </a:r>
+              <a:r>
+                <a:rPr lang="en-GB" sz="2400" dirty="0"/>
+                <a:t>{</a:t>
+              </a:r>
+              <a:r>
+                <a:rPr lang="en-GB" sz="2400" dirty="0" err="1"/>
+                <a:t>plainnat</a:t>
+              </a:r>
+              <a:r>
+                <a:rPr lang="en-GB" sz="2400" dirty="0"/>
+                <a:t>}</a:t>
+              </a:r>
+            </a:p>
+            <a:p>
+              <a:r>
+                <a:rPr lang="en-GB" sz="2400" dirty="0">
+                  <a:solidFill>
+                    <a:schemeClr val="tx2">
+                      <a:lumMod val="50000"/>
+                      <a:lumOff val="50000"/>
+                    </a:schemeClr>
+                  </a:solidFill>
+                </a:rPr>
+                <a:t>\bibliography</a:t>
+              </a:r>
+              <a:r>
+                <a:rPr lang="en-GB" sz="2400" dirty="0"/>
+                <a:t>{references}</a:t>
+              </a:r>
+            </a:p>
+          </p:txBody>
+        </p:sp>
+        <p:sp>
+          <p:nvSpPr>
+            <p:cNvPr id="10" name="TextBox 9">
+              <a:extLst>
+                <a:ext uri="{FF2B5EF4-FFF2-40B4-BE49-F238E27FC236}">
+                  <a16:creationId xmlns:a16="http://schemas.microsoft.com/office/drawing/2014/main" id="{36DD14B0-4FF1-60E2-AA50-1CA33783667B}"/>
+                </a:ext>
+              </a:extLst>
+            </p:cNvPr>
+            <p:cNvSpPr txBox="1"/>
+            <p:nvPr/>
+          </p:nvSpPr>
+          <p:spPr>
+            <a:xfrm>
+              <a:off x="191387" y="1449022"/>
+              <a:ext cx="2151272" cy="378780"/>
+            </a:xfrm>
+            <a:prstGeom prst="rect">
+              <a:avLst/>
+            </a:prstGeom>
+            <a:noFill/>
+          </p:spPr>
+          <p:txBody>
+            <a:bodyPr wrap="square" rtlCol="0">
+              <a:spAutoFit/>
+            </a:bodyPr>
+            <a:lstStyle/>
+            <a:p>
+              <a:r>
+                <a:rPr lang="en-GB" dirty="0" err="1">
+                  <a:solidFill>
+                    <a:schemeClr val="accent1">
+                      <a:lumMod val="75000"/>
+                    </a:schemeClr>
+                  </a:solidFill>
+                </a:rPr>
+                <a:t>introduction.tex</a:t>
+              </a:r>
+              <a:endParaRPr lang="en-GB" dirty="0">
+                <a:solidFill>
+                  <a:schemeClr val="accent1">
+                    <a:lumMod val="75000"/>
+                  </a:schemeClr>
+                </a:solidFill>
+              </a:endParaRPr>
+            </a:p>
+          </p:txBody>
+        </p:sp>
+      </p:grpSp>
+    </p:spTree>
+    <p:extLst>
+      <p:ext uri="{BB962C8B-B14F-4D97-AF65-F5344CB8AC3E}">
+        <p14:creationId xmlns:p14="http://schemas.microsoft.com/office/powerpoint/2010/main" val="1363280479"/>
+      </p:ext>
+    </p:extLst>
+  </p:cSld>
+  <p:clrMapOvr>
+    <a:masterClrMapping/>
+  </p:clrMapOvr>
+  <mc:AlternateContent xmlns:mc="http://schemas.openxmlformats.org/markup-compatibility/2006">
+    <mc:Choice xmlns:p14="http://schemas.microsoft.com/office/powerpoint/2010/main" Requires="p14">
+      <p:transition p14:dur="10"/>
+    </mc:Choice>
+    <mc:Fallback>
+      <p:transition/>
+    </mc:Fallback>
+  </mc:AlternateContent>
+</p:sld>
+</file>
+
+<file path=ppt/slides/slide33.xml><?xml version="1.0" encoding="utf-8"?>
+<p:sld xmlns:a="http://schemas.openxmlformats.org/drawingml/2006/main" xmlns:r="http://schemas.openxmlformats.org/officeDocument/2006/relationships" xmlns:p="http://schemas.openxmlformats.org/presentationml/2006/main">
+  <p:cSld>
+    <p:spTree>
+      <p:nvGrpSpPr>
+        <p:cNvPr id="1" name=""/>
+        <p:cNvGrpSpPr/>
+        <p:nvPr/>
+      </p:nvGrpSpPr>
+      <p:grpSpPr>
+        <a:xfrm>
+          <a:off x="0" y="0"/>
+          <a:ext cx="0" cy="0"/>
+          <a:chOff x="0" y="0"/>
+          <a:chExt cx="0" cy="0"/>
+        </a:xfrm>
+      </p:grpSpPr>
+      <p:sp>
+        <p:nvSpPr>
+          <p:cNvPr id="2" name="Title 1"/>
+          <p:cNvSpPr>
+            <a:spLocks noGrp="1"/>
+          </p:cNvSpPr>
+          <p:nvPr>
+            <p:ph type="title"/>
+          </p:nvPr>
+        </p:nvSpPr>
+        <p:spPr/>
+        <p:txBody>
+          <a:bodyPr/>
+          <a:lstStyle/>
+          <a:p>
+            <a:r>
+              <a:rPr lang="en-GB" sz="4000" dirty="0"/>
               <a:t>Personalising References</a:t>
             </a:r>
           </a:p>
@@ -17982,7 +19309,7 @@
 </p:sld>
 </file>
 
-<file path=ppt/slides/slide33.xml><?xml version="1.0" encoding="utf-8"?>
+<file path=ppt/slides/slide34.xml><?xml version="1.0" encoding="utf-8"?>
 <p:sld xmlns:a="http://schemas.openxmlformats.org/drawingml/2006/main" xmlns:r="http://schemas.openxmlformats.org/officeDocument/2006/relationships" xmlns:p="http://schemas.openxmlformats.org/presentationml/2006/main">
   <p:cSld>
     <p:spTree>
@@ -18288,7 +19615,7 @@
 </p:sld>
 </file>
 
-<file path=ppt/slides/slide34.xml><?xml version="1.0" encoding="utf-8"?>
+<file path=ppt/slides/slide35.xml><?xml version="1.0" encoding="utf-8"?>
 <p:sld xmlns:a="http://schemas.openxmlformats.org/drawingml/2006/main" xmlns:r="http://schemas.openxmlformats.org/officeDocument/2006/relationships" xmlns:p="http://schemas.openxmlformats.org/presentationml/2006/main">
   <p:cSld>
     <p:spTree>
@@ -18566,7 +19893,7 @@
 </p:sld>
 </file>
 
-<file path=ppt/slides/slide35.xml><?xml version="1.0" encoding="utf-8"?>
+<file path=ppt/slides/slide36.xml><?xml version="1.0" encoding="utf-8"?>
 <p:sld xmlns:a="http://schemas.openxmlformats.org/drawingml/2006/main" xmlns:r="http://schemas.openxmlformats.org/officeDocument/2006/relationships" xmlns:p="http://schemas.openxmlformats.org/presentationml/2006/main">
   <p:cSld>
     <p:spTree>
@@ -19044,7 +20371,7 @@
 </p:sld>
 </file>
 
-<file path=ppt/slides/slide36.xml><?xml version="1.0" encoding="utf-8"?>
+<file path=ppt/slides/slide37.xml><?xml version="1.0" encoding="utf-8"?>
 <p:sld xmlns:a="http://schemas.openxmlformats.org/drawingml/2006/main" xmlns:r="http://schemas.openxmlformats.org/officeDocument/2006/relationships" xmlns:p="http://schemas.openxmlformats.org/presentationml/2006/main">
   <p:cSld>
     <p:spTree>
@@ -19526,7 +20853,7 @@
 </p:sld>
 </file>
 
-<file path=ppt/slides/slide37.xml><?xml version="1.0" encoding="utf-8"?>
+<file path=ppt/slides/slide38.xml><?xml version="1.0" encoding="utf-8"?>
 <p:sld xmlns:a="http://schemas.openxmlformats.org/drawingml/2006/main" xmlns:r="http://schemas.openxmlformats.org/officeDocument/2006/relationships" xmlns:p="http://schemas.openxmlformats.org/presentationml/2006/main">
   <p:cSld>
     <p:spTree>
@@ -19742,7 +21069,7 @@
 </p:sld>
 </file>
 
-<file path=ppt/slides/slide38.xml><?xml version="1.0" encoding="utf-8"?>
+<file path=ppt/slides/slide39.xml><?xml version="1.0" encoding="utf-8"?>
 <p:sld xmlns:a="http://schemas.openxmlformats.org/drawingml/2006/main" xmlns:r="http://schemas.openxmlformats.org/officeDocument/2006/relationships" xmlns:p="http://schemas.openxmlformats.org/presentationml/2006/main">
   <p:cSld>
     <p:spTree>
@@ -20148,8 +21475,15 @@
             </a:pPr>
             <a:r>
               <a:rPr lang="en-GB" sz="2400" dirty="0"/>
-              <a:t>Library Theses Office guidance included in repository</a:t>
-            </a:r>
+              <a:t>Library Theses Office guidance </a:t>
+            </a:r>
+            <a:r>
+              <a:rPr lang="en-GB" sz="2400" dirty="0">
+                <a:hlinkClick r:id="rId3"/>
+              </a:rPr>
+              <a:t>included in repository</a:t>
+            </a:r>
+            <a:endParaRPr lang="en-GB" sz="2400" dirty="0"/>
           </a:p>
           <a:p>
             <a:pPr fontAlgn="base">
@@ -20162,7 +21496,7 @@
             </a:pPr>
             <a:r>
               <a:rPr lang="en-GB" sz="2400" dirty="0"/>
-              <a:t>Few restrictive requirements</a:t>
+              <a:t>Not longer than 100,000 words (excluding bibliography and appendices)</a:t>
             </a:r>
           </a:p>
           <a:p>
@@ -20175,8 +21509,28 @@
               </a:spcAft>
             </a:pPr>
             <a:r>
+              <a:rPr lang="en-GB" sz="2400" dirty="0">
+                <a:hlinkClick r:id="rId4"/>
+              </a:rPr>
+              <a:t>Good Viva </a:t>
+            </a:r>
+            <a:r>
               <a:rPr lang="en-GB" sz="2400" dirty="0"/>
-              <a:t>Not longer than 100,000 words (excluding bibliography and appendices)</a:t>
+              <a:t>video provided by ICR</a:t>
+            </a:r>
+          </a:p>
+          <a:p>
+            <a:pPr fontAlgn="base">
+              <a:spcBef>
+                <a:spcPts val="600"/>
+              </a:spcBef>
+              <a:spcAft>
+                <a:spcPts val="600"/>
+              </a:spcAft>
+            </a:pPr>
+            <a:r>
+              <a:rPr lang="en-GB" sz="2400" dirty="0"/>
+              <a:t>This course largely aims to give you</a:t>
             </a:r>
           </a:p>
           <a:p>
@@ -20190,41 +21544,7 @@
             </a:pPr>
             <a:r>
               <a:rPr lang="en-GB" sz="2000" dirty="0"/>
-              <a:t>Can check in “Menu” of Overleaf</a:t>
-            </a:r>
-          </a:p>
-          <a:p>
-            <a:pPr fontAlgn="base">
-              <a:spcBef>
-                <a:spcPts val="600"/>
-              </a:spcBef>
-              <a:spcAft>
-                <a:spcPts val="600"/>
-              </a:spcAft>
-            </a:pPr>
-            <a:r>
-              <a:rPr lang="en-GB" sz="2400" dirty="0">
-                <a:hlinkClick r:id="rId3"/>
-              </a:rPr>
-              <a:t>Good Viva </a:t>
-            </a:r>
-            <a:r>
-              <a:rPr lang="en-GB" sz="2400" dirty="0"/>
-              <a:t>video provided by ICR</a:t>
-            </a:r>
-          </a:p>
-          <a:p>
-            <a:pPr fontAlgn="base">
-              <a:spcBef>
-                <a:spcPts val="600"/>
-              </a:spcBef>
-              <a:spcAft>
-                <a:spcPts val="600"/>
-              </a:spcAft>
-            </a:pPr>
-            <a:r>
-              <a:rPr lang="en-GB" sz="2400" dirty="0"/>
-              <a:t>This course largely aims to give you guidance based on good practice</a:t>
+              <a:t>Tools to meet formatting requirements</a:t>
             </a:r>
           </a:p>
           <a:p>
@@ -20238,7 +21558,7 @@
             </a:pPr>
             <a:r>
               <a:rPr lang="en-GB" sz="2000" dirty="0"/>
-              <a:t>Loosely based on Imperial’s thesis requirements</a:t>
+              <a:t>Other useful tools for writing a thesis.</a:t>
             </a:r>
           </a:p>
         </p:txBody>
@@ -20321,7 +21641,7 @@
         </p:spPr>
         <p:txBody>
           <a:bodyPr>
-            <a:normAutofit lnSpcReduction="10000"/>
+            <a:normAutofit fontScale="85000" lnSpcReduction="20000"/>
           </a:bodyPr>
           <a:lstStyle/>
           <a:p>
@@ -20335,7 +21655,7 @@
             </a:pPr>
             <a:r>
               <a:rPr lang="en-GB" sz="2400" dirty="0"/>
-              <a:t>Typically A4 paper</a:t>
+              <a:t>Must be A4 paper</a:t>
             </a:r>
           </a:p>
           <a:p>
@@ -20349,7 +21669,35 @@
             </a:pPr>
             <a:r>
               <a:rPr lang="en-GB" sz="2400" dirty="0"/>
+              <a:t>All pages must be numbered in Arabic numerals, including the title page.</a:t>
+            </a:r>
+          </a:p>
+          <a:p>
+            <a:pPr fontAlgn="base">
+              <a:spcBef>
+                <a:spcPts val="600"/>
+              </a:spcBef>
+              <a:spcAft>
+                <a:spcPts val="600"/>
+              </a:spcAft>
+            </a:pPr>
+            <a:r>
+              <a:rPr lang="en-GB" sz="2400" dirty="0"/>
               <a:t>You may want your pages to be double-sided</a:t>
+            </a:r>
+          </a:p>
+          <a:p>
+            <a:pPr lvl="1" fontAlgn="base">
+              <a:spcBef>
+                <a:spcPts val="600"/>
+              </a:spcBef>
+              <a:spcAft>
+                <a:spcPts val="600"/>
+              </a:spcAft>
+            </a:pPr>
+            <a:r>
+              <a:rPr lang="en-GB" sz="2000" dirty="0"/>
+              <a:t>Causes headers footers and margins to be reflection on odd and even pages</a:t>
             </a:r>
           </a:p>
           <a:p>
@@ -20716,7 +22064,7 @@
             </a:pPr>
             <a:r>
               <a:rPr lang="en-GB" sz="2400" dirty="0"/>
-              <a:t>For binding services, margins must typically be at least 1cm (but check with whichever binding service you use)</a:t>
+              <a:t>LTO requires margins at the binding edge should be at least 40mm and all other margins should be at least 20mm.</a:t>
             </a:r>
           </a:p>
           <a:p>
@@ -20730,7 +22078,7 @@
             </a:pPr>
             <a:r>
               <a:rPr lang="en-GB" sz="2400" dirty="0"/>
-              <a:t>Often pages look nicer with a larger bottom margin</a:t>
+              <a:t>If you want the document to look good in electronic form as well, you may want to make left and right margins the same.</a:t>
             </a:r>
           </a:p>
           <a:p>
@@ -20857,36 +22205,6 @@
           <a:chExt cx="0" cy="0"/>
         </a:xfrm>
       </p:grpSpPr>
-      <p:pic>
-        <p:nvPicPr>
-          <p:cNvPr id="10" name="Picture 9">
-            <a:extLst>
-              <a:ext uri="{FF2B5EF4-FFF2-40B4-BE49-F238E27FC236}">
-                <a16:creationId xmlns:a16="http://schemas.microsoft.com/office/drawing/2014/main" id="{7EA1B5FB-280E-44CE-A03E-74EB3C8ABE9D}"/>
-              </a:ext>
-            </a:extLst>
-          </p:cNvPr>
-          <p:cNvPicPr>
-            <a:picLocks noChangeAspect="1"/>
-          </p:cNvPicPr>
-          <p:nvPr/>
-        </p:nvPicPr>
-        <p:blipFill>
-          <a:blip r:embed="rId3"/>
-          <a:stretch>
-            <a:fillRect/>
-          </a:stretch>
-        </p:blipFill>
-        <p:spPr>
-          <a:xfrm>
-            <a:off x="4986417" y="1205947"/>
-            <a:ext cx="4068246" cy="5661405"/>
-          </a:xfrm>
-          <a:prstGeom prst="rect">
-            <a:avLst/>
-          </a:prstGeom>
-        </p:spPr>
-      </p:pic>
       <p:sp>
         <p:nvSpPr>
           <p:cNvPr id="2" name="Title 1"/>
@@ -20921,13 +22239,13 @@
         </p:nvSpPr>
         <p:spPr>
           <a:xfrm>
-            <a:off x="457200" y="1600199"/>
-            <a:ext cx="3967655" cy="4453759"/>
+            <a:off x="457200" y="5145960"/>
+            <a:ext cx="3967655" cy="907997"/>
           </a:xfrm>
         </p:spPr>
         <p:txBody>
           <a:bodyPr>
-            <a:normAutofit lnSpcReduction="10000"/>
+            <a:normAutofit/>
           </a:bodyPr>
           <a:lstStyle/>
           <a:p>
@@ -20954,205 +22272,11 @@
                   </a:schemeClr>
                 </a:solidFill>
               </a:rPr>
-              <a:t>usepackage</a:t>
-            </a:r>
-            <a:r>
-              <a:rPr lang="en-GB" sz="2400" dirty="0"/>
-              <a:t>{</a:t>
-            </a:r>
-            <a:r>
-              <a:rPr lang="en-GB" sz="2400" dirty="0" err="1">
-                <a:solidFill>
-                  <a:schemeClr val="tx2">
-                    <a:lumMod val="50000"/>
-                    <a:lumOff val="50000"/>
-                  </a:schemeClr>
-                </a:solidFill>
-              </a:rPr>
-              <a:t>blindtext</a:t>
-            </a:r>
-            <a:r>
-              <a:rPr lang="en-GB" sz="2400" dirty="0"/>
-              <a:t>}</a:t>
-            </a:r>
-          </a:p>
-          <a:p>
-            <a:pPr marL="0" indent="0">
-              <a:buNone/>
-            </a:pPr>
-            <a:endParaRPr lang="en-GB" sz="2400" dirty="0"/>
-          </a:p>
-          <a:p>
-            <a:pPr marL="0" indent="0">
-              <a:buNone/>
-            </a:pPr>
-            <a:r>
-              <a:rPr lang="en-GB" sz="2400" dirty="0">
-                <a:solidFill>
-                  <a:schemeClr val="tx2">
-                    <a:lumMod val="50000"/>
-                    <a:lumOff val="50000"/>
-                  </a:schemeClr>
-                </a:solidFill>
-              </a:rPr>
-              <a:t>\</a:t>
-            </a:r>
-            <a:r>
-              <a:rPr lang="en-GB" sz="2400" dirty="0" err="1">
-                <a:solidFill>
-                  <a:schemeClr val="tx2">
-                    <a:lumMod val="50000"/>
-                    <a:lumOff val="50000"/>
-                  </a:schemeClr>
-                </a:solidFill>
-              </a:rPr>
-              <a:t>usepackage</a:t>
-            </a:r>
-            <a:r>
-              <a:rPr lang="en-GB" sz="2400" dirty="0"/>
-              <a:t>[</a:t>
-            </a:r>
-            <a:r>
-              <a:rPr lang="en-GB" sz="2400" dirty="0">
-                <a:solidFill>
-                  <a:schemeClr val="accent4">
-                    <a:lumMod val="75000"/>
-                  </a:schemeClr>
-                </a:solidFill>
-              </a:rPr>
-              <a:t>top=2cm, left= 2cm, right = 2cm, bottom=3cm</a:t>
-            </a:r>
-            <a:r>
-              <a:rPr lang="en-GB" sz="2400" dirty="0"/>
-              <a:t>] {</a:t>
-            </a:r>
-            <a:r>
-              <a:rPr lang="en-GB" sz="2400" dirty="0">
-                <a:solidFill>
-                  <a:schemeClr val="tx2">
-                    <a:lumMod val="50000"/>
-                    <a:lumOff val="50000"/>
-                  </a:schemeClr>
-                </a:solidFill>
-              </a:rPr>
-              <a:t>geometry</a:t>
-            </a:r>
-            <a:r>
-              <a:rPr lang="en-GB" sz="2400" dirty="0"/>
-              <a:t>}</a:t>
-            </a:r>
-          </a:p>
-          <a:p>
-            <a:pPr marL="0" indent="0">
-              <a:buNone/>
-            </a:pPr>
-            <a:endParaRPr lang="en-GB" sz="2400" dirty="0"/>
-          </a:p>
-          <a:p>
-            <a:pPr marL="0" indent="0">
-              <a:buNone/>
-            </a:pPr>
-            <a:r>
-              <a:rPr lang="en-GB" sz="2400" dirty="0">
-                <a:solidFill>
-                  <a:schemeClr val="tx2">
-                    <a:lumMod val="50000"/>
-                    <a:lumOff val="50000"/>
-                  </a:schemeClr>
-                </a:solidFill>
-              </a:rPr>
-              <a:t>\begin</a:t>
-            </a:r>
-            <a:r>
-              <a:rPr lang="en-GB" sz="2400" dirty="0"/>
-              <a:t>{</a:t>
-            </a:r>
-            <a:r>
-              <a:rPr lang="en-GB" sz="2400" dirty="0">
-                <a:solidFill>
-                  <a:schemeClr val="accent4">
-                    <a:lumMod val="75000"/>
-                  </a:schemeClr>
-                </a:solidFill>
-              </a:rPr>
-              <a:t>document</a:t>
-            </a:r>
-            <a:r>
-              <a:rPr lang="en-GB" sz="2400" dirty="0"/>
-              <a:t>}</a:t>
-            </a:r>
-            <a:br>
-              <a:rPr lang="en-GB" sz="2400" dirty="0"/>
-            </a:br>
-            <a:endParaRPr lang="en-GB" sz="2400" dirty="0"/>
-          </a:p>
-          <a:p>
-            <a:pPr marL="0" indent="0">
-              <a:buNone/>
-            </a:pPr>
-            <a:r>
-              <a:rPr lang="en-GB" sz="2400" dirty="0">
-                <a:solidFill>
-                  <a:schemeClr val="tx2">
-                    <a:lumMod val="50000"/>
-                    <a:lumOff val="50000"/>
-                  </a:schemeClr>
-                </a:solidFill>
-              </a:rPr>
-              <a:t>\</a:t>
-            </a:r>
-            <a:r>
-              <a:rPr lang="en-GB" sz="2400" dirty="0" err="1">
-                <a:solidFill>
-                  <a:schemeClr val="tx2">
-                    <a:lumMod val="50000"/>
-                    <a:lumOff val="50000"/>
-                  </a:schemeClr>
-                </a:solidFill>
-              </a:rPr>
               <a:t>blindtext</a:t>
             </a:r>
             <a:r>
               <a:rPr lang="en-GB" sz="2400" dirty="0"/>
               <a:t>[10]</a:t>
-            </a:r>
-            <a:br>
-              <a:rPr lang="en-GB" sz="2400" dirty="0"/>
-            </a:br>
-            <a:endParaRPr lang="en-GB" sz="2400" dirty="0"/>
-          </a:p>
-          <a:p>
-            <a:pPr marL="0" indent="0">
-              <a:buNone/>
-            </a:pPr>
-            <a:r>
-              <a:rPr lang="en-GB" sz="2400" dirty="0">
-                <a:solidFill>
-                  <a:schemeClr val="tx2">
-                    <a:lumMod val="50000"/>
-                    <a:lumOff val="50000"/>
-                  </a:schemeClr>
-                </a:solidFill>
-              </a:rPr>
-              <a:t>\end</a:t>
-            </a:r>
-            <a:r>
-              <a:rPr lang="en-GB" sz="2400" dirty="0"/>
-              <a:t>{</a:t>
-            </a:r>
-            <a:r>
-              <a:rPr lang="en-GB" sz="2400" dirty="0">
-                <a:solidFill>
-                  <a:schemeClr val="accent4">
-                    <a:lumMod val="75000"/>
-                  </a:schemeClr>
-                </a:solidFill>
-              </a:rPr>
-              <a:t>document</a:t>
-            </a:r>
-            <a:r>
-              <a:rPr lang="en-GB" sz="2400" dirty="0"/>
-              <a:t>}</a:t>
             </a:r>
           </a:p>
         </p:txBody>
@@ -21228,6 +22352,312 @@
                 </a:solidFill>
               </a:rPr>
               <a:t>Problem Sheet</a:t>
+            </a:r>
+          </a:p>
+        </p:txBody>
+      </p:sp>
+      <p:pic>
+        <p:nvPicPr>
+          <p:cNvPr id="7" name="Picture 6">
+            <a:extLst>
+              <a:ext uri="{FF2B5EF4-FFF2-40B4-BE49-F238E27FC236}">
+                <a16:creationId xmlns:a16="http://schemas.microsoft.com/office/drawing/2014/main" id="{D0824804-30E4-6C48-5EFC-18FC7C385441}"/>
+              </a:ext>
+            </a:extLst>
+          </p:cNvPr>
+          <p:cNvPicPr>
+            <a:picLocks noChangeAspect="1"/>
+          </p:cNvPicPr>
+          <p:nvPr/>
+        </p:nvPicPr>
+        <p:blipFill>
+          <a:blip r:embed="rId3"/>
+          <a:stretch>
+            <a:fillRect/>
+          </a:stretch>
+        </p:blipFill>
+        <p:spPr>
+          <a:xfrm>
+            <a:off x="5584785" y="1153801"/>
+            <a:ext cx="2789497" cy="5331570"/>
+          </a:xfrm>
+          <a:prstGeom prst="rect">
+            <a:avLst/>
+          </a:prstGeom>
+        </p:spPr>
+      </p:pic>
+      <p:sp>
+        <p:nvSpPr>
+          <p:cNvPr id="8" name="TextBox 7">
+            <a:extLst>
+              <a:ext uri="{FF2B5EF4-FFF2-40B4-BE49-F238E27FC236}">
+                <a16:creationId xmlns:a16="http://schemas.microsoft.com/office/drawing/2014/main" id="{3724276E-B819-4868-EC9E-2A45BB89A012}"/>
+              </a:ext>
+            </a:extLst>
+          </p:cNvPr>
+          <p:cNvSpPr txBox="1"/>
+          <p:nvPr/>
+        </p:nvSpPr>
+        <p:spPr>
+          <a:xfrm>
+            <a:off x="457204" y="1767006"/>
+            <a:ext cx="3802278" cy="3323987"/>
+          </a:xfrm>
+          <a:prstGeom prst="rect">
+            <a:avLst/>
+          </a:prstGeom>
+          <a:noFill/>
+          <a:ln>
+            <a:solidFill>
+              <a:srgbClr val="FF0000"/>
+            </a:solidFill>
+          </a:ln>
+        </p:spPr>
+        <p:txBody>
+          <a:bodyPr wrap="square" rtlCol="0">
+            <a:spAutoFit/>
+          </a:bodyPr>
+          <a:lstStyle/>
+          <a:p>
+            <a:pPr marL="0" indent="0">
+              <a:buNone/>
+            </a:pPr>
+            <a:r>
+              <a:rPr lang="en-GB" sz="2400" dirty="0">
+                <a:solidFill>
+                  <a:schemeClr val="tx2">
+                    <a:lumMod val="50000"/>
+                    <a:lumOff val="50000"/>
+                  </a:schemeClr>
+                </a:solidFill>
+              </a:rPr>
+              <a:t>\</a:t>
+            </a:r>
+            <a:r>
+              <a:rPr lang="en-GB" sz="2400" dirty="0" err="1">
+                <a:solidFill>
+                  <a:schemeClr val="tx2">
+                    <a:lumMod val="50000"/>
+                    <a:lumOff val="50000"/>
+                  </a:schemeClr>
+                </a:solidFill>
+              </a:rPr>
+              <a:t>documentclass</a:t>
+            </a:r>
+            <a:r>
+              <a:rPr lang="en-GB" sz="2400" dirty="0"/>
+              <a:t>[</a:t>
+            </a:r>
+            <a:r>
+              <a:rPr lang="en-GB" sz="2400" dirty="0">
+                <a:solidFill>
+                  <a:schemeClr val="accent4">
+                    <a:lumMod val="75000"/>
+                  </a:schemeClr>
+                </a:solidFill>
+              </a:rPr>
+              <a:t>12pt, a4paper, </a:t>
+            </a:r>
+            <a:r>
+              <a:rPr lang="en-GB" sz="2400" dirty="0" err="1">
+                <a:solidFill>
+                  <a:schemeClr val="accent4">
+                    <a:lumMod val="75000"/>
+                  </a:schemeClr>
+                </a:solidFill>
+              </a:rPr>
+              <a:t>twoside</a:t>
+            </a:r>
+            <a:r>
+              <a:rPr lang="en-GB" sz="2400" dirty="0"/>
+              <a:t>]{</a:t>
+            </a:r>
+            <a:r>
+              <a:rPr lang="en-GB" sz="2400" dirty="0">
+                <a:solidFill>
+                  <a:schemeClr val="tx2">
+                    <a:lumMod val="50000"/>
+                    <a:lumOff val="50000"/>
+                  </a:schemeClr>
+                </a:solidFill>
+              </a:rPr>
+              <a:t>report</a:t>
+            </a:r>
+            <a:r>
+              <a:rPr lang="en-GB" sz="2400" dirty="0"/>
+              <a:t>} </a:t>
+            </a:r>
+          </a:p>
+          <a:p>
+            <a:pPr marL="0" indent="0">
+              <a:buNone/>
+            </a:pPr>
+            <a:endParaRPr lang="en-GB" sz="2400" dirty="0">
+              <a:solidFill>
+                <a:schemeClr val="tx2">
+                  <a:lumMod val="50000"/>
+                  <a:lumOff val="50000"/>
+                </a:schemeClr>
+              </a:solidFill>
+            </a:endParaRPr>
+          </a:p>
+          <a:p>
+            <a:pPr marL="0" indent="0">
+              <a:buNone/>
+            </a:pPr>
+            <a:r>
+              <a:rPr lang="en-GB" sz="2400" dirty="0">
+                <a:solidFill>
+                  <a:schemeClr val="tx2">
+                    <a:lumMod val="50000"/>
+                    <a:lumOff val="50000"/>
+                  </a:schemeClr>
+                </a:solidFill>
+              </a:rPr>
+              <a:t>\</a:t>
+            </a:r>
+            <a:r>
+              <a:rPr lang="en-GB" sz="2400" dirty="0" err="1">
+                <a:solidFill>
+                  <a:schemeClr val="tx2">
+                    <a:lumMod val="50000"/>
+                    <a:lumOff val="50000"/>
+                  </a:schemeClr>
+                </a:solidFill>
+              </a:rPr>
+              <a:t>usepackage</a:t>
+            </a:r>
+            <a:r>
+              <a:rPr lang="en-GB" sz="2400" dirty="0"/>
+              <a:t>{</a:t>
+            </a:r>
+            <a:r>
+              <a:rPr lang="en-GB" sz="2400" dirty="0" err="1">
+                <a:solidFill>
+                  <a:schemeClr val="tx2">
+                    <a:lumMod val="50000"/>
+                    <a:lumOff val="50000"/>
+                  </a:schemeClr>
+                </a:solidFill>
+              </a:rPr>
+              <a:t>blindtext</a:t>
+            </a:r>
+            <a:r>
+              <a:rPr lang="en-GB" sz="2400" dirty="0"/>
+              <a:t>}</a:t>
+            </a:r>
+          </a:p>
+          <a:p>
+            <a:pPr marL="0" indent="0">
+              <a:buNone/>
+            </a:pPr>
+            <a:endParaRPr lang="en-GB" sz="2400" dirty="0"/>
+          </a:p>
+          <a:p>
+            <a:pPr marL="0" indent="0">
+              <a:buNone/>
+            </a:pPr>
+            <a:r>
+              <a:rPr lang="en-GB" sz="2400" dirty="0">
+                <a:solidFill>
+                  <a:schemeClr val="tx2">
+                    <a:lumMod val="50000"/>
+                    <a:lumOff val="50000"/>
+                  </a:schemeClr>
+                </a:solidFill>
+              </a:rPr>
+              <a:t>\</a:t>
+            </a:r>
+            <a:r>
+              <a:rPr lang="en-GB" sz="2400" dirty="0" err="1">
+                <a:solidFill>
+                  <a:schemeClr val="tx2">
+                    <a:lumMod val="50000"/>
+                    <a:lumOff val="50000"/>
+                  </a:schemeClr>
+                </a:solidFill>
+              </a:rPr>
+              <a:t>usepackage</a:t>
+            </a:r>
+            <a:r>
+              <a:rPr lang="en-GB" sz="2400" dirty="0"/>
+              <a:t>[</a:t>
+            </a:r>
+            <a:r>
+              <a:rPr lang="en-GB" sz="2400" dirty="0">
+                <a:solidFill>
+                  <a:schemeClr val="accent4">
+                    <a:lumMod val="75000"/>
+                  </a:schemeClr>
+                </a:solidFill>
+              </a:rPr>
+              <a:t>top=2cm, left= 4cm, right = 2cm, bottom=3cm</a:t>
+            </a:r>
+            <a:r>
+              <a:rPr lang="en-GB" sz="2400" dirty="0"/>
+              <a:t>] {</a:t>
+            </a:r>
+            <a:r>
+              <a:rPr lang="en-GB" sz="2400" dirty="0">
+                <a:solidFill>
+                  <a:schemeClr val="tx2">
+                    <a:lumMod val="50000"/>
+                    <a:lumOff val="50000"/>
+                  </a:schemeClr>
+                </a:solidFill>
+              </a:rPr>
+              <a:t>geometry</a:t>
+            </a:r>
+            <a:r>
+              <a:rPr lang="en-GB" sz="2400" dirty="0"/>
+              <a:t>}</a:t>
+            </a:r>
+          </a:p>
+          <a:p>
+            <a:endParaRPr lang="en-GB" dirty="0"/>
+          </a:p>
+        </p:txBody>
+      </p:sp>
+      <p:sp>
+        <p:nvSpPr>
+          <p:cNvPr id="9" name="TextBox 8">
+            <a:extLst>
+              <a:ext uri="{FF2B5EF4-FFF2-40B4-BE49-F238E27FC236}">
+                <a16:creationId xmlns:a16="http://schemas.microsoft.com/office/drawing/2014/main" id="{943F2867-2643-29F9-471E-0E3D1AA4A23F}"/>
+              </a:ext>
+            </a:extLst>
+          </p:cNvPr>
+          <p:cNvSpPr txBox="1"/>
+          <p:nvPr/>
+        </p:nvSpPr>
+        <p:spPr>
+          <a:xfrm>
+            <a:off x="457204" y="1397674"/>
+            <a:ext cx="1877437" cy="369332"/>
+          </a:xfrm>
+          <a:prstGeom prst="rect">
+            <a:avLst/>
+          </a:prstGeom>
+          <a:noFill/>
+          <a:ln>
+            <a:solidFill>
+              <a:srgbClr val="FF0000"/>
+            </a:solidFill>
+          </a:ln>
+        </p:spPr>
+        <p:txBody>
+          <a:bodyPr wrap="none" rtlCol="0">
+            <a:spAutoFit/>
+          </a:bodyPr>
+          <a:lstStyle/>
+          <a:p>
+            <a:r>
+              <a:rPr lang="en-GB" dirty="0">
+                <a:solidFill>
+                  <a:srgbClr val="FF0000"/>
+                </a:solidFill>
+              </a:rPr>
+              <a:t>Add to preamble</a:t>
             </a:r>
           </a:p>
         </p:txBody>

</xml_diff>